<commit_message>
finishing plots for poster
</commit_message>
<xml_diff>
--- a/5 Presentations/Posters/Namias Maxwell Huff Cog Aging 2022.pptx
+++ b/5 Presentations/Posters/Namias Maxwell Huff Cog Aging 2022.pptx
@@ -221,20 +221,6 @@
     </pc:docChg>
   </pc:docChgLst>
 </pc:chgInfo>
-</file>
-
-<file path=ppt/comments/comment1.xml><?xml version="1.0" encoding="utf-8"?>
-<p:cmLst xmlns:a="http://schemas.openxmlformats.org/drawingml/2006/main" xmlns:r="http://schemas.openxmlformats.org/officeDocument/2006/relationships" xmlns:p="http://schemas.openxmlformats.org/presentationml/2006/main">
-  <p:cm authorId="4" dt="2022-03-01T11:18:22.055" idx="3">
-    <p:pos x="26382" y="2105"/>
-    <p:text>Local and Global costs vincentiles at the top</p:text>
-    <p:extLst>
-      <p:ext uri="{C676402C-5697-4E1C-873F-D02D1690AC5C}">
-        <p15:threadingInfo xmlns:p15="http://schemas.microsoft.com/office/powerpoint/2012/main" timeZoneBias="360"/>
-      </p:ext>
-    </p:extLst>
-  </p:cm>
-</p:cmLst>
 </file>
 
 <file path=ppt/handoutMasters/handoutMaster1.xml><?xml version="1.0" encoding="utf-8"?>
@@ -3452,8 +3438,8 @@
         </p:nvSpPr>
         <p:spPr>
           <a:xfrm>
-            <a:off x="27831493" y="22131414"/>
-            <a:ext cx="14032117" cy="9186786"/>
+            <a:off x="27831493" y="21226669"/>
+            <a:ext cx="14032117" cy="10091531"/>
           </a:xfrm>
           <a:prstGeom prst="roundRect">
             <a:avLst/>
@@ -3916,7 +3902,7 @@
         </p:nvSpPr>
         <p:spPr bwMode="auto">
           <a:xfrm>
-            <a:off x="28157194" y="22419159"/>
+            <a:off x="28037926" y="21445781"/>
             <a:ext cx="13943647" cy="9127641"/>
           </a:xfrm>
           <a:prstGeom prst="rect">
@@ -3963,7 +3949,7 @@
         <p:spPr>
           <a:xfrm>
             <a:off x="27849985" y="2739506"/>
-            <a:ext cx="14050609" cy="19097018"/>
+            <a:ext cx="14050609" cy="18291694"/>
           </a:xfrm>
           <a:prstGeom prst="roundRect">
             <a:avLst/>
@@ -4153,8 +4139,8 @@
         </p:nvSpPr>
         <p:spPr>
           <a:xfrm>
-            <a:off x="13044588" y="2792378"/>
-            <a:ext cx="14603931" cy="8054826"/>
+            <a:off x="13044588" y="2841774"/>
+            <a:ext cx="14603931" cy="7848649"/>
           </a:xfrm>
           <a:prstGeom prst="roundRect">
             <a:avLst>
@@ -4212,7 +4198,7 @@
         </p:nvSpPr>
         <p:spPr bwMode="auto">
           <a:xfrm>
-            <a:off x="15106959" y="2971800"/>
+            <a:off x="15106959" y="2819400"/>
             <a:ext cx="10617200" cy="1600438"/>
           </a:xfrm>
           <a:prstGeom prst="rect">
@@ -4260,8 +4246,8 @@
         </p:nvSpPr>
         <p:spPr>
           <a:xfrm>
-            <a:off x="12974774" y="10999604"/>
-            <a:ext cx="14599170" cy="20373529"/>
+            <a:off x="12974774" y="10820449"/>
+            <a:ext cx="14599170" cy="20615407"/>
           </a:xfrm>
           <a:prstGeom prst="roundRect">
             <a:avLst/>
@@ -4425,19 +4411,13 @@
                 <a:solidFill>
                   <a:srgbClr val="0080FF"/>
                 </a:solidFill>
-                <a:highlight>
-                  <a:srgbClr val="FFFF00"/>
-                </a:highlight>
               </a:rPr>
-              <a:t>[OSF LINK]</a:t>
+              <a:t>https://osf.io/yrdsz/</a:t>
             </a:r>
             <a:endParaRPr lang="en-US" sz="3200" dirty="0">
               <a:solidFill>
                 <a:srgbClr val="0080FF"/>
               </a:solidFill>
-              <a:highlight>
-                <a:srgbClr val="FFFF00"/>
-              </a:highlight>
               <a:latin typeface="+mj-lt"/>
               <a:cs typeface="Arial" pitchFamily="34" charset="0"/>
             </a:endParaRPr>
@@ -4454,7 +4434,7 @@
         </p:nvSpPr>
         <p:spPr bwMode="auto">
           <a:xfrm>
-            <a:off x="15773400" y="10989439"/>
+            <a:off x="15773400" y="10744200"/>
             <a:ext cx="9372600" cy="1431161"/>
           </a:xfrm>
           <a:prstGeom prst="rect">
@@ -4481,7 +4461,7 @@
                   <a:srgbClr val="0080FF"/>
                 </a:solidFill>
               </a:rPr>
-              <a:t>Mean Errors</a:t>
+              <a:t>Results: Mean Errors</a:t>
             </a:r>
           </a:p>
           <a:p>
@@ -4516,7 +4496,7 @@
         </p:nvSpPr>
         <p:spPr>
           <a:xfrm>
-            <a:off x="38372965" y="21296303"/>
+            <a:off x="39167302" y="20021235"/>
             <a:ext cx="1885453" cy="400110"/>
           </a:xfrm>
           <a:prstGeom prst="rect">
@@ -4928,7 +4908,7 @@
         </p:nvSpPr>
         <p:spPr>
           <a:xfrm>
-            <a:off x="23016600" y="4282336"/>
+            <a:off x="23016600" y="3999468"/>
             <a:ext cx="3424800" cy="4672200"/>
           </a:xfrm>
           <a:prstGeom prst="roundRect">
@@ -5017,7 +4997,7 @@
         </p:nvSpPr>
         <p:spPr>
           <a:xfrm>
-            <a:off x="18595147" y="4254785"/>
+            <a:off x="18595147" y="3971917"/>
             <a:ext cx="3424800" cy="4672200"/>
           </a:xfrm>
           <a:prstGeom prst="roundRect">
@@ -5125,7 +5105,7 @@
         </p:nvGrpSpPr>
         <p:grpSpPr>
           <a:xfrm>
-            <a:off x="14305262" y="4245268"/>
+            <a:off x="14305262" y="3962400"/>
             <a:ext cx="4641552" cy="4746332"/>
             <a:chOff x="11969326" y="15826330"/>
             <a:chExt cx="3661685" cy="1881300"/>
@@ -5313,7 +5293,7 @@
         </p:nvSpPr>
         <p:spPr>
           <a:xfrm>
-            <a:off x="21880578" y="5952370"/>
+            <a:off x="21880578" y="5669502"/>
             <a:ext cx="1392600" cy="1625700"/>
           </a:xfrm>
           <a:prstGeom prst="rightArrow">
@@ -6283,8 +6263,8 @@
         </p:nvSpPr>
         <p:spPr>
           <a:xfrm>
-            <a:off x="13523335" y="9067800"/>
-            <a:ext cx="14050609" cy="2106561"/>
+            <a:off x="13523335" y="8915400"/>
+            <a:ext cx="14050609" cy="1490481"/>
           </a:xfrm>
           <a:prstGeom prst="rect">
             <a:avLst/>
@@ -7653,7 +7633,7 @@
         </p:nvSpPr>
         <p:spPr bwMode="auto">
           <a:xfrm>
-            <a:off x="30542918" y="3971233"/>
+            <a:off x="30542918" y="3810000"/>
             <a:ext cx="9372600" cy="1308050"/>
           </a:xfrm>
           <a:prstGeom prst="rect">
@@ -7717,7 +7697,7 @@
         </p:nvSpPr>
         <p:spPr bwMode="auto">
           <a:xfrm>
-            <a:off x="15862339" y="20802600"/>
+            <a:off x="15849600" y="20514439"/>
             <a:ext cx="9372600" cy="1431161"/>
           </a:xfrm>
           <a:prstGeom prst="rect">
@@ -7744,7 +7724,7 @@
                   <a:srgbClr val="0080FF"/>
                 </a:solidFill>
               </a:rPr>
-              <a:t>Mean RTs</a:t>
+              <a:t>Results: Mean RTs</a:t>
             </a:r>
             <a:endParaRPr lang="en-US" sz="100" b="1" dirty="0">
               <a:solidFill>
@@ -7778,7 +7758,7 @@
         </p:nvSpPr>
         <p:spPr bwMode="auto">
           <a:xfrm>
-            <a:off x="30861000" y="14398526"/>
+            <a:off x="30418236" y="14097000"/>
             <a:ext cx="9372600" cy="1431161"/>
           </a:xfrm>
           <a:prstGeom prst="rect">
@@ -7826,122 +7806,6 @@
           </a:p>
         </p:txBody>
       </p:sp>
-      <p:pic>
-        <p:nvPicPr>
-          <p:cNvPr id="36" name="Picture 35" descr="Chart&#10;&#10;Description automatically generated">
-            <a:extLst>
-              <a:ext uri="{FF2B5EF4-FFF2-40B4-BE49-F238E27FC236}">
-                <a16:creationId xmlns:a16="http://schemas.microsoft.com/office/drawing/2014/main" id="{1763E1DE-B368-4507-B7B7-140CED770660}"/>
-              </a:ext>
-            </a:extLst>
-          </p:cNvPr>
-          <p:cNvPicPr>
-            <a:picLocks noChangeAspect="1"/>
-          </p:cNvPicPr>
-          <p:nvPr/>
-        </p:nvPicPr>
-        <p:blipFill rotWithShape="1">
-          <a:blip r:embed="rId6"/>
-          <a:srcRect l="5934" t="8308" r="7423" b="5897"/>
-          <a:stretch/>
-        </p:blipFill>
-        <p:spPr>
-          <a:xfrm>
-            <a:off x="13676890" y="11937885"/>
-            <a:ext cx="13374110" cy="8828859"/>
-          </a:xfrm>
-          <a:prstGeom prst="rect">
-            <a:avLst/>
-          </a:prstGeom>
-        </p:spPr>
-      </p:pic>
-      <p:pic>
-        <p:nvPicPr>
-          <p:cNvPr id="38" name="Picture 37" descr="Chart, bar chart&#10;&#10;Description automatically generated">
-            <a:extLst>
-              <a:ext uri="{FF2B5EF4-FFF2-40B4-BE49-F238E27FC236}">
-                <a16:creationId xmlns:a16="http://schemas.microsoft.com/office/drawing/2014/main" id="{2F65D6D9-3216-4EAE-B9AE-C980246ECF6A}"/>
-              </a:ext>
-            </a:extLst>
-          </p:cNvPr>
-          <p:cNvPicPr>
-            <a:picLocks noChangeAspect="1"/>
-          </p:cNvPicPr>
-          <p:nvPr/>
-        </p:nvPicPr>
-        <p:blipFill rotWithShape="1">
-          <a:blip r:embed="rId7"/>
-          <a:srcRect l="6556" t="7681" r="9553" b="6814"/>
-          <a:stretch/>
-        </p:blipFill>
-        <p:spPr>
-          <a:xfrm>
-            <a:off x="13738005" y="21709638"/>
-            <a:ext cx="13131299" cy="8922762"/>
-          </a:xfrm>
-          <a:prstGeom prst="rect">
-            <a:avLst/>
-          </a:prstGeom>
-        </p:spPr>
-      </p:pic>
-      <p:pic>
-        <p:nvPicPr>
-          <p:cNvPr id="16" name="Picture 15" descr="Graphical user interface, chart&#10;&#10;Description automatically generated">
-            <a:extLst>
-              <a:ext uri="{FF2B5EF4-FFF2-40B4-BE49-F238E27FC236}">
-                <a16:creationId xmlns:a16="http://schemas.microsoft.com/office/drawing/2014/main" id="{E4F0218B-FD23-4608-A1CA-043738E318F4}"/>
-              </a:ext>
-            </a:extLst>
-          </p:cNvPr>
-          <p:cNvPicPr>
-            <a:picLocks noChangeAspect="1"/>
-          </p:cNvPicPr>
-          <p:nvPr/>
-        </p:nvPicPr>
-        <p:blipFill rotWithShape="1">
-          <a:blip r:embed="rId8"/>
-          <a:srcRect l="5994" t="8413" r="8824" b="48182"/>
-          <a:stretch/>
-        </p:blipFill>
-        <p:spPr>
-          <a:xfrm>
-            <a:off x="27961903" y="4916575"/>
-            <a:ext cx="13826772" cy="4227425"/>
-          </a:xfrm>
-          <a:prstGeom prst="rect">
-            <a:avLst/>
-          </a:prstGeom>
-        </p:spPr>
-      </p:pic>
-      <p:pic>
-        <p:nvPicPr>
-          <p:cNvPr id="62" name="Picture 61" descr="Graphical user interface, chart&#10;&#10;Description automatically generated">
-            <a:extLst>
-              <a:ext uri="{FF2B5EF4-FFF2-40B4-BE49-F238E27FC236}">
-                <a16:creationId xmlns:a16="http://schemas.microsoft.com/office/drawing/2014/main" id="{E193FDE0-4340-44C7-9650-23621B0418E4}"/>
-              </a:ext>
-            </a:extLst>
-          </p:cNvPr>
-          <p:cNvPicPr>
-            <a:picLocks noChangeAspect="1"/>
-          </p:cNvPicPr>
-          <p:nvPr/>
-        </p:nvPicPr>
-        <p:blipFill rotWithShape="1">
-          <a:blip r:embed="rId8"/>
-          <a:srcRect l="5994" t="49879" r="8824" b="6715"/>
-          <a:stretch/>
-        </p:blipFill>
-        <p:spPr>
-          <a:xfrm>
-            <a:off x="27969207" y="9793375"/>
-            <a:ext cx="13826772" cy="4227425"/>
-          </a:xfrm>
-          <a:prstGeom prst="rect">
-            <a:avLst/>
-          </a:prstGeom>
-        </p:spPr>
-      </p:pic>
       <p:sp>
         <p:nvSpPr>
           <p:cNvPr id="63" name="TextBox 24">
@@ -7958,7 +7822,7 @@
         </p:nvSpPr>
         <p:spPr bwMode="auto">
           <a:xfrm>
-            <a:off x="30542918" y="9067800"/>
+            <a:off x="30627076" y="8754614"/>
             <a:ext cx="9372600" cy="1277273"/>
           </a:xfrm>
           <a:prstGeom prst="rect">
@@ -8025,7 +7889,7 @@
         </p:nvSpPr>
         <p:spPr bwMode="auto">
           <a:xfrm>
-            <a:off x="29845000" y="2819162"/>
+            <a:off x="29922156" y="2742962"/>
             <a:ext cx="10617200" cy="1600438"/>
           </a:xfrm>
           <a:prstGeom prst="rect">
@@ -8127,7 +7991,7 @@
         </p:nvSpPr>
         <p:spPr>
           <a:xfrm>
-            <a:off x="39849968" y="14583921"/>
+            <a:off x="39992302" y="14283955"/>
             <a:ext cx="1885453" cy="400110"/>
           </a:xfrm>
           <a:prstGeom prst="rect">
@@ -8153,6 +8017,163 @@
           </a:p>
         </p:txBody>
       </p:sp>
+      <p:pic>
+        <p:nvPicPr>
+          <p:cNvPr id="20" name="Picture 19" descr="Chart&#10;&#10;Description automatically generated">
+            <a:extLst>
+              <a:ext uri="{FF2B5EF4-FFF2-40B4-BE49-F238E27FC236}">
+                <a16:creationId xmlns:a16="http://schemas.microsoft.com/office/drawing/2014/main" id="{1775B3F8-3C06-49EA-A7E6-830E22559017}"/>
+              </a:ext>
+            </a:extLst>
+          </p:cNvPr>
+          <p:cNvPicPr>
+            <a:picLocks noChangeAspect="1"/>
+          </p:cNvPicPr>
+          <p:nvPr/>
+        </p:nvPicPr>
+        <p:blipFill rotWithShape="1">
+          <a:blip r:embed="rId6">
+            <a:extLst>
+              <a:ext uri="{BEBA8EAE-BF5A-486C-A8C5-ECC9F3942E4B}">
+                <a14:imgProps xmlns:a14="http://schemas.microsoft.com/office/drawing/2010/main">
+                  <a14:imgLayer r:embed="rId7">
+                    <a14:imgEffect>
+                      <a14:brightnessContrast contrast="-40000"/>
+                    </a14:imgEffect>
+                  </a14:imgLayer>
+                </a14:imgProps>
+              </a:ext>
+            </a:extLst>
+          </a:blip>
+          <a:srcRect l="6982" t="6946" r="9005" b="3979"/>
+          <a:stretch/>
+        </p:blipFill>
+        <p:spPr>
+          <a:xfrm>
+            <a:off x="13985608" y="11582400"/>
+            <a:ext cx="12836792" cy="9073584"/>
+          </a:xfrm>
+          <a:prstGeom prst="rect">
+            <a:avLst/>
+          </a:prstGeom>
+        </p:spPr>
+      </p:pic>
+      <p:pic>
+        <p:nvPicPr>
+          <p:cNvPr id="22" name="Picture 21" descr="Chart, bar chart&#10;&#10;Description automatically generated">
+            <a:extLst>
+              <a:ext uri="{FF2B5EF4-FFF2-40B4-BE49-F238E27FC236}">
+                <a16:creationId xmlns:a16="http://schemas.microsoft.com/office/drawing/2014/main" id="{1A445849-368C-4C9C-BFF0-EDFB27DDE49C}"/>
+              </a:ext>
+            </a:extLst>
+          </p:cNvPr>
+          <p:cNvPicPr>
+            <a:picLocks noChangeAspect="1"/>
+          </p:cNvPicPr>
+          <p:nvPr/>
+        </p:nvPicPr>
+        <p:blipFill rotWithShape="1">
+          <a:blip r:embed="rId8"/>
+          <a:srcRect l="4898" t="7477" r="8898" b="4605"/>
+          <a:stretch/>
+        </p:blipFill>
+        <p:spPr>
+          <a:xfrm>
+            <a:off x="13548094" y="21488400"/>
+            <a:ext cx="13350506" cy="9077398"/>
+          </a:xfrm>
+          <a:prstGeom prst="rect">
+            <a:avLst/>
+          </a:prstGeom>
+        </p:spPr>
+      </p:pic>
+      <p:pic>
+        <p:nvPicPr>
+          <p:cNvPr id="28" name="Picture 27" descr="Chart, bar chart&#10;&#10;Description automatically generated">
+            <a:extLst>
+              <a:ext uri="{FF2B5EF4-FFF2-40B4-BE49-F238E27FC236}">
+                <a16:creationId xmlns:a16="http://schemas.microsoft.com/office/drawing/2014/main" id="{D5DCF515-D382-4223-8C7D-3194F2AA2741}"/>
+              </a:ext>
+            </a:extLst>
+          </p:cNvPr>
+          <p:cNvPicPr>
+            <a:picLocks noChangeAspect="1"/>
+          </p:cNvPicPr>
+          <p:nvPr/>
+        </p:nvPicPr>
+        <p:blipFill rotWithShape="1">
+          <a:blip r:embed="rId9"/>
+          <a:srcRect l="5241" t="64157" r="9212" b="7342"/>
+          <a:stretch/>
+        </p:blipFill>
+        <p:spPr>
+          <a:xfrm>
+            <a:off x="28041600" y="15163800"/>
+            <a:ext cx="13563600" cy="4468229"/>
+          </a:xfrm>
+          <a:prstGeom prst="rect">
+            <a:avLst/>
+          </a:prstGeom>
+        </p:spPr>
+      </p:pic>
+      <p:pic>
+        <p:nvPicPr>
+          <p:cNvPr id="30" name="Picture 29" descr="Graphical user interface, chart&#10;&#10;Description automatically generated">
+            <a:extLst>
+              <a:ext uri="{FF2B5EF4-FFF2-40B4-BE49-F238E27FC236}">
+                <a16:creationId xmlns:a16="http://schemas.microsoft.com/office/drawing/2014/main" id="{BF8F7D30-F763-4476-8F59-66FE912BEA91}"/>
+              </a:ext>
+            </a:extLst>
+          </p:cNvPr>
+          <p:cNvPicPr>
+            <a:picLocks noChangeAspect="1"/>
+          </p:cNvPicPr>
+          <p:nvPr/>
+        </p:nvPicPr>
+        <p:blipFill rotWithShape="1">
+          <a:blip r:embed="rId10"/>
+          <a:srcRect l="5995" t="8639" r="9510" b="49155"/>
+          <a:stretch/>
+        </p:blipFill>
+        <p:spPr>
+          <a:xfrm>
+            <a:off x="27970950" y="4684531"/>
+            <a:ext cx="13862850" cy="4154669"/>
+          </a:xfrm>
+          <a:prstGeom prst="rect">
+            <a:avLst/>
+          </a:prstGeom>
+        </p:spPr>
+      </p:pic>
+      <p:pic>
+        <p:nvPicPr>
+          <p:cNvPr id="77" name="Picture 76" descr="Graphical user interface, chart&#10;&#10;Description automatically generated">
+            <a:extLst>
+              <a:ext uri="{FF2B5EF4-FFF2-40B4-BE49-F238E27FC236}">
+                <a16:creationId xmlns:a16="http://schemas.microsoft.com/office/drawing/2014/main" id="{809239AF-C8F1-4E5A-AEFA-12046D9B25D9}"/>
+              </a:ext>
+            </a:extLst>
+          </p:cNvPr>
+          <p:cNvPicPr>
+            <a:picLocks noChangeAspect="1"/>
+          </p:cNvPicPr>
+          <p:nvPr/>
+        </p:nvPicPr>
+        <p:blipFill rotWithShape="1">
+          <a:blip r:embed="rId10"/>
+          <a:srcRect l="5995" t="49619" r="9510" b="5653"/>
+          <a:stretch/>
+        </p:blipFill>
+        <p:spPr>
+          <a:xfrm>
+            <a:off x="27956651" y="9486732"/>
+            <a:ext cx="13862850" cy="4402978"/>
+          </a:xfrm>
+          <a:prstGeom prst="rect">
+            <a:avLst/>
+          </a:prstGeom>
+        </p:spPr>
+      </p:pic>
     </p:spTree>
   </p:cSld>
   <p:clrMapOvr>

</xml_diff>

<commit_message>
conclusion and tweaking figures
</commit_message>
<xml_diff>
--- a/5 Presentations/Posters/Namias Maxwell Huff Cog Aging 2022.pptx
+++ b/5 Presentations/Posters/Namias Maxwell Huff Cog Aging 2022.pptx
@@ -176,7 +176,7 @@
       </p:ext>
     </p:extLst>
   </p:cmAuthor>
-  <p:cmAuthor id="4" name="Nicholas Maxwell" initials="NM" lastIdx="3" clrIdx="3">
+  <p:cmAuthor id="4" name="Nicholas Maxwell" initials="NM" lastIdx="6" clrIdx="3">
     <p:extLst>
       <p:ext uri="{19B8F6BF-5375-455C-9EA6-DF929625EA0E}">
         <p15:presenceInfo xmlns:p15="http://schemas.microsoft.com/office/powerpoint/2012/main" userId="S::w10026941@usm.edu::1a044d9d-3e7b-4dec-96dd-0930cc4f0d43" providerId="AD"/>
@@ -221,6 +221,20 @@
     </pc:docChg>
   </pc:docChgLst>
 </pc:chgInfo>
+</file>
+
+<file path=ppt/comments/comment1.xml><?xml version="1.0" encoding="utf-8"?>
+<p:cmLst xmlns:a="http://schemas.openxmlformats.org/drawingml/2006/main" xmlns:r="http://schemas.openxmlformats.org/officeDocument/2006/relationships" xmlns:p="http://schemas.openxmlformats.org/presentationml/2006/main">
+  <p:cm authorId="4" dt="2022-03-03T11:27:51.966" idx="6">
+    <p:pos x="26236" y="18376"/>
+    <p:text>Take a look at the abstract</p:text>
+    <p:extLst>
+      <p:ext uri="{C676402C-5697-4E1C-873F-D02D1690AC5C}">
+        <p15:threadingInfo xmlns:p15="http://schemas.microsoft.com/office/powerpoint/2012/main" timeZoneBias="360"/>
+      </p:ext>
+    </p:extLst>
+  </p:cm>
+</p:cmLst>
 </file>
 
 <file path=ppt/handoutMasters/handoutMaster1.xml><?xml version="1.0" encoding="utf-8"?>
@@ -335,7 +349,7 @@
               <a:pPr>
                 <a:defRPr/>
               </a:pPr>
-              <a:t>3/2/2022</a:t>
+              <a:t>3/3/2022</a:t>
             </a:fld>
             <a:endParaRPr lang="en-US"/>
           </a:p>
@@ -557,7 +571,7 @@
               <a:pPr>
                 <a:defRPr/>
               </a:pPr>
-              <a:t>3/2/2022</a:t>
+              <a:t>3/3/2022</a:t>
             </a:fld>
             <a:endParaRPr lang="en-US"/>
           </a:p>
@@ -3256,8 +3270,8 @@
         </p:nvSpPr>
         <p:spPr>
           <a:xfrm>
-            <a:off x="80827" y="19693357"/>
-            <a:ext cx="12723695" cy="10186474"/>
+            <a:off x="80827" y="20356181"/>
+            <a:ext cx="12828928" cy="9523650"/>
           </a:xfrm>
           <a:prstGeom prst="roundRect">
             <a:avLst/>
@@ -3381,8 +3395,8 @@
         </p:nvSpPr>
         <p:spPr>
           <a:xfrm>
-            <a:off x="198790" y="2792378"/>
-            <a:ext cx="12663926" cy="16649403"/>
+            <a:off x="245829" y="2701636"/>
+            <a:ext cx="12663926" cy="17472084"/>
           </a:xfrm>
           <a:prstGeom prst="roundRect">
             <a:avLst>
@@ -3438,8 +3452,8 @@
         </p:nvSpPr>
         <p:spPr>
           <a:xfrm>
-            <a:off x="27831493" y="21226669"/>
-            <a:ext cx="14032117" cy="10091531"/>
+            <a:off x="27756465" y="19792890"/>
+            <a:ext cx="14107146" cy="11642966"/>
           </a:xfrm>
           <a:prstGeom prst="roundRect">
             <a:avLst/>
@@ -3495,8 +3509,8 @@
         </p:nvSpPr>
         <p:spPr bwMode="auto">
           <a:xfrm>
-            <a:off x="384647" y="3893177"/>
-            <a:ext cx="12359822" cy="15156382"/>
+            <a:off x="442474" y="3505200"/>
+            <a:ext cx="12663926" cy="13682546"/>
           </a:xfrm>
           <a:prstGeom prst="rect">
             <a:avLst/>
@@ -3529,7 +3543,7 @@
               <a:buSzPts val="1100"/>
             </a:pPr>
             <a:r>
-              <a:rPr lang="en-US" sz="3500" b="0" i="0" u="none" strike="noStrike" cap="none" dirty="0">
+              <a:rPr lang="en-US" sz="3150" b="0" i="0" u="none" strike="noStrike" cap="none" dirty="0">
                 <a:solidFill>
                   <a:srgbClr val="000090"/>
                 </a:solidFill>
@@ -3541,7 +3555,7 @@
               <a:t>In the Consonant-Vowel/Odd-Even switch task (CVOE, </a:t>
             </a:r>
             <a:r>
-              <a:rPr lang="en-US" sz="3500" b="0" i="0" u="none" strike="noStrike" cap="none" dirty="0" err="1">
+              <a:rPr lang="en-US" sz="3150" b="0" i="0" u="none" strike="noStrike" cap="none" dirty="0" err="1">
                 <a:solidFill>
                   <a:srgbClr val="000090"/>
                 </a:solidFill>
@@ -3553,7 +3567,7 @@
               <a:t>Minear</a:t>
             </a:r>
             <a:r>
-              <a:rPr lang="en-US" sz="3500" b="0" i="0" u="none" strike="noStrike" cap="none" dirty="0">
+              <a:rPr lang="en-US" sz="3150" b="0" i="0" u="none" strike="noStrike" cap="none" dirty="0">
                 <a:solidFill>
                   <a:srgbClr val="000090"/>
                 </a:solidFill>
@@ -3565,7 +3579,7 @@
               <a:t> &amp; Shah, 2008) </a:t>
             </a:r>
             <a:r>
-              <a:rPr lang="en-US" sz="3500" dirty="0">
+              <a:rPr lang="en-US" sz="3150" dirty="0">
                 <a:solidFill>
                   <a:srgbClr val="000090"/>
                 </a:solidFill>
@@ -3577,7 +3591,7 @@
               <a:t>participants view bivalent stimuli </a:t>
             </a:r>
             <a:r>
-              <a:rPr lang="en-US" sz="3500" b="0" i="0" u="none" strike="noStrike" cap="none" dirty="0">
+              <a:rPr lang="en-US" sz="3150" b="0" i="0" u="none" strike="noStrike" cap="none" dirty="0">
                 <a:solidFill>
                   <a:srgbClr val="000090"/>
                 </a:solidFill>
@@ -3586,10 +3600,10 @@
                 <a:cs typeface="Calibri"/>
                 <a:sym typeface="Calibri"/>
               </a:rPr>
-              <a:t>(e.g., A 08) and must quickly classify the letter (Consonant/Vowel) or the number (Odd/Even). Because participants complete </a:t>
-            </a:r>
-            <a:r>
-              <a:rPr lang="en-US" sz="3500" dirty="0">
+              <a:t>(e.g., A 08) quickly classify the letter (Consonant/Vowel) or the number (Odd/Even). Because participants complete </a:t>
+            </a:r>
+            <a:r>
+              <a:rPr lang="en-US" sz="3150" dirty="0">
                 <a:solidFill>
                   <a:srgbClr val="000090"/>
                 </a:solidFill>
@@ -3598,10 +3612,10 @@
                 <a:cs typeface="Calibri"/>
                 <a:sym typeface="Calibri"/>
               </a:rPr>
-              <a:t>both pure blocks (e.g., all trials are the CV task)</a:t>
-            </a:r>
-            <a:r>
-              <a:rPr lang="en-US" sz="3500" b="0" i="0" u="none" strike="noStrike" cap="none" dirty="0">
+              <a:t>pure blocks (e.g., all trials are the CV task)</a:t>
+            </a:r>
+            <a:r>
+              <a:rPr lang="en-US" sz="3150" b="0" i="0" u="none" strike="noStrike" cap="none" dirty="0">
                 <a:solidFill>
                   <a:srgbClr val="000090"/>
                 </a:solidFill>
@@ -3613,7 +3627,7 @@
               <a:t> and switch blocks (e.g., participants switch between both classification tasks), the CVOE paradigm allows for comparisons between </a:t>
             </a:r>
             <a:r>
-              <a:rPr lang="en-US" sz="3500" i="1" dirty="0">
+              <a:rPr lang="en-US" sz="3150" i="1" dirty="0">
                 <a:solidFill>
                   <a:srgbClr val="000090"/>
                 </a:solidFill>
@@ -3625,7 +3639,7 @@
               <a:t>global </a:t>
             </a:r>
             <a:r>
-              <a:rPr lang="en-US" sz="3500" dirty="0">
+              <a:rPr lang="en-US" sz="3150" dirty="0">
                 <a:solidFill>
                   <a:srgbClr val="000090"/>
                 </a:solidFill>
@@ -3637,7 +3651,7 @@
               <a:t>and </a:t>
             </a:r>
             <a:r>
-              <a:rPr lang="en-US" sz="3500" i="1" dirty="0">
+              <a:rPr lang="en-US" sz="3150" i="1" dirty="0">
                 <a:solidFill>
                   <a:srgbClr val="000090"/>
                 </a:solidFill>
@@ -3649,7 +3663,7 @@
               <a:t>local </a:t>
             </a:r>
             <a:r>
-              <a:rPr lang="en-US" sz="3500" dirty="0">
+              <a:rPr lang="en-US" sz="3150" dirty="0">
                 <a:solidFill>
                   <a:srgbClr val="000090"/>
                 </a:solidFill>
@@ -3661,7 +3675,7 @@
               <a:t>switch costs.</a:t>
             </a:r>
             <a:r>
-              <a:rPr lang="en-US" sz="3500" b="0" i="0" u="none" strike="noStrike" cap="none" dirty="0">
+              <a:rPr lang="en-US" sz="3150" b="0" i="0" u="none" strike="noStrike" cap="none" dirty="0">
                 <a:solidFill>
                   <a:srgbClr val="000090"/>
                 </a:solidFill>
@@ -3673,7 +3687,7 @@
               <a:t> </a:t>
             </a:r>
             <a:r>
-              <a:rPr lang="en-US" sz="3500" dirty="0">
+              <a:rPr lang="en-US" sz="3150" dirty="0">
                 <a:solidFill>
                   <a:srgbClr val="000090"/>
                 </a:solidFill>
@@ -3685,7 +3699,7 @@
               <a:t>G</a:t>
             </a:r>
             <a:r>
-              <a:rPr lang="en-US" sz="3500" b="0" i="0" u="none" strike="noStrike" cap="none" dirty="0">
+              <a:rPr lang="en-US" sz="3150" b="0" i="0" u="none" strike="noStrike" cap="none" dirty="0">
                 <a:solidFill>
                   <a:srgbClr val="000090"/>
                 </a:solidFill>
@@ -3697,7 +3711,7 @@
               <a:t>lobal costs (</a:t>
             </a:r>
             <a:r>
-              <a:rPr lang="en-US" sz="3500" dirty="0">
+              <a:rPr lang="en-US" sz="3150" dirty="0">
                 <a:solidFill>
                   <a:srgbClr val="000090"/>
                 </a:solidFill>
@@ -3709,7 +3723,7 @@
               <a:t>i.e., </a:t>
             </a:r>
             <a:r>
-              <a:rPr lang="en-US" sz="3500" b="0" i="0" u="none" strike="noStrike" cap="none" dirty="0">
+              <a:rPr lang="en-US" sz="3150" b="0" i="0" u="none" strike="noStrike" cap="none" dirty="0">
                 <a:solidFill>
                   <a:srgbClr val="000090"/>
                 </a:solidFill>
@@ -3718,7 +3732,19 @@
                 <a:cs typeface="Calibri"/>
                 <a:sym typeface="Calibri"/>
               </a:rPr>
-              <a:t>non-switch trials - pure trials) represent the cost of keeping multiple task-sets active in working memory. Alternatively, local costs (i.e., switch trials - non-switch trials) reflect task-set reconfiguration processes that occur due to switching.</a:t>
+              <a:t>non-switch trials - pure trials) represent the cost of keeping multiple task-sets active in working memory. Alternatively, local costs (i.e., switch trials - non-switch trials) reflect task-set reconfiguration processes that occur due to switching</a:t>
+            </a:r>
+            <a:r>
+              <a:rPr lang="en-US" sz="3150" dirty="0">
+                <a:solidFill>
+                  <a:srgbClr val="000090"/>
+                </a:solidFill>
+                <a:latin typeface="Calibri"/>
+                <a:ea typeface="Calibri"/>
+                <a:cs typeface="Calibri"/>
+                <a:sym typeface="Calibri"/>
+              </a:rPr>
+              <a:t>.</a:t>
             </a:r>
           </a:p>
           <a:p>
@@ -3737,7 +3763,7 @@
               </a:buClr>
               <a:buSzPts val="1100"/>
             </a:pPr>
-            <a:endParaRPr lang="en-US" sz="1100" dirty="0">
+            <a:endParaRPr lang="en-US" sz="600" dirty="0">
               <a:solidFill>
                 <a:srgbClr val="000090"/>
               </a:solidFill>
@@ -3764,7 +3790,7 @@
               <a:buSzPts val="1100"/>
             </a:pPr>
             <a:r>
-              <a:rPr lang="en-US" sz="3500" dirty="0">
+              <a:rPr lang="en-US" sz="3150" dirty="0">
                 <a:solidFill>
                   <a:srgbClr val="000090"/>
                 </a:solidFill>
@@ -3773,44 +3799,11 @@
                 <a:cs typeface="Calibri"/>
                 <a:sym typeface="Calibri"/>
               </a:rPr>
-              <a:t>Previous research has found that global costs for both RTs and error rates increase as a function of both age and Alzheimer's Disease (AD) diagnosis, while local costs show a decrease for RTs (Huff et al., 2015). However, previous work has used switch blocks in which switching occurs via a </a:t>
-            </a:r>
-            <a:r>
-              <a:rPr lang="en-US" sz="3500" b="0" i="0" u="none" strike="noStrike" cap="none" dirty="0">
-                <a:solidFill>
-                  <a:srgbClr val="000090"/>
-                </a:solidFill>
-                <a:latin typeface="Calibri"/>
-                <a:ea typeface="Calibri"/>
-                <a:cs typeface="Calibri"/>
-                <a:sym typeface="Calibri"/>
-              </a:rPr>
-              <a:t>predictable, alternating runs sequence (e.g., CV, CV, OE, OE, CV, CV). </a:t>
-            </a:r>
-            <a:r>
-              <a:rPr lang="en-US" sz="3500" dirty="0">
-                <a:solidFill>
-                  <a:srgbClr val="000090"/>
-                </a:solidFill>
-                <a:latin typeface="Calibri"/>
-                <a:ea typeface="Calibri"/>
-                <a:cs typeface="Calibri"/>
-                <a:sym typeface="Calibri"/>
-              </a:rPr>
-              <a:t>In the present, we compare alternating runs switching with random switching. Unlike alternating runs, the random switch block had no discernable pattern for participants to detect. We expected that this task would be more difficult for participants, particularly for older adults and individuals with mid AD status. Thus, we expected that differences in switch costs previously found using alternating runs would be exaggerated when switching was non-predictive.</a:t>
-            </a:r>
-            <a:endParaRPr lang="en-US" sz="3500" b="0" i="0" u="none" strike="noStrike" cap="none" dirty="0">
-              <a:solidFill>
-                <a:srgbClr val="000090"/>
-              </a:solidFill>
-              <a:latin typeface="Calibri"/>
-              <a:ea typeface="Calibri"/>
-              <a:cs typeface="Calibri"/>
-              <a:sym typeface="Calibri"/>
-            </a:endParaRPr>
-          </a:p>
-          <a:p>
-            <a:pPr marL="0" marR="0" lvl="0" indent="0" algn="l" rtl="0">
+              <a:t>Previous research has shown global costs for both errors and response times (RTs) increase with age and for individuals with mild cognitive impairments (MCI; e.g., Alzheimer's Disease), while these conditions decrease local costs for RTs (Huff et al., 2015). Furthermore, Huff et al. showed that distributional analyses of RTs (e.g., Vincentile plots) reveal dissociations between local and global switch costs, such that global costs increase while local costs decrease.</a:t>
+            </a:r>
+          </a:p>
+          <a:p>
+            <a:pPr lvl="0">
               <a:lnSpc>
                 <a:spcPct val="107916"/>
               </a:lnSpc>
@@ -3824,21 +3817,69 @@
                 <a:schemeClr val="dk1"/>
               </a:buClr>
               <a:buSzPts val="1100"/>
-              <a:buFont typeface="Arial"/>
-              <a:buNone/>
             </a:pPr>
-            <a:endParaRPr lang="en-US" sz="3600" dirty="0">
+            <a:endParaRPr lang="en-US" sz="600" dirty="0">
               <a:solidFill>
-                <a:schemeClr val="dk1"/>
+                <a:srgbClr val="000090"/>
               </a:solidFill>
-              <a:highlight>
-                <a:srgbClr val="FFFF00"/>
-              </a:highlight>
               <a:latin typeface="Calibri"/>
               <a:ea typeface="Calibri"/>
               <a:cs typeface="Calibri"/>
               <a:sym typeface="Calibri"/>
             </a:endParaRPr>
+          </a:p>
+          <a:p>
+            <a:pPr lvl="0">
+              <a:lnSpc>
+                <a:spcPct val="107916"/>
+              </a:lnSpc>
+              <a:spcBef>
+                <a:spcPts val="800"/>
+              </a:spcBef>
+              <a:spcAft>
+                <a:spcPts val="0"/>
+              </a:spcAft>
+              <a:buClr>
+                <a:schemeClr val="dk1"/>
+              </a:buClr>
+              <a:buSzPts val="1100"/>
+            </a:pPr>
+            <a:r>
+              <a:rPr lang="en-US" sz="3150" dirty="0">
+                <a:solidFill>
+                  <a:srgbClr val="000090"/>
+                </a:solidFill>
+                <a:latin typeface="Calibri"/>
+                <a:ea typeface="Calibri"/>
+                <a:cs typeface="Calibri"/>
+                <a:sym typeface="Calibri"/>
+              </a:rPr>
+              <a:t>Studies investigating CVOE task switching have often used presented trials via a </a:t>
+            </a:r>
+            <a:r>
+              <a:rPr lang="en-US" sz="3150" b="0" i="0" u="none" strike="noStrike" cap="none" dirty="0">
+                <a:solidFill>
+                  <a:srgbClr val="000090"/>
+                </a:solidFill>
+                <a:latin typeface="Calibri"/>
+                <a:ea typeface="Calibri"/>
+                <a:cs typeface="Calibri"/>
+                <a:sym typeface="Calibri"/>
+              </a:rPr>
+              <a:t>predictable, alternating runs sequence (e.g., CV, CV, OE, OE, CV, CV). </a:t>
+            </a:r>
+            <a:r>
+              <a:rPr lang="en-US" sz="3150" dirty="0">
+                <a:solidFill>
+                  <a:srgbClr val="000090"/>
+                </a:solidFill>
+                <a:latin typeface="Calibri"/>
+                <a:ea typeface="Calibri"/>
+                <a:cs typeface="Calibri"/>
+                <a:sym typeface="Calibri"/>
+              </a:rPr>
+              <a:t>The present study expands upon this by comparing alternating runs switching with random switching. Unlike an alternating runs sequence, random switching has no discernable pattern. As a result, we expected participants would find the random switching task more difficult, and that these difficulties would be reflected in greater error rates and RTs compared to alternating runs switching. Furthermore, given breakdowns in working memory and attentional control processes that are associated with AD, we expected that MCI older adults would particularly struggle with the random switch task. Thus, we expected that differences in switch costs previously found using alternating runs would be particularly exaggerated for these individuals when switching was non-predictive.</a:t>
+            </a:r>
           </a:p>
         </p:txBody>
       </p:sp>
@@ -3852,7 +3893,7 @@
         </p:nvSpPr>
         <p:spPr bwMode="auto">
           <a:xfrm>
-            <a:off x="1264835" y="19882495"/>
+            <a:off x="1264835" y="20336620"/>
             <a:ext cx="10617200" cy="1508105"/>
           </a:xfrm>
           <a:prstGeom prst="rect">
@@ -3902,8 +3943,8 @@
         </p:nvSpPr>
         <p:spPr bwMode="auto">
           <a:xfrm>
-            <a:off x="28037926" y="21445781"/>
-            <a:ext cx="13943647" cy="9127641"/>
+            <a:off x="27910963" y="20497800"/>
+            <a:ext cx="13886494" cy="10090582"/>
           </a:xfrm>
           <a:prstGeom prst="rect">
             <a:avLst/>
@@ -3920,23 +3961,122 @@
           <a:bodyPr lIns="170682" tIns="67367" rIns="170682" bIns="67367"/>
           <a:lstStyle/>
           <a:p>
-            <a:pPr algn="ctr" defTabSz="1347788" eaLnBrk="0" hangingPunct="0"/>
-            <a:r>
-              <a:rPr lang="en-US" sz="4800" b="1" u="sng" dirty="0">
-                <a:solidFill>
-                  <a:srgbClr val="0080FF"/>
-                </a:solidFill>
+            <a:pPr defTabSz="1347788" eaLnBrk="0" hangingPunct="0">
+              <a:spcBef>
+                <a:spcPts val="800"/>
+              </a:spcBef>
+            </a:pPr>
+            <a:r>
+              <a:rPr lang="en-US" sz="3150" dirty="0">
+                <a:solidFill>
+                  <a:srgbClr val="000090"/>
+                </a:solidFill>
+                <a:latin typeface="Calibri"/>
+                <a:cs typeface="Calibri"/>
               </a:rPr>
-              <a:t>Conclusions</a:t>
-            </a:r>
-          </a:p>
-          <a:p>
-            <a:pPr defTabSz="1347788" eaLnBrk="0" hangingPunct="0"/>
-            <a:endParaRPr lang="en-US" sz="6000" dirty="0">
+              <a:t>Across trial types, MCI older adults produced more errors compared to younger and healthy older adults. Additionally, both older adult groups provided consistently slower responses. Regarding mean switch costs for errors, MCI individuals had greater global switch costs (regardless of presentation mode) compared to younger and healthy older adults. For local costs, MCI older adults again showed greater costs, but only when switching was predictive. For RT switch costs, older adults showed greater global costs compared to younger adults, though no differences in local costs were detected between groups. </a:t>
+            </a:r>
+          </a:p>
+          <a:p>
+            <a:pPr defTabSz="1347788" eaLnBrk="0" hangingPunct="0">
+              <a:spcBef>
+                <a:spcPts val="800"/>
+              </a:spcBef>
+            </a:pPr>
+            <a:endParaRPr lang="en-US" sz="600" dirty="0">
               <a:solidFill>
                 <a:srgbClr val="000090"/>
               </a:solidFill>
+              <a:latin typeface="Calibri"/>
+              <a:cs typeface="Calibri"/>
             </a:endParaRPr>
+          </a:p>
+          <a:p>
+            <a:pPr defTabSz="1347788" eaLnBrk="0" hangingPunct="0">
+              <a:spcBef>
+                <a:spcPts val="800"/>
+              </a:spcBef>
+            </a:pPr>
+            <a:r>
+              <a:rPr lang="en-US" sz="3150" dirty="0">
+                <a:solidFill>
+                  <a:srgbClr val="000090"/>
+                </a:solidFill>
+                <a:latin typeface="Calibri"/>
+                <a:cs typeface="Calibri"/>
+              </a:rPr>
+              <a:t>Vincentile plots were then used to further assess changes in switch cost RTs. Starting with local costs, all groups showed decreased costs across bins. For alternating runs switching, healthy older adults showed decreases in costs relative to younger adults and MCI older adults. For global costs, all groups showed increases across bins. These increases were greater for alternating runs switching relative to random switching. Finally, an ex-</a:t>
+            </a:r>
+            <a:r>
+              <a:rPr lang="en-US" sz="3150" dirty="0" err="1">
+                <a:solidFill>
+                  <a:srgbClr val="000090"/>
+                </a:solidFill>
+                <a:latin typeface="Calibri"/>
+                <a:cs typeface="Calibri"/>
+              </a:rPr>
+              <a:t>Guassian</a:t>
+            </a:r>
+            <a:r>
+              <a:rPr lang="en-US" sz="3150" dirty="0">
+                <a:solidFill>
+                  <a:srgbClr val="000090"/>
+                </a:solidFill>
+                <a:latin typeface="Calibri"/>
+                <a:cs typeface="Calibri"/>
+              </a:rPr>
+              <a:t> analysis of RTs indicated that both older adult groups had greater mean Tau values relative to younger adults, indicating that.. </a:t>
+            </a:r>
+            <a:r>
+              <a:rPr lang="en-US" sz="3150" dirty="0">
+                <a:solidFill>
+                  <a:srgbClr val="000090"/>
+                </a:solidFill>
+                <a:highlight>
+                  <a:srgbClr val="FFFF00"/>
+                </a:highlight>
+                <a:latin typeface="Calibri"/>
+                <a:cs typeface="Calibri"/>
+              </a:rPr>
+              <a:t>[Expand]</a:t>
+            </a:r>
+          </a:p>
+          <a:p>
+            <a:pPr defTabSz="1347788" eaLnBrk="0" hangingPunct="0">
+              <a:spcBef>
+                <a:spcPts val="800"/>
+              </a:spcBef>
+            </a:pPr>
+            <a:endParaRPr lang="en-US" sz="600" dirty="0">
+              <a:solidFill>
+                <a:srgbClr val="000090"/>
+              </a:solidFill>
+              <a:highlight>
+                <a:srgbClr val="FFFF00"/>
+              </a:highlight>
+              <a:latin typeface="Calibri"/>
+              <a:cs typeface="Calibri"/>
+            </a:endParaRPr>
+          </a:p>
+          <a:p>
+            <a:pPr defTabSz="1347788" eaLnBrk="0" hangingPunct="0">
+              <a:spcBef>
+                <a:spcPts val="800"/>
+              </a:spcBef>
+            </a:pPr>
+            <a:r>
+              <a:rPr lang="en-US" sz="3150" dirty="0">
+                <a:solidFill>
+                  <a:srgbClr val="000090"/>
+                </a:solidFill>
+                <a:highlight>
+                  <a:srgbClr val="FFFF00"/>
+                </a:highlight>
+                <a:latin typeface="Calibri"/>
+                <a:cs typeface="Calibri"/>
+              </a:rPr>
+              <a:t>Overall, our findings show that presentation mode does not affect mean errors, RTs, or their respective switch costs. Instead, differences occurred primarily as functions of age and health. </a:t>
+            </a:r>
           </a:p>
         </p:txBody>
       </p:sp>
@@ -3948,8 +4088,8 @@
         </p:nvSpPr>
         <p:spPr>
           <a:xfrm>
-            <a:off x="27849985" y="2739506"/>
-            <a:ext cx="14050609" cy="18291694"/>
+            <a:off x="27736801" y="2739506"/>
+            <a:ext cx="14163794" cy="16843894"/>
           </a:xfrm>
           <a:prstGeom prst="roundRect">
             <a:avLst/>
@@ -4139,8 +4279,8 @@
         </p:nvSpPr>
         <p:spPr>
           <a:xfrm>
-            <a:off x="13044588" y="2841774"/>
-            <a:ext cx="14603931" cy="7848649"/>
+            <a:off x="13185058" y="2841774"/>
+            <a:ext cx="14251750" cy="7848649"/>
           </a:xfrm>
           <a:prstGeom prst="roundRect">
             <a:avLst>
@@ -4199,7 +4339,7 @@
         <p:spPr bwMode="auto">
           <a:xfrm>
             <a:off x="15106959" y="2819400"/>
-            <a:ext cx="10617200" cy="1600438"/>
+            <a:ext cx="10617200" cy="1508105"/>
           </a:xfrm>
           <a:prstGeom prst="rect">
             <a:avLst/>
@@ -4220,7 +4360,7 @@
           <a:p>
             <a:pPr algn="ctr" defTabSz="1347788" eaLnBrk="0" hangingPunct="0"/>
             <a:r>
-              <a:rPr lang="en-US" sz="5400" b="1" u="sng" dirty="0">
+              <a:rPr lang="en-US" sz="4800" b="1" u="sng" dirty="0">
                 <a:solidFill>
                   <a:srgbClr val="0080FF"/>
                 </a:solidFill>
@@ -4246,8 +4386,8 @@
         </p:nvSpPr>
         <p:spPr>
           <a:xfrm>
-            <a:off x="12974774" y="10820449"/>
-            <a:ext cx="14599170" cy="20615407"/>
+            <a:off x="13185058" y="10820449"/>
+            <a:ext cx="14304097" cy="20615407"/>
           </a:xfrm>
           <a:prstGeom prst="roundRect">
             <a:avLst/>
@@ -4434,7 +4574,7 @@
         </p:nvSpPr>
         <p:spPr bwMode="auto">
           <a:xfrm>
-            <a:off x="15773400" y="10744200"/>
+            <a:off x="16002000" y="10744200"/>
             <a:ext cx="9372600" cy="1431161"/>
           </a:xfrm>
           <a:prstGeom prst="rect">
@@ -4479,46 +4619,6 @@
                 <a:srgbClr val="0000FF"/>
               </a:solidFill>
             </a:endParaRPr>
-          </a:p>
-        </p:txBody>
-      </p:sp>
-      <p:sp>
-        <p:nvSpPr>
-          <p:cNvPr id="130" name="TextBox 129">
-            <a:extLst>
-              <a:ext uri="{FF2B5EF4-FFF2-40B4-BE49-F238E27FC236}">
-                <a16:creationId xmlns:a16="http://schemas.microsoft.com/office/drawing/2014/main" id="{BE118301-E727-413A-BB42-47203528E0D8}"/>
-              </a:ext>
-            </a:extLst>
-          </p:cNvPr>
-          <p:cNvSpPr txBox="1"/>
-          <p:nvPr/>
-        </p:nvSpPr>
-        <p:spPr>
-          <a:xfrm>
-            <a:off x="39167302" y="20021235"/>
-            <a:ext cx="1885453" cy="400110"/>
-          </a:xfrm>
-          <a:prstGeom prst="rect">
-            <a:avLst/>
-          </a:prstGeom>
-          <a:noFill/>
-        </p:spPr>
-        <p:txBody>
-          <a:bodyPr wrap="none" rtlCol="0">
-            <a:spAutoFit/>
-          </a:bodyPr>
-          <a:lstStyle/>
-          <a:p>
-            <a:pPr algn="ctr"/>
-            <a:r>
-              <a:rPr lang="en-US" sz="2000" b="1" dirty="0">
-                <a:solidFill>
-                  <a:srgbClr val="000090"/>
-                </a:solidFill>
-              </a:rPr>
-              <a:t>Bars = 95% CI</a:t>
-            </a:r>
           </a:p>
         </p:txBody>
       </p:sp>
@@ -4856,46 +4956,6 @@
       </p:sp>
       <p:sp>
         <p:nvSpPr>
-          <p:cNvPr id="11" name="TextBox 10">
-            <a:extLst>
-              <a:ext uri="{FF2B5EF4-FFF2-40B4-BE49-F238E27FC236}">
-                <a16:creationId xmlns:a16="http://schemas.microsoft.com/office/drawing/2014/main" id="{D6A2EED3-9446-44F0-A529-DD37A13D3D0C}"/>
-              </a:ext>
-            </a:extLst>
-          </p:cNvPr>
-          <p:cNvSpPr txBox="1"/>
-          <p:nvPr/>
-        </p:nvSpPr>
-        <p:spPr>
-          <a:xfrm>
-            <a:off x="24460200" y="30632400"/>
-            <a:ext cx="1885453" cy="400110"/>
-          </a:xfrm>
-          <a:prstGeom prst="rect">
-            <a:avLst/>
-          </a:prstGeom>
-          <a:noFill/>
-        </p:spPr>
-        <p:txBody>
-          <a:bodyPr wrap="none" rtlCol="0">
-            <a:spAutoFit/>
-          </a:bodyPr>
-          <a:lstStyle/>
-          <a:p>
-            <a:pPr algn="ctr"/>
-            <a:r>
-              <a:rPr lang="en-US" sz="2000" b="1" dirty="0">
-                <a:solidFill>
-                  <a:srgbClr val="000090"/>
-                </a:solidFill>
-              </a:rPr>
-              <a:t>Bars = 95% CI</a:t>
-            </a:r>
-          </a:p>
-        </p:txBody>
-      </p:sp>
-      <p:sp>
-        <p:nvSpPr>
           <p:cNvPr id="58" name="Google Shape;459;p29">
             <a:extLst>
               <a:ext uri="{FF2B5EF4-FFF2-40B4-BE49-F238E27FC236}">
@@ -4960,7 +5020,7 @@
               <a:buNone/>
             </a:pPr>
             <a:r>
-              <a:rPr lang="en-US" sz="4400" b="1" i="0" u="none" strike="noStrike" cap="none" dirty="0">
+              <a:rPr lang="en-US" sz="5000" b="1" i="0" u="none" strike="noStrike" cap="none" dirty="0">
                 <a:solidFill>
                   <a:srgbClr val="FFFFFF"/>
                 </a:solidFill>
@@ -4971,7 +5031,7 @@
               </a:rPr>
               <a:t>MoCA</a:t>
             </a:r>
-            <a:endParaRPr sz="4400" b="1" i="0" u="none" strike="noStrike" cap="none" dirty="0">
+            <a:endParaRPr sz="5000" b="1" i="0" u="none" strike="noStrike" cap="none" dirty="0">
               <a:solidFill>
                 <a:srgbClr val="FFFFFF"/>
               </a:solidFill>
@@ -5049,7 +5109,7 @@
               <a:buNone/>
             </a:pPr>
             <a:r>
-              <a:rPr lang="en-US" sz="4400" b="1" i="0" u="none" strike="noStrike" cap="none" dirty="0">
+              <a:rPr lang="en-US" sz="5000" b="1" i="0" u="none" strike="noStrike" cap="none" dirty="0">
                 <a:solidFill>
                   <a:srgbClr val="FFFFFF"/>
                 </a:solidFill>
@@ -5177,7 +5237,7 @@
                 <a:buNone/>
               </a:pPr>
               <a:r>
-                <a:rPr lang="en-US" sz="4400" b="1" i="0" u="none" strike="noStrike" cap="none" dirty="0">
+                <a:rPr lang="en-US" sz="5000" b="1" i="0" u="none" strike="noStrike" cap="none" dirty="0">
                   <a:solidFill>
                     <a:srgbClr val="FFFFFF"/>
                   </a:solidFill>
@@ -5188,7 +5248,7 @@
                 </a:rPr>
                 <a:t>Pure Blocks</a:t>
               </a:r>
-              <a:endParaRPr sz="1400" b="0" i="0" u="none" strike="noStrike" cap="none" dirty="0">
+              <a:endParaRPr sz="5000" b="0" i="0" u="none" strike="noStrike" cap="none" dirty="0">
                 <a:solidFill>
                   <a:srgbClr val="000000"/>
                 </a:solidFill>
@@ -5371,7 +5431,7 @@
         </p:nvSpPr>
         <p:spPr>
           <a:xfrm>
-            <a:off x="-76200" y="26646762"/>
+            <a:off x="-76200" y="26715600"/>
             <a:ext cx="3626700" cy="3916800"/>
           </a:xfrm>
           <a:prstGeom prst="rect">
@@ -5659,7 +5719,7 @@
         </p:nvSpPr>
         <p:spPr>
           <a:xfrm>
-            <a:off x="3276600" y="26579318"/>
+            <a:off x="3276600" y="26680500"/>
             <a:ext cx="4684500" cy="3647100"/>
           </a:xfrm>
           <a:prstGeom prst="rect">
@@ -5947,7 +6007,7 @@
         </p:nvSpPr>
         <p:spPr>
           <a:xfrm>
-            <a:off x="8040900" y="26577905"/>
+            <a:off x="8040900" y="26641800"/>
             <a:ext cx="4684500" cy="3000000"/>
           </a:xfrm>
           <a:prstGeom prst="rect">
@@ -6209,8 +6269,8 @@
         </p:nvSpPr>
         <p:spPr bwMode="auto">
           <a:xfrm>
-            <a:off x="785547" y="2972370"/>
-            <a:ext cx="10617200" cy="1600438"/>
+            <a:off x="1346200" y="2667000"/>
+            <a:ext cx="10617200" cy="1508105"/>
           </a:xfrm>
           <a:prstGeom prst="rect">
             <a:avLst/>
@@ -6231,7 +6291,7 @@
           <a:p>
             <a:pPr algn="ctr" defTabSz="1347788" eaLnBrk="0" hangingPunct="0"/>
             <a:r>
-              <a:rPr lang="en-US" sz="5400" b="1" u="sng" dirty="0">
+              <a:rPr lang="en-US" sz="4800" b="1" u="sng" dirty="0">
                 <a:solidFill>
                   <a:srgbClr val="0080FF"/>
                 </a:solidFill>
@@ -6298,7 +6358,7 @@
               <a:buNone/>
             </a:pPr>
             <a:r>
-              <a:rPr lang="en-US" sz="3400" b="1" i="0" u="none" strike="noStrike" cap="none" dirty="0">
+              <a:rPr lang="en-US" sz="3200" b="1" i="0" u="sng" strike="noStrike" cap="none" dirty="0">
                 <a:solidFill>
                   <a:srgbClr val="000090"/>
                 </a:solidFill>
@@ -6307,10 +6367,10 @@
                 <a:cs typeface="Calibri"/>
                 <a:sym typeface="Calibri"/>
               </a:rPr>
-              <a:t>Note: </a:t>
-            </a:r>
-            <a:r>
-              <a:rPr lang="en-US" sz="3400" b="0" i="0" u="none" strike="noStrike" cap="none" dirty="0">
+              <a:t>Note</a:t>
+            </a:r>
+            <a:r>
+              <a:rPr lang="en-US" sz="3200" b="1" i="0" u="none" strike="noStrike" cap="none" dirty="0">
                 <a:solidFill>
                   <a:srgbClr val="000090"/>
                 </a:solidFill>
@@ -6319,10 +6379,10 @@
                 <a:cs typeface="Calibri"/>
                 <a:sym typeface="Calibri"/>
               </a:rPr>
-              <a:t>Participants completed </a:t>
-            </a:r>
-            <a:r>
-              <a:rPr lang="en-US" sz="3400" dirty="0">
+              <a:t>: </a:t>
+            </a:r>
+            <a:r>
+              <a:rPr lang="en-US" sz="3200" b="0" i="0" u="none" strike="noStrike" cap="none" dirty="0">
                 <a:solidFill>
                   <a:srgbClr val="000090"/>
                 </a:solidFill>
@@ -6331,10 +6391,10 @@
                 <a:cs typeface="Calibri"/>
                 <a:sym typeface="Calibri"/>
               </a:rPr>
-              <a:t>blocks</a:t>
-            </a:r>
-            <a:r>
-              <a:rPr lang="en-US" sz="3400" b="0" i="0" u="none" strike="noStrike" cap="none" dirty="0">
+              <a:t>Participants completed four </a:t>
+            </a:r>
+            <a:r>
+              <a:rPr lang="en-US" sz="3200" dirty="0">
                 <a:solidFill>
                   <a:srgbClr val="000090"/>
                 </a:solidFill>
@@ -6343,9 +6403,21 @@
                 <a:cs typeface="Calibri"/>
                 <a:sym typeface="Calibri"/>
               </a:rPr>
-              <a:t>. The first two blocks always contained pure trials (CV or OE). The final two sets of trials were always switch blocks (Alt Runs or Random)</a:t>
-            </a:r>
-            <a:endParaRPr sz="3400" b="0" i="0" u="none" strike="noStrike" cap="none" dirty="0">
+              <a:t>blocks (CV, OE, Alt Runs, and Random)</a:t>
+            </a:r>
+            <a:r>
+              <a:rPr lang="en-US" sz="3200" b="0" i="0" u="none" strike="noStrike" cap="none" dirty="0">
+                <a:solidFill>
+                  <a:srgbClr val="000090"/>
+                </a:solidFill>
+                <a:latin typeface="Calibri"/>
+                <a:ea typeface="Calibri"/>
+                <a:cs typeface="Calibri"/>
+                <a:sym typeface="Calibri"/>
+              </a:rPr>
+              <a:t>. The first two blocks always contained pure trials (CV or OE). The final two sets of trials were always switch blocks (Alt Runs or Random).</a:t>
+            </a:r>
+            <a:endParaRPr sz="3200" b="0" i="0" u="none" strike="noStrike" cap="none" dirty="0">
               <a:solidFill>
                 <a:srgbClr val="000090"/>
               </a:solidFill>
@@ -6372,13 +6444,13 @@
           <p:nvPr>
             <p:extLst>
               <p:ext uri="{D42A27DB-BD31-4B8C-83A1-F6EECF244321}">
-                <p14:modId xmlns:p14="http://schemas.microsoft.com/office/powerpoint/2010/main" val="673676625"/>
+                <p14:modId xmlns:p14="http://schemas.microsoft.com/office/powerpoint/2010/main" val="398748063"/>
               </p:ext>
             </p:extLst>
           </p:nvPr>
         </p:nvGraphicFramePr>
         <p:xfrm>
-          <a:off x="389545" y="21031200"/>
+          <a:off x="389545" y="21485325"/>
           <a:ext cx="12031055" cy="3279675"/>
         </p:xfrm>
         <a:graphic>
@@ -6759,8 +6831,11 @@
                           <a:solidFill>
                             <a:srgbClr val="000090"/>
                           </a:solidFill>
+                          <a:highlight>
+                            <a:srgbClr val="FFFF00"/>
+                          </a:highlight>
                         </a:rPr>
-                        <a:t>Young Adults</a:t>
+                        <a:t>Younger Adults</a:t>
                       </a:r>
                     </a:p>
                   </a:txBody>
@@ -7475,7 +7550,7 @@
         </p:nvSpPr>
         <p:spPr bwMode="auto">
           <a:xfrm>
-            <a:off x="1219200" y="24536400"/>
+            <a:off x="1219200" y="24857095"/>
             <a:ext cx="10617200" cy="1508105"/>
           </a:xfrm>
           <a:prstGeom prst="rect">
@@ -7529,7 +7604,7 @@
         </p:nvSpPr>
         <p:spPr>
           <a:xfrm>
-            <a:off x="393524" y="25699368"/>
+            <a:off x="393524" y="25871269"/>
             <a:ext cx="7227171" cy="646331"/>
           </a:xfrm>
           <a:prstGeom prst="rect">
@@ -7549,14 +7624,22 @@
                   <a:srgbClr val="000090"/>
                 </a:solidFill>
               </a:rPr>
-              <a:t>Letters:</a:t>
+              <a:t>Letters</a:t>
+            </a:r>
+            <a:r>
+              <a:rPr lang="en-US" sz="3600" b="1" dirty="0">
+                <a:solidFill>
+                  <a:srgbClr val="000090"/>
+                </a:solidFill>
+              </a:rPr>
+              <a:t>:</a:t>
             </a:r>
             <a:r>
               <a:rPr lang="en-US" sz="3600" dirty="0"/>
               <a:t> </a:t>
             </a:r>
             <a:r>
-              <a:rPr lang="en-US" sz="3600" dirty="0">
+              <a:rPr lang="en-US" sz="3500" dirty="0">
                 <a:solidFill>
                   <a:srgbClr val="000090"/>
                 </a:solidFill>
@@ -7580,7 +7663,7 @@
         </p:nvSpPr>
         <p:spPr>
           <a:xfrm>
-            <a:off x="8534400" y="25679400"/>
+            <a:off x="8839200" y="25871269"/>
             <a:ext cx="6644850" cy="646331"/>
           </a:xfrm>
           <a:prstGeom prst="rect">
@@ -7595,19 +7678,27 @@
           <a:lstStyle/>
           <a:p>
             <a:r>
+              <a:rPr lang="en-US" sz="3600" b="1" u="sng" dirty="0">
+                <a:solidFill>
+                  <a:srgbClr val="000090"/>
+                </a:solidFill>
+              </a:rPr>
+              <a:t>Numbers</a:t>
+            </a:r>
+            <a:r>
               <a:rPr lang="en-US" sz="3600" b="1" dirty="0">
                 <a:solidFill>
                   <a:srgbClr val="000090"/>
                 </a:solidFill>
               </a:rPr>
-              <a:t>Numbers:</a:t>
+              <a:t>:</a:t>
             </a:r>
             <a:r>
               <a:rPr lang="en-US" sz="3600" dirty="0"/>
               <a:t> </a:t>
             </a:r>
             <a:r>
-              <a:rPr lang="en-US" sz="3600" dirty="0">
+              <a:rPr lang="en-US" sz="3500" dirty="0">
                 <a:solidFill>
                   <a:srgbClr val="000090"/>
                 </a:solidFill>
@@ -7633,8 +7724,8 @@
         </p:nvSpPr>
         <p:spPr bwMode="auto">
           <a:xfrm>
-            <a:off x="30542918" y="3810000"/>
-            <a:ext cx="9372600" cy="1308050"/>
+            <a:off x="30542918" y="3657600"/>
+            <a:ext cx="9372600" cy="1246495"/>
           </a:xfrm>
           <a:prstGeom prst="rect">
             <a:avLst/>
@@ -7655,7 +7746,7 @@
           <a:p>
             <a:pPr algn="ctr" defTabSz="1347788" eaLnBrk="0" hangingPunct="0"/>
             <a:r>
-              <a:rPr lang="en-US" sz="4000" b="1" u="sng" dirty="0">
+              <a:rPr lang="en-US" sz="3600" b="1" u="sng" dirty="0">
                 <a:solidFill>
                   <a:srgbClr val="000090"/>
                 </a:solidFill>
@@ -7697,7 +7788,68 @@
         </p:nvSpPr>
         <p:spPr bwMode="auto">
           <a:xfrm>
-            <a:off x="15849600" y="20514439"/>
+            <a:off x="16078200" y="20453628"/>
+            <a:ext cx="9372600" cy="1415772"/>
+          </a:xfrm>
+          <a:prstGeom prst="rect">
+            <a:avLst/>
+          </a:prstGeom>
+          <a:noFill/>
+          <a:ln w="9525">
+            <a:noFill/>
+            <a:miter lim="800000"/>
+            <a:headEnd/>
+            <a:tailEnd/>
+          </a:ln>
+        </p:spPr>
+        <p:txBody>
+          <a:bodyPr wrap="square">
+            <a:spAutoFit/>
+          </a:bodyPr>
+          <a:lstStyle/>
+          <a:p>
+            <a:pPr algn="ctr" defTabSz="1347788" eaLnBrk="0" hangingPunct="0"/>
+            <a:r>
+              <a:rPr lang="en-US" sz="4800" b="1" u="sng" dirty="0">
+                <a:solidFill>
+                  <a:srgbClr val="0080FF"/>
+                </a:solidFill>
+              </a:rPr>
+              <a:t>Results: Mean RTs</a:t>
+            </a:r>
+            <a:endParaRPr lang="en-US" sz="4800" b="1" dirty="0">
+              <a:solidFill>
+                <a:srgbClr val="0000FF"/>
+              </a:solidFill>
+            </a:endParaRPr>
+          </a:p>
+          <a:p>
+            <a:pPr algn="ctr" defTabSz="1347788" eaLnBrk="0" hangingPunct="0"/>
+            <a:endParaRPr lang="en-US" sz="3800" b="1" dirty="0">
+              <a:solidFill>
+                <a:srgbClr val="0000FF"/>
+              </a:solidFill>
+            </a:endParaRPr>
+          </a:p>
+        </p:txBody>
+      </p:sp>
+      <p:sp>
+        <p:nvSpPr>
+          <p:cNvPr id="68" name="TextBox 24">
+            <a:extLst>
+              <a:ext uri="{FF2B5EF4-FFF2-40B4-BE49-F238E27FC236}">
+                <a16:creationId xmlns:a16="http://schemas.microsoft.com/office/drawing/2014/main" id="{CEE74527-5561-4DF8-9CAE-3BE335885B22}"/>
+              </a:ext>
+            </a:extLst>
+          </p:cNvPr>
+          <p:cNvSpPr txBox="1">
+            <a:spLocks noChangeArrowheads="1"/>
+          </p:cNvSpPr>
+          <p:nvPr/>
+        </p:nvSpPr>
+        <p:spPr bwMode="auto">
+          <a:xfrm>
+            <a:off x="30418236" y="13487400"/>
             <a:ext cx="9372600" cy="1431161"/>
           </a:xfrm>
           <a:prstGeom prst="rect">
@@ -7724,68 +7876,7 @@
                   <a:srgbClr val="0080FF"/>
                 </a:solidFill>
               </a:rPr>
-              <a:t>Results: Mean RTs</a:t>
-            </a:r>
-            <a:endParaRPr lang="en-US" sz="100" b="1" dirty="0">
-              <a:solidFill>
-                <a:srgbClr val="0000FF"/>
-              </a:solidFill>
-            </a:endParaRPr>
-          </a:p>
-          <a:p>
-            <a:pPr algn="ctr" defTabSz="1347788" eaLnBrk="0" hangingPunct="0"/>
-            <a:endParaRPr lang="en-US" sz="3800" b="1" dirty="0">
-              <a:solidFill>
-                <a:srgbClr val="0000FF"/>
-              </a:solidFill>
-            </a:endParaRPr>
-          </a:p>
-        </p:txBody>
-      </p:sp>
-      <p:sp>
-        <p:nvSpPr>
-          <p:cNvPr id="68" name="TextBox 24">
-            <a:extLst>
-              <a:ext uri="{FF2B5EF4-FFF2-40B4-BE49-F238E27FC236}">
-                <a16:creationId xmlns:a16="http://schemas.microsoft.com/office/drawing/2014/main" id="{CEE74527-5561-4DF8-9CAE-3BE335885B22}"/>
-              </a:ext>
-            </a:extLst>
-          </p:cNvPr>
-          <p:cNvSpPr txBox="1">
-            <a:spLocks noChangeArrowheads="1"/>
-          </p:cNvSpPr>
-          <p:nvPr/>
-        </p:nvSpPr>
-        <p:spPr bwMode="auto">
-          <a:xfrm>
-            <a:off x="30418236" y="14097000"/>
-            <a:ext cx="9372600" cy="1431161"/>
-          </a:xfrm>
-          <a:prstGeom prst="rect">
-            <a:avLst/>
-          </a:prstGeom>
-          <a:noFill/>
-          <a:ln w="9525">
-            <a:noFill/>
-            <a:miter lim="800000"/>
-            <a:headEnd/>
-            <a:tailEnd/>
-          </a:ln>
-        </p:spPr>
-        <p:txBody>
-          <a:bodyPr wrap="square">
-            <a:spAutoFit/>
-          </a:bodyPr>
-          <a:lstStyle/>
-          <a:p>
-            <a:pPr algn="ctr" defTabSz="1347788" eaLnBrk="0" hangingPunct="0"/>
-            <a:r>
-              <a:rPr lang="en-US" sz="4800" b="1" u="sng" dirty="0">
-                <a:solidFill>
-                  <a:srgbClr val="0080FF"/>
-                </a:solidFill>
-              </a:rPr>
-              <a:t>Ex-Gaussian Analyses</a:t>
+              <a:t>Ex-Gaussian Analysis</a:t>
             </a:r>
           </a:p>
           <a:p>
@@ -7799,73 +7890,6 @@
           <a:p>
             <a:pPr algn="ctr" defTabSz="1347788" eaLnBrk="0" hangingPunct="0"/>
             <a:endParaRPr lang="en-US" sz="3800" b="1" dirty="0">
-              <a:solidFill>
-                <a:srgbClr val="0000FF"/>
-              </a:solidFill>
-            </a:endParaRPr>
-          </a:p>
-        </p:txBody>
-      </p:sp>
-      <p:sp>
-        <p:nvSpPr>
-          <p:cNvPr id="63" name="TextBox 24">
-            <a:extLst>
-              <a:ext uri="{FF2B5EF4-FFF2-40B4-BE49-F238E27FC236}">
-                <a16:creationId xmlns:a16="http://schemas.microsoft.com/office/drawing/2014/main" id="{3D7111D9-4587-4639-87BF-AD237104C9D1}"/>
-              </a:ext>
-            </a:extLst>
-          </p:cNvPr>
-          <p:cNvSpPr txBox="1">
-            <a:spLocks noChangeArrowheads="1"/>
-          </p:cNvSpPr>
-          <p:nvPr/>
-        </p:nvSpPr>
-        <p:spPr bwMode="auto">
-          <a:xfrm>
-            <a:off x="30627076" y="8754614"/>
-            <a:ext cx="9372600" cy="1277273"/>
-          </a:xfrm>
-          <a:prstGeom prst="rect">
-            <a:avLst/>
-          </a:prstGeom>
-          <a:noFill/>
-          <a:ln w="9525">
-            <a:noFill/>
-            <a:miter lim="800000"/>
-            <a:headEnd/>
-            <a:tailEnd/>
-          </a:ln>
-        </p:spPr>
-        <p:txBody>
-          <a:bodyPr wrap="square">
-            <a:spAutoFit/>
-          </a:bodyPr>
-          <a:lstStyle/>
-          <a:p>
-            <a:pPr algn="ctr" defTabSz="1347788" eaLnBrk="0" hangingPunct="0"/>
-            <a:r>
-              <a:rPr lang="en-US" sz="4000" b="1" u="sng" dirty="0">
-                <a:solidFill>
-                  <a:srgbClr val="000090"/>
-                </a:solidFill>
-              </a:rPr>
-              <a:t>Global Switch Costs</a:t>
-            </a:r>
-          </a:p>
-          <a:p>
-            <a:pPr algn="ctr" defTabSz="1347788" eaLnBrk="0" hangingPunct="0"/>
-            <a:endParaRPr lang="en-US" sz="100" b="1" dirty="0">
-              <a:solidFill>
-                <a:srgbClr val="000090"/>
-              </a:solidFill>
-              <a:highlight>
-                <a:srgbClr val="FFFF00"/>
-              </a:highlight>
-            </a:endParaRPr>
-          </a:p>
-          <a:p>
-            <a:pPr algn="ctr" defTabSz="1347788" eaLnBrk="0" hangingPunct="0"/>
-            <a:endParaRPr lang="en-US" sz="3600" b="1" dirty="0">
               <a:solidFill>
                 <a:srgbClr val="0000FF"/>
               </a:solidFill>
@@ -7889,8 +7913,8 @@
         </p:nvSpPr>
         <p:spPr bwMode="auto">
           <a:xfrm>
-            <a:off x="29922156" y="2742962"/>
-            <a:ext cx="10617200" cy="1600438"/>
+            <a:off x="29948581" y="2667000"/>
+            <a:ext cx="10617200" cy="1508105"/>
           </a:xfrm>
           <a:prstGeom prst="rect">
             <a:avLst/>
@@ -7911,7 +7935,7 @@
           <a:p>
             <a:pPr algn="ctr" defTabSz="1347788" eaLnBrk="0" hangingPunct="0"/>
             <a:r>
-              <a:rPr lang="en-US" sz="5400" b="1" u="sng" dirty="0" err="1">
+              <a:rPr lang="en-US" sz="4800" b="1" u="sng" dirty="0" err="1">
                 <a:solidFill>
                   <a:srgbClr val="0080FF"/>
                 </a:solidFill>
@@ -7919,7 +7943,7 @@
               <a:t>Vincentile</a:t>
             </a:r>
             <a:r>
-              <a:rPr lang="en-US" sz="5400" b="1" u="sng" dirty="0">
+              <a:rPr lang="en-US" sz="4800" b="1" u="sng" dirty="0">
                 <a:solidFill>
                   <a:srgbClr val="0080FF"/>
                 </a:solidFill>
@@ -7934,46 +7958,6 @@
                 <a:srgbClr val="0000FF"/>
               </a:solidFill>
             </a:endParaRPr>
-          </a:p>
-        </p:txBody>
-      </p:sp>
-      <p:sp>
-        <p:nvSpPr>
-          <p:cNvPr id="65" name="TextBox 64">
-            <a:extLst>
-              <a:ext uri="{FF2B5EF4-FFF2-40B4-BE49-F238E27FC236}">
-                <a16:creationId xmlns:a16="http://schemas.microsoft.com/office/drawing/2014/main" id="{4DE903CA-F716-420C-A9B0-838206C8E6B5}"/>
-              </a:ext>
-            </a:extLst>
-          </p:cNvPr>
-          <p:cNvSpPr txBox="1"/>
-          <p:nvPr/>
-        </p:nvSpPr>
-        <p:spPr>
-          <a:xfrm>
-            <a:off x="24781432" y="21031200"/>
-            <a:ext cx="1885453" cy="400110"/>
-          </a:xfrm>
-          <a:prstGeom prst="rect">
-            <a:avLst/>
-          </a:prstGeom>
-          <a:noFill/>
-        </p:spPr>
-        <p:txBody>
-          <a:bodyPr wrap="none" rtlCol="0">
-            <a:spAutoFit/>
-          </a:bodyPr>
-          <a:lstStyle/>
-          <a:p>
-            <a:pPr algn="ctr"/>
-            <a:r>
-              <a:rPr lang="en-US" sz="2000" b="1" dirty="0">
-                <a:solidFill>
-                  <a:srgbClr val="000090"/>
-                </a:solidFill>
-              </a:rPr>
-              <a:t>Bars = 95% CI</a:t>
-            </a:r>
           </a:p>
         </p:txBody>
       </p:sp>
@@ -7991,7 +7975,7 @@
         </p:nvSpPr>
         <p:spPr>
           <a:xfrm>
-            <a:off x="39992302" y="14283955"/>
+            <a:off x="39992302" y="13716000"/>
             <a:ext cx="1885453" cy="400110"/>
           </a:xfrm>
           <a:prstGeom prst="rect">
@@ -8050,8 +8034,8 @@
         </p:blipFill>
         <p:spPr>
           <a:xfrm>
-            <a:off x="13985608" y="11582400"/>
-            <a:ext cx="12836792" cy="9073584"/>
+            <a:off x="13956562" y="11473742"/>
+            <a:ext cx="12774907" cy="9029841"/>
           </a:xfrm>
           <a:prstGeom prst="rect">
             <a:avLst/>
@@ -8079,8 +8063,8 @@
         </p:blipFill>
         <p:spPr>
           <a:xfrm>
-            <a:off x="13548094" y="21488400"/>
-            <a:ext cx="13350506" cy="9077398"/>
+            <a:off x="13618038" y="21412200"/>
+            <a:ext cx="13280562" cy="9029841"/>
           </a:xfrm>
           <a:prstGeom prst="rect">
             <a:avLst/>
@@ -8108,8 +8092,8 @@
         </p:blipFill>
         <p:spPr>
           <a:xfrm>
-            <a:off x="28041600" y="15163800"/>
-            <a:ext cx="13563600" cy="4468229"/>
+            <a:off x="28346400" y="14325600"/>
+            <a:ext cx="13077011" cy="4307933"/>
           </a:xfrm>
           <a:prstGeom prst="rect">
             <a:avLst/>
@@ -8137,8 +8121,8 @@
         </p:blipFill>
         <p:spPr>
           <a:xfrm>
-            <a:off x="27970950" y="4684531"/>
-            <a:ext cx="13862850" cy="4154669"/>
+            <a:off x="27970950" y="4419600"/>
+            <a:ext cx="13409801" cy="4018891"/>
           </a:xfrm>
           <a:prstGeom prst="rect">
             <a:avLst/>
@@ -8166,14 +8150,262 @@
         </p:blipFill>
         <p:spPr>
           <a:xfrm>
-            <a:off x="27956651" y="9486732"/>
-            <a:ext cx="13862850" cy="4402978"/>
+            <a:off x="27956651" y="9027067"/>
+            <a:ext cx="13563600" cy="4307933"/>
           </a:xfrm>
           <a:prstGeom prst="rect">
             <a:avLst/>
           </a:prstGeom>
         </p:spPr>
       </p:pic>
+      <p:sp>
+        <p:nvSpPr>
+          <p:cNvPr id="56" name="TextBox 24">
+            <a:extLst>
+              <a:ext uri="{FF2B5EF4-FFF2-40B4-BE49-F238E27FC236}">
+                <a16:creationId xmlns:a16="http://schemas.microsoft.com/office/drawing/2014/main" id="{7B0C828D-A172-473F-9A2D-45C2985B4C41}"/>
+              </a:ext>
+            </a:extLst>
+          </p:cNvPr>
+          <p:cNvSpPr txBox="1">
+            <a:spLocks noChangeArrowheads="1"/>
+          </p:cNvSpPr>
+          <p:nvPr/>
+        </p:nvSpPr>
+        <p:spPr bwMode="auto">
+          <a:xfrm>
+            <a:off x="30403800" y="19812000"/>
+            <a:ext cx="9372600" cy="1415772"/>
+          </a:xfrm>
+          <a:prstGeom prst="rect">
+            <a:avLst/>
+          </a:prstGeom>
+          <a:noFill/>
+          <a:ln w="9525">
+            <a:noFill/>
+            <a:miter lim="800000"/>
+            <a:headEnd/>
+            <a:tailEnd/>
+          </a:ln>
+        </p:spPr>
+        <p:txBody>
+          <a:bodyPr wrap="square">
+            <a:spAutoFit/>
+          </a:bodyPr>
+          <a:lstStyle/>
+          <a:p>
+            <a:pPr algn="ctr" defTabSz="1347788" eaLnBrk="0" hangingPunct="0"/>
+            <a:r>
+              <a:rPr lang="en-US" sz="4800" b="1" u="sng" dirty="0">
+                <a:solidFill>
+                  <a:srgbClr val="0080FF"/>
+                </a:solidFill>
+              </a:rPr>
+              <a:t>Conclusions</a:t>
+            </a:r>
+            <a:endParaRPr lang="en-US" sz="4800" b="1" dirty="0">
+              <a:solidFill>
+                <a:srgbClr val="0000FF"/>
+              </a:solidFill>
+            </a:endParaRPr>
+          </a:p>
+          <a:p>
+            <a:pPr algn="ctr" defTabSz="1347788" eaLnBrk="0" hangingPunct="0"/>
+            <a:endParaRPr lang="en-US" sz="3800" b="1" dirty="0">
+              <a:solidFill>
+                <a:srgbClr val="0000FF"/>
+              </a:solidFill>
+            </a:endParaRPr>
+          </a:p>
+        </p:txBody>
+      </p:sp>
+      <p:sp>
+        <p:nvSpPr>
+          <p:cNvPr id="65" name="TextBox 64">
+            <a:extLst>
+              <a:ext uri="{FF2B5EF4-FFF2-40B4-BE49-F238E27FC236}">
+                <a16:creationId xmlns:a16="http://schemas.microsoft.com/office/drawing/2014/main" id="{4DE903CA-F716-420C-A9B0-838206C8E6B5}"/>
+              </a:ext>
+            </a:extLst>
+          </p:cNvPr>
+          <p:cNvSpPr txBox="1"/>
+          <p:nvPr/>
+        </p:nvSpPr>
+        <p:spPr>
+          <a:xfrm>
+            <a:off x="25165547" y="20269200"/>
+            <a:ext cx="1885453" cy="400110"/>
+          </a:xfrm>
+          <a:prstGeom prst="rect">
+            <a:avLst/>
+          </a:prstGeom>
+          <a:noFill/>
+        </p:spPr>
+        <p:txBody>
+          <a:bodyPr wrap="none" rtlCol="0">
+            <a:spAutoFit/>
+          </a:bodyPr>
+          <a:lstStyle/>
+          <a:p>
+            <a:pPr algn="ctr"/>
+            <a:r>
+              <a:rPr lang="en-US" sz="2000" b="1" dirty="0">
+                <a:solidFill>
+                  <a:srgbClr val="000090"/>
+                </a:solidFill>
+              </a:rPr>
+              <a:t>Bars = 95% CI</a:t>
+            </a:r>
+          </a:p>
+        </p:txBody>
+      </p:sp>
+      <p:sp>
+        <p:nvSpPr>
+          <p:cNvPr id="11" name="TextBox 10">
+            <a:extLst>
+              <a:ext uri="{FF2B5EF4-FFF2-40B4-BE49-F238E27FC236}">
+                <a16:creationId xmlns:a16="http://schemas.microsoft.com/office/drawing/2014/main" id="{D6A2EED3-9446-44F0-A529-DD37A13D3D0C}"/>
+              </a:ext>
+            </a:extLst>
+          </p:cNvPr>
+          <p:cNvSpPr txBox="1"/>
+          <p:nvPr/>
+        </p:nvSpPr>
+        <p:spPr>
+          <a:xfrm>
+            <a:off x="24936947" y="30327600"/>
+            <a:ext cx="1885453" cy="400110"/>
+          </a:xfrm>
+          <a:prstGeom prst="rect">
+            <a:avLst/>
+          </a:prstGeom>
+          <a:noFill/>
+        </p:spPr>
+        <p:txBody>
+          <a:bodyPr wrap="none" rtlCol="0">
+            <a:spAutoFit/>
+          </a:bodyPr>
+          <a:lstStyle/>
+          <a:p>
+            <a:pPr algn="ctr"/>
+            <a:r>
+              <a:rPr lang="en-US" sz="2000" b="1" dirty="0">
+                <a:solidFill>
+                  <a:srgbClr val="000090"/>
+                </a:solidFill>
+              </a:rPr>
+              <a:t>Bars = 95% CI</a:t>
+            </a:r>
+          </a:p>
+        </p:txBody>
+      </p:sp>
+      <p:sp>
+        <p:nvSpPr>
+          <p:cNvPr id="63" name="TextBox 24">
+            <a:extLst>
+              <a:ext uri="{FF2B5EF4-FFF2-40B4-BE49-F238E27FC236}">
+                <a16:creationId xmlns:a16="http://schemas.microsoft.com/office/drawing/2014/main" id="{3D7111D9-4587-4639-87BF-AD237104C9D1}"/>
+              </a:ext>
+            </a:extLst>
+          </p:cNvPr>
+          <p:cNvSpPr txBox="1">
+            <a:spLocks noChangeArrowheads="1"/>
+          </p:cNvSpPr>
+          <p:nvPr/>
+        </p:nvSpPr>
+        <p:spPr bwMode="auto">
+          <a:xfrm>
+            <a:off x="30627076" y="8564590"/>
+            <a:ext cx="9372600" cy="1215717"/>
+          </a:xfrm>
+          <a:prstGeom prst="rect">
+            <a:avLst/>
+          </a:prstGeom>
+          <a:noFill/>
+          <a:ln w="9525">
+            <a:noFill/>
+            <a:miter lim="800000"/>
+            <a:headEnd/>
+            <a:tailEnd/>
+          </a:ln>
+        </p:spPr>
+        <p:txBody>
+          <a:bodyPr wrap="square">
+            <a:spAutoFit/>
+          </a:bodyPr>
+          <a:lstStyle/>
+          <a:p>
+            <a:pPr algn="ctr" defTabSz="1347788" eaLnBrk="0" hangingPunct="0"/>
+            <a:r>
+              <a:rPr lang="en-US" sz="3600" b="1" u="sng" dirty="0">
+                <a:solidFill>
+                  <a:srgbClr val="000090"/>
+                </a:solidFill>
+              </a:rPr>
+              <a:t>Global Switch Costs</a:t>
+            </a:r>
+          </a:p>
+          <a:p>
+            <a:pPr algn="ctr" defTabSz="1347788" eaLnBrk="0" hangingPunct="0"/>
+            <a:endParaRPr lang="en-US" sz="100" b="1" dirty="0">
+              <a:solidFill>
+                <a:srgbClr val="000090"/>
+              </a:solidFill>
+              <a:highlight>
+                <a:srgbClr val="FFFF00"/>
+              </a:highlight>
+            </a:endParaRPr>
+          </a:p>
+          <a:p>
+            <a:pPr algn="ctr" defTabSz="1347788" eaLnBrk="0" hangingPunct="0"/>
+            <a:endParaRPr lang="en-US" sz="3600" b="1" dirty="0">
+              <a:solidFill>
+                <a:srgbClr val="0000FF"/>
+              </a:solidFill>
+            </a:endParaRPr>
+          </a:p>
+        </p:txBody>
+      </p:sp>
+      <p:sp>
+        <p:nvSpPr>
+          <p:cNvPr id="130" name="TextBox 129">
+            <a:extLst>
+              <a:ext uri="{FF2B5EF4-FFF2-40B4-BE49-F238E27FC236}">
+                <a16:creationId xmlns:a16="http://schemas.microsoft.com/office/drawing/2014/main" id="{BE118301-E727-413A-BB42-47203528E0D8}"/>
+              </a:ext>
+            </a:extLst>
+          </p:cNvPr>
+          <p:cNvSpPr txBox="1"/>
+          <p:nvPr/>
+        </p:nvSpPr>
+        <p:spPr>
+          <a:xfrm>
+            <a:off x="39167302" y="18497490"/>
+            <a:ext cx="1885453" cy="400110"/>
+          </a:xfrm>
+          <a:prstGeom prst="rect">
+            <a:avLst/>
+          </a:prstGeom>
+          <a:noFill/>
+        </p:spPr>
+        <p:txBody>
+          <a:bodyPr wrap="none" rtlCol="0">
+            <a:spAutoFit/>
+          </a:bodyPr>
+          <a:lstStyle/>
+          <a:p>
+            <a:pPr algn="ctr"/>
+            <a:r>
+              <a:rPr lang="en-US" sz="2000" b="1" dirty="0">
+                <a:solidFill>
+                  <a:srgbClr val="000090"/>
+                </a:solidFill>
+              </a:rPr>
+              <a:t>Bars = 95% CI</a:t>
+            </a:r>
+          </a:p>
+        </p:txBody>
+      </p:sp>
     </p:spTree>
   </p:cSld>
   <p:clrMapOvr>

</xml_diff>

<commit_message>
analyses and finishing up
</commit_message>
<xml_diff>
--- a/5 Presentations/Posters/Namias Maxwell Huff Cog Aging 2022.pptx
+++ b/5 Presentations/Posters/Namias Maxwell Huff Cog Aging 2022.pptx
@@ -3270,8 +3270,8 @@
         </p:nvSpPr>
         <p:spPr>
           <a:xfrm>
-            <a:off x="80827" y="20356181"/>
-            <a:ext cx="12828928" cy="9523650"/>
+            <a:off x="80827" y="21063156"/>
+            <a:ext cx="12828928" cy="8816675"/>
           </a:xfrm>
           <a:prstGeom prst="roundRect">
             <a:avLst/>
@@ -3396,7 +3396,7 @@
         <p:spPr>
           <a:xfrm>
             <a:off x="245829" y="2701636"/>
-            <a:ext cx="12663926" cy="17472084"/>
+            <a:ext cx="12663926" cy="18103310"/>
           </a:xfrm>
           <a:prstGeom prst="roundRect">
             <a:avLst>
@@ -3452,8 +3452,8 @@
         </p:nvSpPr>
         <p:spPr>
           <a:xfrm>
-            <a:off x="27756465" y="19792890"/>
-            <a:ext cx="14107146" cy="11642966"/>
+            <a:off x="27756465" y="19621285"/>
+            <a:ext cx="14107146" cy="11814571"/>
           </a:xfrm>
           <a:prstGeom prst="roundRect">
             <a:avLst/>
@@ -3509,7 +3509,7 @@
         </p:nvSpPr>
         <p:spPr bwMode="auto">
           <a:xfrm>
-            <a:off x="442474" y="3505200"/>
+            <a:off x="381000" y="3538654"/>
             <a:ext cx="12663926" cy="13682546"/>
           </a:xfrm>
           <a:prstGeom prst="rect">
@@ -3576,7 +3576,7 @@
                 <a:cs typeface="Calibri"/>
                 <a:sym typeface="Calibri"/>
               </a:rPr>
-              <a:t> &amp; Shah, 2008) </a:t>
+              <a:t> &amp; Shah, 2008), </a:t>
             </a:r>
             <a:r>
               <a:rPr lang="en-US" sz="3150" dirty="0">
@@ -3600,7 +3600,7 @@
                 <a:cs typeface="Calibri"/>
                 <a:sym typeface="Calibri"/>
               </a:rPr>
-              <a:t>(e.g., A 08) quickly classify the letter (Consonant/Vowel) or the number (Odd/Even). Because participants complete </a:t>
+              <a:t>(e.g., A 08) and quickly classify the letter (Consonant/Vowel) or the number (Odd/Even). Because participants complete both </a:t>
             </a:r>
             <a:r>
               <a:rPr lang="en-US" sz="3150" dirty="0">
@@ -3624,7 +3624,7 @@
                 <a:cs typeface="Calibri"/>
                 <a:sym typeface="Calibri"/>
               </a:rPr>
-              <a:t> and switch blocks (e.g., participants switch between both classification tasks), the CVOE paradigm allows for comparisons between </a:t>
+              <a:t> and switch blocks (e.g., participants switch between both classification tasks), this task allows for comparisons between </a:t>
             </a:r>
             <a:r>
               <a:rPr lang="en-US" sz="3150" i="1" dirty="0">
@@ -3732,7 +3732,7 @@
                 <a:cs typeface="Calibri"/>
                 <a:sym typeface="Calibri"/>
               </a:rPr>
-              <a:t>non-switch trials - pure trials) represent the cost of keeping multiple task-sets active in working memory. Alternatively, local costs (i.e., switch trials - non-switch trials) reflect task-set reconfiguration processes that occur due to switching</a:t>
+              <a:t>non-switch trials - pure trials) represent the cost of keeping multiple task-sets active in working memory. Alternatively, local costs (i.e., switch trials - non-switch trials) reflect task-set reconfiguration processes that occur due to switching tasks within the same block</a:t>
             </a:r>
             <a:r>
               <a:rPr lang="en-US" sz="3150" dirty="0">
@@ -3799,7 +3799,7 @@
                 <a:cs typeface="Calibri"/>
                 <a:sym typeface="Calibri"/>
               </a:rPr>
-              <a:t>Previous research has shown global costs for both errors and response times (RTs) increase with age and for individuals with mild cognitive impairments (MCI; e.g., Alzheimer's Disease), while these conditions decrease local costs for RTs (Huff et al., 2015). Furthermore, Huff et al. showed that distributional analyses of RTs (e.g., Vincentile plots) reveal dissociations between local and global switch costs, such that global costs increase while local costs decrease.</a:t>
+              <a:t>Previous research has found that global costs for both errors and response times (RTs) increase with age and for individuals with mild cognitive impairments (MCI; e.g., Alzheimer's Disease), while these conditions decrease local costs for RTs (Huff et al., 2015). Furthermore, Huff et al. showed that distributional analyses of RTs (e.g., Vincentile plots) can be used to further investigate this dissociation between costs.</a:t>
             </a:r>
           </a:p>
           <a:p>
@@ -3854,7 +3854,7 @@
                 <a:cs typeface="Calibri"/>
                 <a:sym typeface="Calibri"/>
               </a:rPr>
-              <a:t>Studies investigating CVOE task switching have often used presented trials via a </a:t>
+              <a:t>CVOE studies often present switch trials via a </a:t>
             </a:r>
             <a:r>
               <a:rPr lang="en-US" sz="3150" b="0" i="0" u="none" strike="noStrike" cap="none" dirty="0">
@@ -3878,7 +3878,31 @@
                 <a:cs typeface="Calibri"/>
                 <a:sym typeface="Calibri"/>
               </a:rPr>
-              <a:t>The present study expands upon this by comparing alternating runs switching with random switching. Unlike an alternating runs sequence, random switching has no discernable pattern. As a result, we expected participants would find the random switching task more difficult, and that these difficulties would be reflected in greater error rates and RTs compared to alternating runs switching. Furthermore, given breakdowns in working memory and attentional control processes that are associated with AD, we expected that MCI older adults would particularly struggle with the random switch task. Thus, we expected that differences in switch costs previously found using alternating runs would be particularly exaggerated for these individuals when switching was non-predictive.</a:t>
+              <a:t>The present study expands upon this by comparing predictable switching with random switching in which there is no discernable pattern. Specifically, we investigate the effects of random (vs. predictive) switching on younger, healthy older, and MCI older adults. We then assess changes in mean errors, RTs, and switch costs as well as RT distributions using </a:t>
+            </a:r>
+            <a:r>
+              <a:rPr lang="en-US" sz="3150" dirty="0" err="1">
+                <a:solidFill>
+                  <a:srgbClr val="000090"/>
+                </a:solidFill>
+                <a:latin typeface="Calibri"/>
+                <a:ea typeface="Calibri"/>
+                <a:cs typeface="Calibri"/>
+                <a:sym typeface="Calibri"/>
+              </a:rPr>
+              <a:t>Vincentile</a:t>
+            </a:r>
+            <a:r>
+              <a:rPr lang="en-US" sz="3150" dirty="0">
+                <a:solidFill>
+                  <a:srgbClr val="000090"/>
+                </a:solidFill>
+                <a:latin typeface="Calibri"/>
+                <a:ea typeface="Calibri"/>
+                <a:cs typeface="Calibri"/>
+                <a:sym typeface="Calibri"/>
+              </a:rPr>
+              <a:t> plots and an ex-Gaussian analysis. We expected participants would find the random switching task more difficult, and that these difficulties would be reflected in greater error rates and RTs compared to alternating runs switching. Given breakdowns in working memory and attentional control processes that are associated with AD, we expected that MCI older adults would particularly struggle with the random switch task. Thus, we expected that differences in switch costs previously found using alternating runs would be particularly exaggerated for these individuals when switching was non-predictive. </a:t>
             </a:r>
           </a:p>
         </p:txBody>
@@ -3893,7 +3917,7 @@
         </p:nvSpPr>
         <p:spPr bwMode="auto">
           <a:xfrm>
-            <a:off x="1264835" y="20336620"/>
+            <a:off x="1480563" y="21031200"/>
             <a:ext cx="10617200" cy="1508105"/>
           </a:xfrm>
           <a:prstGeom prst="rect">
@@ -3943,8 +3967,8 @@
         </p:nvSpPr>
         <p:spPr bwMode="auto">
           <a:xfrm>
-            <a:off x="27910963" y="20497800"/>
-            <a:ext cx="13886494" cy="10090582"/>
+            <a:off x="28500249" y="20345400"/>
+            <a:ext cx="12952551" cy="10965656"/>
           </a:xfrm>
           <a:prstGeom prst="rect">
             <a:avLst/>
@@ -3967,14 +3991,14 @@
               </a:spcBef>
             </a:pPr>
             <a:r>
-              <a:rPr lang="en-US" sz="3150" dirty="0">
+              <a:rPr lang="en-US" sz="3050" dirty="0">
                 <a:solidFill>
                   <a:srgbClr val="000090"/>
                 </a:solidFill>
                 <a:latin typeface="Calibri"/>
                 <a:cs typeface="Calibri"/>
               </a:rPr>
-              <a:t>Across trial types, MCI older adults produced more errors compared to younger and healthy older adults. Additionally, both older adult groups provided consistently slower responses. Regarding mean switch costs for errors, MCI individuals had greater global switch costs (regardless of presentation mode) compared to younger and healthy older adults. For local costs, MCI older adults again showed greater costs, but only when switching was predictive. For RT switch costs, older adults showed greater global costs compared to younger adults, though no differences in local costs were detected between groups. </a:t>
+              <a:t>Overall, MCI older adults produced more errors compared to younger and healthy older adults. Additionally, both older adult groups were consistently slower when responding. Mean errors and RTs did not differ between alternating runs and random switching. Regarding costs, global error costs did not differ between switch task as function of age group. However, for local error costs, MCI older adults showed greater costs for predictive vs. non-predictive switching. For mean RT switch costs, global costs did not differ as function of switch type. However younger and healthy older adults showed greater local RT costs when switching was random, suggesting that the random switch task was more taxing towards task-set reconfiguration processes.</a:t>
             </a:r>
           </a:p>
           <a:p>
@@ -3983,71 +4007,37 @@
                 <a:spcPts val="800"/>
               </a:spcBef>
             </a:pPr>
-            <a:endParaRPr lang="en-US" sz="600" dirty="0">
-              <a:solidFill>
-                <a:srgbClr val="000090"/>
-              </a:solidFill>
-              <a:latin typeface="Calibri"/>
-              <a:cs typeface="Calibri"/>
-            </a:endParaRPr>
-          </a:p>
-          <a:p>
-            <a:pPr defTabSz="1347788" eaLnBrk="0" hangingPunct="0">
-              <a:spcBef>
-                <a:spcPts val="800"/>
-              </a:spcBef>
-            </a:pPr>
-            <a:r>
-              <a:rPr lang="en-US" sz="3150" dirty="0">
+            <a:r>
+              <a:rPr lang="en-US" sz="3050" dirty="0">
                 <a:solidFill>
                   <a:srgbClr val="000090"/>
                 </a:solidFill>
                 <a:latin typeface="Calibri"/>
                 <a:cs typeface="Calibri"/>
               </a:rPr>
-              <a:t>Vincentile plots were then used to further assess changes in switch cost RTs. Starting with local costs, all groups showed decreased costs across bins. For alternating runs switching, healthy older adults showed decreases in costs relative to younger adults and MCI older adults. For global costs, all groups showed increases across bins. These increases were greater for alternating runs switching relative to random switching. Finally, an ex-</a:t>
-            </a:r>
-            <a:r>
-              <a:rPr lang="en-US" sz="3150" dirty="0" err="1">
+              <a:t>Next, </a:t>
+            </a:r>
+            <a:r>
+              <a:rPr lang="en-US" sz="3050" dirty="0" err="1">
                 <a:solidFill>
                   <a:srgbClr val="000090"/>
                 </a:solidFill>
                 <a:latin typeface="Calibri"/>
                 <a:cs typeface="Calibri"/>
               </a:rPr>
-              <a:t>Guassian</a:t>
-            </a:r>
-            <a:r>
-              <a:rPr lang="en-US" sz="3150" dirty="0">
+              <a:t>Vincentile</a:t>
+            </a:r>
+            <a:r>
+              <a:rPr lang="en-US" sz="3050" dirty="0">
                 <a:solidFill>
                   <a:srgbClr val="000090"/>
                 </a:solidFill>
                 <a:latin typeface="Calibri"/>
                 <a:cs typeface="Calibri"/>
               </a:rPr>
-              <a:t> analysis of RTs indicated that both older adult groups had greater mean Tau values relative to younger adults, indicating that.. </a:t>
-            </a:r>
-            <a:r>
-              <a:rPr lang="en-US" sz="3150" dirty="0">
-                <a:solidFill>
-                  <a:srgbClr val="000090"/>
-                </a:solidFill>
-                <a:highlight>
-                  <a:srgbClr val="FFFF00"/>
-                </a:highlight>
-                <a:latin typeface="Calibri"/>
-                <a:cs typeface="Calibri"/>
-              </a:rPr>
-              <a:t>[Expand]</a:t>
-            </a:r>
-          </a:p>
-          <a:p>
-            <a:pPr defTabSz="1347788" eaLnBrk="0" hangingPunct="0">
-              <a:spcBef>
-                <a:spcPts val="800"/>
-              </a:spcBef>
-            </a:pPr>
-            <a:endParaRPr lang="en-US" sz="600" dirty="0">
+              <a:t> plots showed that local costs decreased for all groups, with these decreases being particularly pronounced for healthy older adults when switching was predictive. Analysis of these plots, however, indicated that local costs did not differ between random and predictive switching regardless of participant type. For global costs, all groups showed steady increases across bins, with no differences as a function of switch type. Finally, an ex-Gaussian analysis of RTs indicated that both older adult groups had greater mean Tau values relative to younger adults, which suggests that older individuals had more responses in the tail of the RT distribution relative to younger adults (i.e., slower task responses). However, no differences occurred as a function of switch type. Thus, it appears that random task-switching can increase local RT costs for healthy individuals, however these increases are not captured by RT distributions.</a:t>
+            </a:r>
+            <a:endParaRPr lang="en-US" sz="3050" dirty="0">
               <a:solidFill>
                 <a:srgbClr val="000090"/>
               </a:solidFill>
@@ -4057,26 +4047,6 @@
               <a:latin typeface="Calibri"/>
               <a:cs typeface="Calibri"/>
             </a:endParaRPr>
-          </a:p>
-          <a:p>
-            <a:pPr defTabSz="1347788" eaLnBrk="0" hangingPunct="0">
-              <a:spcBef>
-                <a:spcPts val="800"/>
-              </a:spcBef>
-            </a:pPr>
-            <a:r>
-              <a:rPr lang="en-US" sz="3150" dirty="0">
-                <a:solidFill>
-                  <a:srgbClr val="000090"/>
-                </a:solidFill>
-                <a:highlight>
-                  <a:srgbClr val="FFFF00"/>
-                </a:highlight>
-                <a:latin typeface="Calibri"/>
-                <a:cs typeface="Calibri"/>
-              </a:rPr>
-              <a:t>Overall, our findings show that presentation mode does not affect mean errors, RTs, or their respective switch costs. Instead, differences occurred primarily as functions of age and health. </a:t>
-            </a:r>
           </a:p>
         </p:txBody>
       </p:sp>
@@ -4089,7 +4059,7 @@
         <p:spPr>
           <a:xfrm>
             <a:off x="27736801" y="2739506"/>
-            <a:ext cx="14163794" cy="16843894"/>
+            <a:ext cx="14163794" cy="16672289"/>
           </a:xfrm>
           <a:prstGeom prst="roundRect">
             <a:avLst/>
@@ -4484,7 +4454,7 @@
             <a:r>
               <a:rPr lang="en-US" sz="3200" dirty="0">
                 <a:solidFill>
-                  <a:schemeClr val="tx2"/>
+                  <a:srgbClr val="000090"/>
                 </a:solidFill>
                 <a:latin typeface="+mj-lt"/>
                 <a:cs typeface="Arial" pitchFamily="34" charset="0"/>
@@ -4505,22 +4475,12 @@
             <a:r>
               <a:rPr lang="en-US" sz="3200" dirty="0">
                 <a:solidFill>
-                  <a:schemeClr val="tx2"/>
+                  <a:srgbClr val="000090"/>
                 </a:solidFill>
                 <a:latin typeface="+mj-lt"/>
                 <a:cs typeface="Arial" pitchFamily="34" charset="0"/>
               </a:rPr>
-              <a:t>More info available at:</a:t>
-            </a:r>
-            <a:r>
-              <a:rPr lang="en-US" sz="3200" dirty="0">
-                <a:solidFill>
-                  <a:schemeClr val="tx1"/>
-                </a:solidFill>
-                <a:latin typeface="+mj-lt"/>
-                <a:cs typeface="Arial" pitchFamily="34" charset="0"/>
-              </a:rPr>
-              <a:t> </a:t>
+              <a:t>More info available at: </a:t>
             </a:r>
             <a:r>
               <a:rPr lang="en-US" sz="3200" dirty="0">
@@ -5431,7 +5391,7 @@
         </p:nvSpPr>
         <p:spPr>
           <a:xfrm>
-            <a:off x="-76200" y="26715600"/>
+            <a:off x="228600" y="27099000"/>
             <a:ext cx="3626700" cy="3916800"/>
           </a:xfrm>
           <a:prstGeom prst="rect">
@@ -5466,7 +5426,7 @@
               <a:buNone/>
             </a:pPr>
             <a:r>
-              <a:rPr lang="en-US" sz="4000" b="1" i="0" u="sng" strike="noStrike" cap="none" dirty="0">
+              <a:rPr lang="en-US" sz="3600" b="1" i="0" u="sng" strike="noStrike" cap="none" dirty="0">
                 <a:solidFill>
                   <a:srgbClr val="0080FF"/>
                 </a:solidFill>
@@ -5477,7 +5437,7 @@
               </a:rPr>
               <a:t>Pair</a:t>
             </a:r>
-            <a:endParaRPr sz="1400" b="0" i="0" u="none" strike="noStrike" cap="none" dirty="0">
+            <a:endParaRPr sz="1200" b="0" i="0" u="none" strike="noStrike" cap="none" dirty="0">
               <a:solidFill>
                 <a:srgbClr val="0080FF"/>
               </a:solidFill>
@@ -5505,7 +5465,7 @@
               <a:buFont typeface="Arial"/>
               <a:buNone/>
             </a:pPr>
-            <a:endParaRPr sz="1100" b="0" i="0" u="none" strike="noStrike" cap="none" dirty="0">
+            <a:endParaRPr sz="1050" b="0" i="0" u="none" strike="noStrike" cap="none" dirty="0">
               <a:solidFill>
                 <a:srgbClr val="FF0000"/>
               </a:solidFill>
@@ -5534,7 +5494,7 @@
               <a:buNone/>
             </a:pPr>
             <a:r>
-              <a:rPr lang="en-US" sz="3600" b="1" i="0" u="none" strike="noStrike" cap="none" dirty="0">
+              <a:rPr lang="en-US" sz="3200" b="1" i="0" u="none" strike="noStrike" cap="none" dirty="0">
                 <a:solidFill>
                   <a:srgbClr val="000090"/>
                 </a:solidFill>
@@ -5545,7 +5505,7 @@
               </a:rPr>
               <a:t>A 15</a:t>
             </a:r>
-            <a:endParaRPr sz="1400" b="0" i="0" u="none" strike="noStrike" cap="none" dirty="0">
+            <a:endParaRPr sz="1200" b="0" i="0" u="none" strike="noStrike" cap="none" dirty="0">
               <a:solidFill>
                 <a:srgbClr val="000090"/>
               </a:solidFill>
@@ -5574,7 +5534,7 @@
               <a:buNone/>
             </a:pPr>
             <a:r>
-              <a:rPr lang="en-US" sz="3600" b="1" i="0" u="none" strike="noStrike" cap="none" dirty="0">
+              <a:rPr lang="en-US" sz="3200" b="1" i="0" u="none" strike="noStrike" cap="none" dirty="0">
                 <a:solidFill>
                   <a:srgbClr val="000090"/>
                 </a:solidFill>
@@ -5585,7 +5545,7 @@
               </a:rPr>
               <a:t>D 04</a:t>
             </a:r>
-            <a:endParaRPr sz="1400" b="0" i="0" u="none" strike="noStrike" cap="none" dirty="0">
+            <a:endParaRPr sz="1200" b="0" i="0" u="none" strike="noStrike" cap="none" dirty="0">
               <a:solidFill>
                 <a:srgbClr val="000090"/>
               </a:solidFill>
@@ -5614,7 +5574,7 @@
               <a:buNone/>
             </a:pPr>
             <a:r>
-              <a:rPr lang="en-US" sz="3600" b="1" i="0" u="none" strike="noStrike" cap="none" dirty="0">
+              <a:rPr lang="en-US" sz="3200" b="1" i="0" u="none" strike="noStrike" cap="none" dirty="0">
                 <a:solidFill>
                   <a:srgbClr val="000090"/>
                 </a:solidFill>
@@ -5625,7 +5585,7 @@
               </a:rPr>
               <a:t>E 23</a:t>
             </a:r>
-            <a:endParaRPr sz="1400" b="0" i="0" u="none" strike="noStrike" cap="none" dirty="0">
+            <a:endParaRPr sz="1200" b="0" i="0" u="none" strike="noStrike" cap="none" dirty="0">
               <a:solidFill>
                 <a:srgbClr val="000090"/>
               </a:solidFill>
@@ -5654,7 +5614,7 @@
               <a:buNone/>
             </a:pPr>
             <a:r>
-              <a:rPr lang="en-US" sz="3600" b="1" i="0" u="none" strike="noStrike" cap="none" dirty="0">
+              <a:rPr lang="en-US" sz="3200" b="1" i="0" u="none" strike="noStrike" cap="none" dirty="0">
                 <a:solidFill>
                   <a:srgbClr val="000090"/>
                 </a:solidFill>
@@ -5665,7 +5625,7 @@
               </a:rPr>
               <a:t>H 36</a:t>
             </a:r>
-            <a:endParaRPr sz="1400" b="0" i="0" u="none" strike="noStrike" cap="none" dirty="0">
+            <a:endParaRPr sz="1200" b="0" i="0" u="none" strike="noStrike" cap="none" dirty="0">
               <a:solidFill>
                 <a:srgbClr val="000090"/>
               </a:solidFill>
@@ -5719,7 +5679,7 @@
         </p:nvSpPr>
         <p:spPr>
           <a:xfrm>
-            <a:off x="3276600" y="26680500"/>
+            <a:off x="3849900" y="27080610"/>
             <a:ext cx="4684500" cy="3647100"/>
           </a:xfrm>
           <a:prstGeom prst="rect">
@@ -5754,7 +5714,7 @@
               <a:buNone/>
             </a:pPr>
             <a:r>
-              <a:rPr lang="en-US" sz="4000" b="1" i="0" u="sng" strike="noStrike" cap="none" dirty="0">
+              <a:rPr lang="en-US" sz="3600" b="1" i="0" u="sng" strike="noStrike" cap="none" dirty="0">
                 <a:solidFill>
                   <a:srgbClr val="0080FF"/>
                 </a:solidFill>
@@ -5765,7 +5725,7 @@
               </a:rPr>
               <a:t>Task</a:t>
             </a:r>
-            <a:endParaRPr sz="1400" b="0" i="0" u="none" strike="noStrike" cap="none" dirty="0">
+            <a:endParaRPr sz="1200" b="0" i="0" u="none" strike="noStrike" cap="none" dirty="0">
               <a:solidFill>
                 <a:srgbClr val="0080FF"/>
               </a:solidFill>
@@ -5793,7 +5753,7 @@
               <a:buFont typeface="Arial"/>
               <a:buNone/>
             </a:pPr>
-            <a:endParaRPr sz="1100" b="0" i="0" u="none" strike="noStrike" cap="none" dirty="0">
+            <a:endParaRPr sz="1050" b="0" i="0" u="none" strike="noStrike" cap="none" dirty="0">
               <a:solidFill>
                 <a:srgbClr val="000090"/>
               </a:solidFill>
@@ -5822,7 +5782,7 @@
               <a:buNone/>
             </a:pPr>
             <a:r>
-              <a:rPr lang="en-US" sz="3600" b="1" i="0" u="none" strike="noStrike" cap="none" dirty="0">
+              <a:rPr lang="en-US" sz="3200" b="1" i="0" u="none" strike="noStrike" cap="none" dirty="0">
                 <a:solidFill>
                   <a:srgbClr val="000090"/>
                 </a:solidFill>
@@ -5833,7 +5793,7 @@
               </a:rPr>
               <a:t>CV</a:t>
             </a:r>
-            <a:endParaRPr sz="1400" b="0" i="0" u="none" strike="noStrike" cap="none" dirty="0">
+            <a:endParaRPr sz="1200" b="0" i="0" u="none" strike="noStrike" cap="none" dirty="0">
               <a:solidFill>
                 <a:srgbClr val="000090"/>
               </a:solidFill>
@@ -5862,7 +5822,7 @@
               <a:buNone/>
             </a:pPr>
             <a:r>
-              <a:rPr lang="en-US" sz="3600" b="1" i="0" u="none" strike="noStrike" cap="none" dirty="0">
+              <a:rPr lang="en-US" sz="3200" b="1" i="0" u="none" strike="noStrike" cap="none" dirty="0">
                 <a:solidFill>
                   <a:srgbClr val="000090"/>
                 </a:solidFill>
@@ -5873,7 +5833,7 @@
               </a:rPr>
               <a:t>CV</a:t>
             </a:r>
-            <a:endParaRPr sz="1400" b="0" i="0" u="none" strike="noStrike" cap="none" dirty="0">
+            <a:endParaRPr sz="1200" b="0" i="0" u="none" strike="noStrike" cap="none" dirty="0">
               <a:solidFill>
                 <a:srgbClr val="000090"/>
               </a:solidFill>
@@ -5902,7 +5862,7 @@
               <a:buNone/>
             </a:pPr>
             <a:r>
-              <a:rPr lang="en-US" sz="3600" b="1" i="0" u="none" strike="noStrike" cap="none" dirty="0">
+              <a:rPr lang="en-US" sz="3200" b="1" i="0" u="none" strike="noStrike" cap="none" dirty="0">
                 <a:solidFill>
                   <a:srgbClr val="000090"/>
                 </a:solidFill>
@@ -5913,7 +5873,7 @@
               </a:rPr>
               <a:t>OE</a:t>
             </a:r>
-            <a:endParaRPr sz="1400" b="0" i="0" u="none" strike="noStrike" cap="none" dirty="0">
+            <a:endParaRPr sz="1200" b="0" i="0" u="none" strike="noStrike" cap="none" dirty="0">
               <a:solidFill>
                 <a:srgbClr val="000090"/>
               </a:solidFill>
@@ -5942,7 +5902,7 @@
               <a:buNone/>
             </a:pPr>
             <a:r>
-              <a:rPr lang="en-US" sz="3600" b="1" i="0" u="none" strike="noStrike" cap="none" dirty="0">
+              <a:rPr lang="en-US" sz="3200" b="1" i="0" u="none" strike="noStrike" cap="none" dirty="0">
                 <a:solidFill>
                   <a:srgbClr val="000090"/>
                 </a:solidFill>
@@ -5953,7 +5913,7 @@
               </a:rPr>
               <a:t>OE</a:t>
             </a:r>
-            <a:endParaRPr sz="1400" b="0" i="0" u="none" strike="noStrike" cap="none" dirty="0">
+            <a:endParaRPr sz="1200" b="0" i="0" u="none" strike="noStrike" cap="none" dirty="0">
               <a:solidFill>
                 <a:srgbClr val="000090"/>
               </a:solidFill>
@@ -6007,7 +5967,7 @@
         </p:nvSpPr>
         <p:spPr>
           <a:xfrm>
-            <a:off x="8040900" y="26641800"/>
+            <a:off x="8040900" y="27099000"/>
             <a:ext cx="4684500" cy="3000000"/>
           </a:xfrm>
           <a:prstGeom prst="rect">
@@ -6042,7 +6002,7 @@
               <a:buNone/>
             </a:pPr>
             <a:r>
-              <a:rPr lang="en-US" sz="4000" b="1" i="0" u="sng" strike="noStrike" cap="none" dirty="0">
+              <a:rPr lang="en-US" sz="3600" b="1" i="0" u="sng" strike="noStrike" cap="none" dirty="0">
                 <a:solidFill>
                   <a:srgbClr val="0080FF"/>
                 </a:solidFill>
@@ -6053,7 +6013,7 @@
               </a:rPr>
               <a:t>Correct Response</a:t>
             </a:r>
-            <a:endParaRPr sz="1400" b="0" i="0" u="none" strike="noStrike" cap="none" dirty="0">
+            <a:endParaRPr sz="1200" b="0" i="0" u="none" strike="noStrike" cap="none" dirty="0">
               <a:solidFill>
                 <a:srgbClr val="0080FF"/>
               </a:solidFill>
@@ -6081,7 +6041,7 @@
               <a:buFont typeface="Arial"/>
               <a:buNone/>
             </a:pPr>
-            <a:endParaRPr sz="1100" b="0" i="0" u="none" strike="noStrike" cap="none" dirty="0">
+            <a:endParaRPr sz="1050" b="0" i="0" u="none" strike="noStrike" cap="none" dirty="0">
               <a:solidFill>
                 <a:srgbClr val="FF0000"/>
               </a:solidFill>
@@ -6110,7 +6070,7 @@
               <a:buNone/>
             </a:pPr>
             <a:r>
-              <a:rPr lang="en-US" sz="3600" b="1" i="0" u="none" strike="noStrike" cap="none" dirty="0">
+              <a:rPr lang="en-US" sz="3200" b="1" i="0" u="none" strike="noStrike" cap="none" dirty="0">
                 <a:solidFill>
                   <a:srgbClr val="000090"/>
                 </a:solidFill>
@@ -6121,7 +6081,7 @@
               </a:rPr>
               <a:t>P</a:t>
             </a:r>
-            <a:endParaRPr sz="1400" b="0" i="0" u="none" strike="noStrike" cap="none" dirty="0">
+            <a:endParaRPr sz="1200" b="0" i="0" u="none" strike="noStrike" cap="none" dirty="0">
               <a:solidFill>
                 <a:srgbClr val="000090"/>
               </a:solidFill>
@@ -6150,7 +6110,7 @@
               <a:buNone/>
             </a:pPr>
             <a:r>
-              <a:rPr lang="en-US" sz="3600" b="1" i="0" u="none" strike="noStrike" cap="none" dirty="0">
+              <a:rPr lang="en-US" sz="3200" b="1" i="0" u="none" strike="noStrike" cap="none" dirty="0">
                 <a:solidFill>
                   <a:srgbClr val="000090"/>
                 </a:solidFill>
@@ -6161,7 +6121,7 @@
               </a:rPr>
               <a:t>Q</a:t>
             </a:r>
-            <a:endParaRPr sz="1400" b="0" i="0" u="none" strike="noStrike" cap="none" dirty="0">
+            <a:endParaRPr sz="1200" b="0" i="0" u="none" strike="noStrike" cap="none" dirty="0">
               <a:solidFill>
                 <a:srgbClr val="000090"/>
               </a:solidFill>
@@ -6190,7 +6150,7 @@
               <a:buNone/>
             </a:pPr>
             <a:r>
-              <a:rPr lang="en-US" sz="3600" b="1" i="0" u="none" strike="noStrike" cap="none" dirty="0">
+              <a:rPr lang="en-US" sz="3200" b="1" i="0" u="none" strike="noStrike" cap="none" dirty="0">
                 <a:solidFill>
                   <a:srgbClr val="000090"/>
                 </a:solidFill>
@@ -6201,7 +6161,7 @@
               </a:rPr>
               <a:t>Q</a:t>
             </a:r>
-            <a:endParaRPr sz="1400" b="0" i="0" u="none" strike="noStrike" cap="none" dirty="0">
+            <a:endParaRPr sz="1200" b="0" i="0" u="none" strike="noStrike" cap="none" dirty="0">
               <a:solidFill>
                 <a:srgbClr val="000090"/>
               </a:solidFill>
@@ -6230,7 +6190,7 @@
               <a:buNone/>
             </a:pPr>
             <a:r>
-              <a:rPr lang="en-US" sz="3600" b="1" i="0" u="none" strike="noStrike" cap="none" dirty="0">
+              <a:rPr lang="en-US" sz="3200" b="1" i="0" u="none" strike="noStrike" cap="none" dirty="0">
                 <a:solidFill>
                   <a:srgbClr val="000090"/>
                 </a:solidFill>
@@ -6269,7 +6229,7 @@
         </p:nvSpPr>
         <p:spPr bwMode="auto">
           <a:xfrm>
-            <a:off x="1346200" y="2667000"/>
+            <a:off x="1346200" y="2759095"/>
             <a:ext cx="10617200" cy="1508105"/>
           </a:xfrm>
           <a:prstGeom prst="rect">
@@ -6444,14 +6404,14 @@
           <p:nvPr>
             <p:extLst>
               <p:ext uri="{D42A27DB-BD31-4B8C-83A1-F6EECF244321}">
-                <p14:modId xmlns:p14="http://schemas.microsoft.com/office/powerpoint/2010/main" val="398748063"/>
+                <p14:modId xmlns:p14="http://schemas.microsoft.com/office/powerpoint/2010/main" val="4113194960"/>
               </p:ext>
             </p:extLst>
           </p:nvPr>
         </p:nvGraphicFramePr>
         <p:xfrm>
-          <a:off x="389545" y="21485325"/>
-          <a:ext cx="12031055" cy="3279675"/>
+          <a:off x="198790" y="22188281"/>
+          <a:ext cx="12602811" cy="2629073"/>
         </p:xfrm>
         <a:graphic>
           <a:graphicData uri="http://schemas.openxmlformats.org/drawingml/2006/table">
@@ -6460,35 +6420,35 @@
                 <a:tableStyleId>{5C22544A-7EE6-4342-B048-85BDC9FD1C3A}</a:tableStyleId>
               </a:tblPr>
               <a:tblGrid>
-                <a:gridCol w="3535766">
+                <a:gridCol w="3703798">
                   <a:extLst>
                     <a:ext uri="{9D8B030D-6E8A-4147-A177-3AD203B41FA5}">
                       <a16:colId xmlns:a16="http://schemas.microsoft.com/office/drawing/2014/main" val="1785177098"/>
                     </a:ext>
                   </a:extLst>
                 </a:gridCol>
-                <a:gridCol w="1660659">
+                <a:gridCol w="1739579">
                   <a:extLst>
                     <a:ext uri="{9D8B030D-6E8A-4147-A177-3AD203B41FA5}">
                       <a16:colId xmlns:a16="http://schemas.microsoft.com/office/drawing/2014/main" val="77356670"/>
                     </a:ext>
                   </a:extLst>
                 </a:gridCol>
-                <a:gridCol w="2278210">
+                <a:gridCol w="2386478">
                   <a:extLst>
                     <a:ext uri="{9D8B030D-6E8A-4147-A177-3AD203B41FA5}">
                       <a16:colId xmlns:a16="http://schemas.microsoft.com/office/drawing/2014/main" val="3402814598"/>
                     </a:ext>
                   </a:extLst>
                 </a:gridCol>
-                <a:gridCol w="2278210">
+                <a:gridCol w="2386478">
                   <a:extLst>
                     <a:ext uri="{9D8B030D-6E8A-4147-A177-3AD203B41FA5}">
                       <a16:colId xmlns:a16="http://schemas.microsoft.com/office/drawing/2014/main" val="280787372"/>
                     </a:ext>
                   </a:extLst>
                 </a:gridCol>
-                <a:gridCol w="2278210">
+                <a:gridCol w="2386478">
                   <a:extLst>
                     <a:ext uri="{9D8B030D-6E8A-4147-A177-3AD203B41FA5}">
                       <a16:colId xmlns:a16="http://schemas.microsoft.com/office/drawing/2014/main" val="476310115"/>
@@ -6496,14 +6456,14 @@
                   </a:extLst>
                 </a:gridCol>
               </a:tblGrid>
-              <a:tr h="718257">
+              <a:tr h="597476">
                 <a:tc>
                   <a:txBody>
                     <a:bodyPr/>
                     <a:lstStyle/>
                     <a:p>
                       <a:r>
-                        <a:rPr lang="en-US" sz="3350" dirty="0">
+                        <a:rPr lang="en-US" sz="3300" dirty="0">
                           <a:solidFill>
                             <a:srgbClr val="000090"/>
                           </a:solidFill>
@@ -6561,7 +6521,7 @@
                     <a:p>
                       <a:pPr algn="ctr"/>
                       <a:r>
-                        <a:rPr lang="en-US" sz="3350" i="1" dirty="0">
+                        <a:rPr lang="en-US" sz="3300" i="1" dirty="0">
                           <a:solidFill>
                             <a:srgbClr val="000090"/>
                           </a:solidFill>
@@ -6623,7 +6583,7 @@
                     <a:p>
                       <a:pPr algn="ctr"/>
                       <a:r>
-                        <a:rPr lang="en-US" sz="3350" i="1" u="none" dirty="0">
+                        <a:rPr lang="en-US" sz="3300" i="1" u="none" dirty="0">
                           <a:solidFill>
                             <a:srgbClr val="000090"/>
                           </a:solidFill>
@@ -6631,7 +6591,7 @@
                         <a:t>M</a:t>
                       </a:r>
                       <a:r>
-                        <a:rPr lang="en-US" sz="3350" dirty="0">
+                        <a:rPr lang="en-US" sz="3300" dirty="0">
                           <a:solidFill>
                             <a:srgbClr val="000090"/>
                           </a:solidFill>
@@ -6693,7 +6653,7 @@
                     <a:p>
                       <a:pPr algn="ctr"/>
                       <a:r>
-                        <a:rPr lang="en-US" sz="3350" dirty="0">
+                        <a:rPr lang="en-US" sz="3300" dirty="0">
                           <a:solidFill>
                             <a:srgbClr val="000090"/>
                           </a:solidFill>
@@ -6755,7 +6715,7 @@
                     <a:p>
                       <a:pPr algn="ctr"/>
                       <a:r>
-                        <a:rPr lang="en-US" sz="3350" i="1" dirty="0">
+                        <a:rPr lang="en-US" sz="3300" i="1" dirty="0">
                           <a:solidFill>
                             <a:srgbClr val="000090"/>
                           </a:solidFill>
@@ -6763,7 +6723,7 @@
                         <a:t>M</a:t>
                       </a:r>
                       <a:r>
-                        <a:rPr lang="en-US" sz="3350" dirty="0">
+                        <a:rPr lang="en-US" sz="3300" dirty="0">
                           <a:solidFill>
                             <a:srgbClr val="000090"/>
                           </a:solidFill>
@@ -6820,20 +6780,17 @@
                   </a:ext>
                 </a:extLst>
               </a:tr>
-              <a:tr h="853806">
+              <a:tr h="677199">
                 <a:tc>
                   <a:txBody>
                     <a:bodyPr/>
                     <a:lstStyle/>
                     <a:p>
                       <a:r>
-                        <a:rPr lang="en-US" sz="3350" dirty="0">
+                        <a:rPr lang="en-US" sz="3300" dirty="0">
                           <a:solidFill>
                             <a:srgbClr val="000090"/>
                           </a:solidFill>
-                          <a:highlight>
-                            <a:srgbClr val="FFFF00"/>
-                          </a:highlight>
                         </a:rPr>
                         <a:t>Younger Adults</a:t>
                       </a:r>
@@ -6878,7 +6835,7 @@
                     <a:p>
                       <a:pPr algn="ctr"/>
                       <a:r>
-                        <a:rPr lang="en-US" sz="3350" dirty="0">
+                        <a:rPr lang="en-US" sz="3300" b="0" dirty="0">
                           <a:solidFill>
                             <a:srgbClr val="000090"/>
                           </a:solidFill>
@@ -6902,193 +6859,6 @@
                       <a:round/>
                       <a:headEnd type="none" w="med" len="med"/>
                       <a:tailEnd type="none" w="med" len="med"/>
-                    </a:lnT>
-                    <a:lnB w="12700" cmpd="sng">
-                      <a:noFill/>
-                    </a:lnB>
-                    <a:lnTlToBr w="12700" cmpd="sng">
-                      <a:noFill/>
-                      <a:prstDash val="solid"/>
-                    </a:lnTlToBr>
-                    <a:lnBlToTr w="12700" cmpd="sng">
-                      <a:noFill/>
-                      <a:prstDash val="solid"/>
-                    </a:lnBlToTr>
-                    <a:solidFill>
-                      <a:schemeClr val="bg1"/>
-                    </a:solidFill>
-                  </a:tcPr>
-                </a:tc>
-                <a:tc>
-                  <a:txBody>
-                    <a:bodyPr/>
-                    <a:lstStyle/>
-                    <a:p>
-                      <a:pPr algn="ctr"/>
-                      <a:endParaRPr lang="en-US" sz="3350" dirty="0">
-                        <a:solidFill>
-                          <a:srgbClr val="000090"/>
-                        </a:solidFill>
-                      </a:endParaRPr>
-                    </a:p>
-                  </a:txBody>
-                  <a:tcPr>
-                    <a:lnL w="12700" cmpd="sng">
-                      <a:noFill/>
-                    </a:lnL>
-                    <a:lnR w="12700" cmpd="sng">
-                      <a:noFill/>
-                    </a:lnR>
-                    <a:lnT w="28575" cap="flat" cmpd="sng" algn="ctr">
-                      <a:solidFill>
-                        <a:schemeClr val="tx1"/>
-                      </a:solidFill>
-                      <a:prstDash val="solid"/>
-                      <a:round/>
-                      <a:headEnd type="none" w="med" len="med"/>
-                      <a:tailEnd type="none" w="med" len="med"/>
-                    </a:lnT>
-                    <a:lnB w="12700" cmpd="sng">
-                      <a:noFill/>
-                    </a:lnB>
-                    <a:lnTlToBr w="12700" cmpd="sng">
-                      <a:noFill/>
-                      <a:prstDash val="solid"/>
-                    </a:lnTlToBr>
-                    <a:lnBlToTr w="12700" cmpd="sng">
-                      <a:noFill/>
-                      <a:prstDash val="solid"/>
-                    </a:lnBlToTr>
-                    <a:solidFill>
-                      <a:schemeClr val="bg1"/>
-                    </a:solidFill>
-                  </a:tcPr>
-                </a:tc>
-                <a:tc>
-                  <a:txBody>
-                    <a:bodyPr/>
-                    <a:lstStyle/>
-                    <a:p>
-                      <a:pPr algn="ctr"/>
-                      <a:endParaRPr lang="en-US" sz="3350" dirty="0">
-                        <a:solidFill>
-                          <a:srgbClr val="000090"/>
-                        </a:solidFill>
-                      </a:endParaRPr>
-                    </a:p>
-                  </a:txBody>
-                  <a:tcPr>
-                    <a:lnL w="12700" cmpd="sng">
-                      <a:noFill/>
-                    </a:lnL>
-                    <a:lnR w="12700" cmpd="sng">
-                      <a:noFill/>
-                    </a:lnR>
-                    <a:lnT w="28575" cap="flat" cmpd="sng" algn="ctr">
-                      <a:solidFill>
-                        <a:schemeClr val="tx1"/>
-                      </a:solidFill>
-                      <a:prstDash val="solid"/>
-                      <a:round/>
-                      <a:headEnd type="none" w="med" len="med"/>
-                      <a:tailEnd type="none" w="med" len="med"/>
-                    </a:lnT>
-                    <a:lnB w="12700" cmpd="sng">
-                      <a:noFill/>
-                    </a:lnB>
-                    <a:lnTlToBr w="12700" cmpd="sng">
-                      <a:noFill/>
-                      <a:prstDash val="solid"/>
-                    </a:lnTlToBr>
-                    <a:lnBlToTr w="12700" cmpd="sng">
-                      <a:noFill/>
-                      <a:prstDash val="solid"/>
-                    </a:lnBlToTr>
-                    <a:solidFill>
-                      <a:schemeClr val="bg1"/>
-                    </a:solidFill>
-                  </a:tcPr>
-                </a:tc>
-                <a:tc>
-                  <a:txBody>
-                    <a:bodyPr/>
-                    <a:lstStyle/>
-                    <a:p>
-                      <a:pPr algn="ctr"/>
-                      <a:endParaRPr lang="en-US" sz="3350" dirty="0">
-                        <a:solidFill>
-                          <a:srgbClr val="000090"/>
-                        </a:solidFill>
-                      </a:endParaRPr>
-                    </a:p>
-                  </a:txBody>
-                  <a:tcPr>
-                    <a:lnL w="12700" cmpd="sng">
-                      <a:noFill/>
-                    </a:lnL>
-                    <a:lnR w="12700" cmpd="sng">
-                      <a:noFill/>
-                    </a:lnR>
-                    <a:lnT w="28575" cap="flat" cmpd="sng" algn="ctr">
-                      <a:solidFill>
-                        <a:schemeClr val="tx1"/>
-                      </a:solidFill>
-                      <a:prstDash val="solid"/>
-                      <a:round/>
-                      <a:headEnd type="none" w="med" len="med"/>
-                      <a:tailEnd type="none" w="med" len="med"/>
-                    </a:lnT>
-                    <a:lnB w="28575" cap="flat" cmpd="sng" algn="ctr">
-                      <a:noFill/>
-                      <a:prstDash val="solid"/>
-                      <a:round/>
-                      <a:headEnd type="none" w="med" len="med"/>
-                      <a:tailEnd type="none" w="med" len="med"/>
-                    </a:lnB>
-                    <a:lnTlToBr w="12700" cmpd="sng">
-                      <a:noFill/>
-                      <a:prstDash val="solid"/>
-                    </a:lnTlToBr>
-                    <a:lnBlToTr w="12700" cmpd="sng">
-                      <a:noFill/>
-                      <a:prstDash val="solid"/>
-                    </a:lnBlToTr>
-                    <a:solidFill>
-                      <a:schemeClr val="bg1"/>
-                    </a:solidFill>
-                  </a:tcPr>
-                </a:tc>
-                <a:extLst>
-                  <a:ext uri="{0D108BD9-81ED-4DB2-BD59-A6C34878D82A}">
-                    <a16:rowId xmlns:a16="http://schemas.microsoft.com/office/drawing/2014/main" val="1103275921"/>
-                  </a:ext>
-                </a:extLst>
-              </a:tr>
-              <a:tr h="853806">
-                <a:tc>
-                  <a:txBody>
-                    <a:bodyPr/>
-                    <a:lstStyle/>
-                    <a:p>
-                      <a:r>
-                        <a:rPr lang="en-US" sz="3350" dirty="0">
-                          <a:solidFill>
-                            <a:srgbClr val="000090"/>
-                          </a:solidFill>
-                        </a:rPr>
-                        <a:t>Healthy Older</a:t>
-                      </a:r>
-                    </a:p>
-                  </a:txBody>
-                  <a:tcPr>
-                    <a:lnL w="12700" cmpd="sng">
-                      <a:noFill/>
-                    </a:lnL>
-                    <a:lnR w="12700" cmpd="sng">
-                      <a:noFill/>
-                    </a:lnR>
-                    <a:lnT w="12700" cmpd="sng">
-                      <a:noFill/>
                     </a:lnT>
                     <a:lnB w="12700" cmpd="sng">
                       <a:noFill/>
@@ -7113,12 +6883,12 @@
                     <a:p>
                       <a:pPr algn="ctr"/>
                       <a:r>
-                        <a:rPr lang="en-US" sz="3350" dirty="0">
+                        <a:rPr lang="en-US" sz="3300" b="0" dirty="0">
                           <a:solidFill>
                             <a:srgbClr val="000090"/>
                           </a:solidFill>
                         </a:rPr>
-                        <a:t>33</a:t>
+                        <a:t>19.67</a:t>
                       </a:r>
                     </a:p>
                   </a:txBody>
@@ -7129,8 +6899,14 @@
                     <a:lnR w="12700" cmpd="sng">
                       <a:noFill/>
                     </a:lnR>
-                    <a:lnT w="12700" cmpd="sng">
-                      <a:noFill/>
+                    <a:lnT w="28575" cap="flat" cmpd="sng" algn="ctr">
+                      <a:solidFill>
+                        <a:schemeClr val="tx1"/>
+                      </a:solidFill>
+                      <a:prstDash val="solid"/>
+                      <a:round/>
+                      <a:headEnd type="none" w="med" len="med"/>
+                      <a:tailEnd type="none" w="med" len="med"/>
                     </a:lnT>
                     <a:lnB w="12700" cmpd="sng">
                       <a:noFill/>
@@ -7155,12 +6931,12 @@
                     <a:p>
                       <a:pPr algn="ctr"/>
                       <a:r>
-                        <a:rPr lang="en-US" sz="3350" dirty="0">
+                        <a:rPr lang="en-US" sz="3300" b="0" dirty="0">
                           <a:solidFill>
                             <a:srgbClr val="000090"/>
                           </a:solidFill>
                         </a:rPr>
-                        <a:t>73.92</a:t>
+                        <a:t>66%</a:t>
                       </a:r>
                     </a:p>
                   </a:txBody>
@@ -7171,8 +6947,14 @@
                     <a:lnR w="12700" cmpd="sng">
                       <a:noFill/>
                     </a:lnR>
-                    <a:lnT w="12700" cmpd="sng">
-                      <a:noFill/>
+                    <a:lnT w="28575" cap="flat" cmpd="sng" algn="ctr">
+                      <a:solidFill>
+                        <a:schemeClr val="tx1"/>
+                      </a:solidFill>
+                      <a:prstDash val="solid"/>
+                      <a:round/>
+                      <a:headEnd type="none" w="med" len="med"/>
+                      <a:tailEnd type="none" w="med" len="med"/>
                     </a:lnT>
                     <a:lnB w="12700" cmpd="sng">
                       <a:noFill/>
@@ -7197,12 +6979,70 @@
                     <a:p>
                       <a:pPr algn="ctr"/>
                       <a:r>
-                        <a:rPr lang="en-US" sz="3350" dirty="0">
+                        <a:rPr lang="en-US" sz="3300" b="0" dirty="0">
                           <a:solidFill>
                             <a:srgbClr val="000090"/>
                           </a:solidFill>
                         </a:rPr>
-                        <a:t>75%</a:t>
+                        <a:t>28.36</a:t>
+                      </a:r>
+                    </a:p>
+                  </a:txBody>
+                  <a:tcPr>
+                    <a:lnL w="12700" cmpd="sng">
+                      <a:noFill/>
+                    </a:lnL>
+                    <a:lnR w="12700" cmpd="sng">
+                      <a:noFill/>
+                    </a:lnR>
+                    <a:lnT w="28575" cap="flat" cmpd="sng" algn="ctr">
+                      <a:solidFill>
+                        <a:schemeClr val="tx1"/>
+                      </a:solidFill>
+                      <a:prstDash val="solid"/>
+                      <a:round/>
+                      <a:headEnd type="none" w="med" len="med"/>
+                      <a:tailEnd type="none" w="med" len="med"/>
+                    </a:lnT>
+                    <a:lnB w="28575" cap="flat" cmpd="sng" algn="ctr">
+                      <a:noFill/>
+                      <a:prstDash val="solid"/>
+                      <a:round/>
+                      <a:headEnd type="none" w="med" len="med"/>
+                      <a:tailEnd type="none" w="med" len="med"/>
+                    </a:lnB>
+                    <a:lnTlToBr w="12700" cmpd="sng">
+                      <a:noFill/>
+                      <a:prstDash val="solid"/>
+                    </a:lnTlToBr>
+                    <a:lnBlToTr w="12700" cmpd="sng">
+                      <a:noFill/>
+                      <a:prstDash val="solid"/>
+                    </a:lnBlToTr>
+                    <a:solidFill>
+                      <a:schemeClr val="bg1"/>
+                    </a:solidFill>
+                  </a:tcPr>
+                </a:tc>
+                <a:extLst>
+                  <a:ext uri="{0D108BD9-81ED-4DB2-BD59-A6C34878D82A}">
+                    <a16:rowId xmlns:a16="http://schemas.microsoft.com/office/drawing/2014/main" val="1103275921"/>
+                  </a:ext>
+                </a:extLst>
+              </a:tr>
+              <a:tr h="677199">
+                <a:tc>
+                  <a:txBody>
+                    <a:bodyPr/>
+                    <a:lstStyle/>
+                    <a:p>
+                      <a:r>
+                        <a:rPr lang="en-US" sz="3300" dirty="0">
+                          <a:solidFill>
+                            <a:srgbClr val="000090"/>
+                          </a:solidFill>
+                        </a:rPr>
+                        <a:t>Healthy Older</a:t>
                       </a:r>
                     </a:p>
                   </a:txBody>
@@ -7239,12 +7079,12 @@
                     <a:p>
                       <a:pPr algn="ctr"/>
                       <a:r>
-                        <a:rPr lang="en-US" sz="3350" dirty="0">
+                        <a:rPr lang="en-US" sz="3300" b="0" dirty="0">
                           <a:solidFill>
                             <a:srgbClr val="000090"/>
                           </a:solidFill>
                         </a:rPr>
-                        <a:t>27.75</a:t>
+                        <a:t>33</a:t>
                       </a:r>
                     </a:p>
                   </a:txBody>
@@ -7255,69 +7095,11 @@
                     <a:lnR w="12700" cmpd="sng">
                       <a:noFill/>
                     </a:lnR>
-                    <a:lnT w="28575" cap="flat" cmpd="sng" algn="ctr">
-                      <a:noFill/>
-                      <a:prstDash val="solid"/>
-                      <a:round/>
-                      <a:headEnd type="none" w="med" len="med"/>
-                      <a:tailEnd type="none" w="med" len="med"/>
+                    <a:lnT w="12700" cmpd="sng">
+                      <a:noFill/>
                     </a:lnT>
                     <a:lnB w="12700" cmpd="sng">
                       <a:noFill/>
-                    </a:lnB>
-                    <a:lnTlToBr w="12700" cmpd="sng">
-                      <a:noFill/>
-                      <a:prstDash val="solid"/>
-                    </a:lnTlToBr>
-                    <a:lnBlToTr w="12700" cmpd="sng">
-                      <a:noFill/>
-                      <a:prstDash val="solid"/>
-                    </a:lnBlToTr>
-                    <a:solidFill>
-                      <a:schemeClr val="bg1"/>
-                    </a:solidFill>
-                  </a:tcPr>
-                </a:tc>
-                <a:extLst>
-                  <a:ext uri="{0D108BD9-81ED-4DB2-BD59-A6C34878D82A}">
-                    <a16:rowId xmlns:a16="http://schemas.microsoft.com/office/drawing/2014/main" val="521672889"/>
-                  </a:ext>
-                </a:extLst>
-              </a:tr>
-              <a:tr h="853806">
-                <a:tc>
-                  <a:txBody>
-                    <a:bodyPr/>
-                    <a:lstStyle/>
-                    <a:p>
-                      <a:r>
-                        <a:rPr lang="en-US" sz="3350" dirty="0">
-                          <a:solidFill>
-                            <a:srgbClr val="000090"/>
-                          </a:solidFill>
-                        </a:rPr>
-                        <a:t>MCI Older</a:t>
-                      </a:r>
-                    </a:p>
-                  </a:txBody>
-                  <a:tcPr>
-                    <a:lnL w="12700" cmpd="sng">
-                      <a:noFill/>
-                    </a:lnL>
-                    <a:lnR w="12700" cmpd="sng">
-                      <a:noFill/>
-                    </a:lnR>
-                    <a:lnT w="12700" cmpd="sng">
-                      <a:noFill/>
-                    </a:lnT>
-                    <a:lnB w="28575" cap="flat" cmpd="sng" algn="ctr">
-                      <a:solidFill>
-                        <a:schemeClr val="tx1"/>
-                      </a:solidFill>
-                      <a:prstDash val="solid"/>
-                      <a:round/>
-                      <a:headEnd type="none" w="med" len="med"/>
-                      <a:tailEnd type="none" w="med" len="med"/>
                     </a:lnB>
                     <a:lnTlToBr w="12700" cmpd="sng">
                       <a:noFill/>
@@ -7339,12 +7121,12 @@
                     <a:p>
                       <a:pPr algn="ctr"/>
                       <a:r>
-                        <a:rPr lang="en-US" sz="3350" dirty="0">
+                        <a:rPr lang="en-US" sz="3300" b="0" dirty="0">
                           <a:solidFill>
                             <a:srgbClr val="000090"/>
                           </a:solidFill>
                         </a:rPr>
-                        <a:t>26</a:t>
+                        <a:t>73.92</a:t>
                       </a:r>
                     </a:p>
                   </a:txBody>
@@ -7358,14 +7140,8 @@
                     <a:lnT w="12700" cmpd="sng">
                       <a:noFill/>
                     </a:lnT>
-                    <a:lnB w="28575" cap="flat" cmpd="sng" algn="ctr">
-                      <a:solidFill>
-                        <a:schemeClr val="tx1"/>
-                      </a:solidFill>
-                      <a:prstDash val="solid"/>
-                      <a:round/>
-                      <a:headEnd type="none" w="med" len="med"/>
-                      <a:tailEnd type="none" w="med" len="med"/>
+                    <a:lnB w="12700" cmpd="sng">
+                      <a:noFill/>
                     </a:lnB>
                     <a:lnTlToBr w="12700" cmpd="sng">
                       <a:noFill/>
@@ -7387,12 +7163,12 @@
                     <a:p>
                       <a:pPr algn="ctr"/>
                       <a:r>
-                        <a:rPr lang="en-US" sz="3350" dirty="0">
+                        <a:rPr lang="en-US" sz="3300" b="0" dirty="0">
                           <a:solidFill>
                             <a:srgbClr val="000090"/>
                           </a:solidFill>
                         </a:rPr>
-                        <a:t>75.88</a:t>
+                        <a:t>75%</a:t>
                       </a:r>
                     </a:p>
                   </a:txBody>
@@ -7406,14 +7182,8 @@
                     <a:lnT w="12700" cmpd="sng">
                       <a:noFill/>
                     </a:lnT>
-                    <a:lnB w="28575" cap="flat" cmpd="sng" algn="ctr">
-                      <a:solidFill>
-                        <a:schemeClr val="tx1"/>
-                      </a:solidFill>
-                      <a:prstDash val="solid"/>
-                      <a:round/>
-                      <a:headEnd type="none" w="med" len="med"/>
-                      <a:tailEnd type="none" w="med" len="med"/>
+                    <a:lnB w="12700" cmpd="sng">
+                      <a:noFill/>
                     </a:lnB>
                     <a:lnTlToBr w="12700" cmpd="sng">
                       <a:noFill/>
@@ -7435,12 +7205,64 @@
                     <a:p>
                       <a:pPr algn="ctr"/>
                       <a:r>
-                        <a:rPr lang="en-US" sz="3350" dirty="0">
+                        <a:rPr lang="en-US" sz="3300" b="0" dirty="0">
                           <a:solidFill>
                             <a:srgbClr val="000090"/>
                           </a:solidFill>
                         </a:rPr>
-                        <a:t>41%</a:t>
+                        <a:t>27.75</a:t>
+                      </a:r>
+                    </a:p>
+                  </a:txBody>
+                  <a:tcPr>
+                    <a:lnL w="12700" cmpd="sng">
+                      <a:noFill/>
+                    </a:lnL>
+                    <a:lnR w="12700" cmpd="sng">
+                      <a:noFill/>
+                    </a:lnR>
+                    <a:lnT w="28575" cap="flat" cmpd="sng" algn="ctr">
+                      <a:noFill/>
+                      <a:prstDash val="solid"/>
+                      <a:round/>
+                      <a:headEnd type="none" w="med" len="med"/>
+                      <a:tailEnd type="none" w="med" len="med"/>
+                    </a:lnT>
+                    <a:lnB w="12700" cmpd="sng">
+                      <a:noFill/>
+                    </a:lnB>
+                    <a:lnTlToBr w="12700" cmpd="sng">
+                      <a:noFill/>
+                      <a:prstDash val="solid"/>
+                    </a:lnTlToBr>
+                    <a:lnBlToTr w="12700" cmpd="sng">
+                      <a:noFill/>
+                      <a:prstDash val="solid"/>
+                    </a:lnBlToTr>
+                    <a:solidFill>
+                      <a:schemeClr val="bg1"/>
+                    </a:solidFill>
+                  </a:tcPr>
+                </a:tc>
+                <a:extLst>
+                  <a:ext uri="{0D108BD9-81ED-4DB2-BD59-A6C34878D82A}">
+                    <a16:rowId xmlns:a16="http://schemas.microsoft.com/office/drawing/2014/main" val="521672889"/>
+                  </a:ext>
+                </a:extLst>
+              </a:tr>
+              <a:tr h="677199">
+                <a:tc>
+                  <a:txBody>
+                    <a:bodyPr/>
+                    <a:lstStyle/>
+                    <a:p>
+                      <a:r>
+                        <a:rPr lang="en-US" sz="3300" dirty="0">
+                          <a:solidFill>
+                            <a:srgbClr val="000090"/>
+                          </a:solidFill>
+                        </a:rPr>
+                        <a:t>MCI Older</a:t>
                       </a:r>
                     </a:p>
                   </a:txBody>
@@ -7483,7 +7305,151 @@
                     <a:p>
                       <a:pPr algn="ctr"/>
                       <a:r>
-                        <a:rPr lang="en-US" sz="3350" dirty="0">
+                        <a:rPr lang="en-US" sz="3300" b="0" dirty="0">
+                          <a:solidFill>
+                            <a:srgbClr val="000090"/>
+                          </a:solidFill>
+                        </a:rPr>
+                        <a:t>26</a:t>
+                      </a:r>
+                    </a:p>
+                  </a:txBody>
+                  <a:tcPr>
+                    <a:lnL w="12700" cmpd="sng">
+                      <a:noFill/>
+                    </a:lnL>
+                    <a:lnR w="12700" cmpd="sng">
+                      <a:noFill/>
+                    </a:lnR>
+                    <a:lnT w="12700" cmpd="sng">
+                      <a:noFill/>
+                    </a:lnT>
+                    <a:lnB w="28575" cap="flat" cmpd="sng" algn="ctr">
+                      <a:solidFill>
+                        <a:schemeClr val="tx1"/>
+                      </a:solidFill>
+                      <a:prstDash val="solid"/>
+                      <a:round/>
+                      <a:headEnd type="none" w="med" len="med"/>
+                      <a:tailEnd type="none" w="med" len="med"/>
+                    </a:lnB>
+                    <a:lnTlToBr w="12700" cmpd="sng">
+                      <a:noFill/>
+                      <a:prstDash val="solid"/>
+                    </a:lnTlToBr>
+                    <a:lnBlToTr w="12700" cmpd="sng">
+                      <a:noFill/>
+                      <a:prstDash val="solid"/>
+                    </a:lnBlToTr>
+                    <a:solidFill>
+                      <a:schemeClr val="bg1"/>
+                    </a:solidFill>
+                  </a:tcPr>
+                </a:tc>
+                <a:tc>
+                  <a:txBody>
+                    <a:bodyPr/>
+                    <a:lstStyle/>
+                    <a:p>
+                      <a:pPr algn="ctr"/>
+                      <a:r>
+                        <a:rPr lang="en-US" sz="3300" b="0" dirty="0">
+                          <a:solidFill>
+                            <a:srgbClr val="000090"/>
+                          </a:solidFill>
+                        </a:rPr>
+                        <a:t>75.88</a:t>
+                      </a:r>
+                    </a:p>
+                  </a:txBody>
+                  <a:tcPr>
+                    <a:lnL w="12700" cmpd="sng">
+                      <a:noFill/>
+                    </a:lnL>
+                    <a:lnR w="12700" cmpd="sng">
+                      <a:noFill/>
+                    </a:lnR>
+                    <a:lnT w="12700" cmpd="sng">
+                      <a:noFill/>
+                    </a:lnT>
+                    <a:lnB w="28575" cap="flat" cmpd="sng" algn="ctr">
+                      <a:solidFill>
+                        <a:schemeClr val="tx1"/>
+                      </a:solidFill>
+                      <a:prstDash val="solid"/>
+                      <a:round/>
+                      <a:headEnd type="none" w="med" len="med"/>
+                      <a:tailEnd type="none" w="med" len="med"/>
+                    </a:lnB>
+                    <a:lnTlToBr w="12700" cmpd="sng">
+                      <a:noFill/>
+                      <a:prstDash val="solid"/>
+                    </a:lnTlToBr>
+                    <a:lnBlToTr w="12700" cmpd="sng">
+                      <a:noFill/>
+                      <a:prstDash val="solid"/>
+                    </a:lnBlToTr>
+                    <a:solidFill>
+                      <a:schemeClr val="bg1"/>
+                    </a:solidFill>
+                  </a:tcPr>
+                </a:tc>
+                <a:tc>
+                  <a:txBody>
+                    <a:bodyPr/>
+                    <a:lstStyle/>
+                    <a:p>
+                      <a:pPr algn="ctr"/>
+                      <a:r>
+                        <a:rPr lang="en-US" sz="3300" b="0" dirty="0">
+                          <a:solidFill>
+                            <a:srgbClr val="000090"/>
+                          </a:solidFill>
+                        </a:rPr>
+                        <a:t>41%</a:t>
+                      </a:r>
+                    </a:p>
+                  </a:txBody>
+                  <a:tcPr>
+                    <a:lnL w="12700" cmpd="sng">
+                      <a:noFill/>
+                    </a:lnL>
+                    <a:lnR w="12700" cmpd="sng">
+                      <a:noFill/>
+                    </a:lnR>
+                    <a:lnT w="12700" cmpd="sng">
+                      <a:noFill/>
+                    </a:lnT>
+                    <a:lnB w="28575" cap="flat" cmpd="sng" algn="ctr">
+                      <a:solidFill>
+                        <a:schemeClr val="tx1"/>
+                      </a:solidFill>
+                      <a:prstDash val="solid"/>
+                      <a:round/>
+                      <a:headEnd type="none" w="med" len="med"/>
+                      <a:tailEnd type="none" w="med" len="med"/>
+                    </a:lnB>
+                    <a:lnTlToBr w="12700" cmpd="sng">
+                      <a:noFill/>
+                      <a:prstDash val="solid"/>
+                    </a:lnTlToBr>
+                    <a:lnBlToTr w="12700" cmpd="sng">
+                      <a:noFill/>
+                      <a:prstDash val="solid"/>
+                    </a:lnBlToTr>
+                    <a:solidFill>
+                      <a:schemeClr val="bg1"/>
+                    </a:solidFill>
+                  </a:tcPr>
+                </a:tc>
+                <a:tc>
+                  <a:txBody>
+                    <a:bodyPr/>
+                    <a:lstStyle/>
+                    <a:p>
+                      <a:pPr algn="ctr"/>
+                      <a:r>
+                        <a:rPr lang="en-US" sz="3300" b="0" dirty="0">
                           <a:solidFill>
                             <a:srgbClr val="000090"/>
                           </a:solidFill>
@@ -7550,7 +7516,7 @@
         </p:nvSpPr>
         <p:spPr bwMode="auto">
           <a:xfrm>
-            <a:off x="1219200" y="24857095"/>
+            <a:off x="1378431" y="24993600"/>
             <a:ext cx="10617200" cy="1508105"/>
           </a:xfrm>
           <a:prstGeom prst="rect">
@@ -7604,8 +7570,8 @@
         </p:nvSpPr>
         <p:spPr>
           <a:xfrm>
-            <a:off x="393524" y="25871269"/>
-            <a:ext cx="7227171" cy="646331"/>
+            <a:off x="588257" y="26085225"/>
+            <a:ext cx="7227171" cy="584775"/>
           </a:xfrm>
           <a:prstGeom prst="rect">
             <a:avLst/>
@@ -7619,7 +7585,7 @@
           <a:lstStyle/>
           <a:p>
             <a:r>
-              <a:rPr lang="en-US" sz="3600" b="1" u="sng" dirty="0">
+              <a:rPr lang="en-US" sz="3200" b="1" u="sng" dirty="0">
                 <a:solidFill>
                   <a:srgbClr val="000090"/>
                 </a:solidFill>
@@ -7627,7 +7593,7 @@
               <a:t>Letters</a:t>
             </a:r>
             <a:r>
-              <a:rPr lang="en-US" sz="3600" b="1" dirty="0">
+              <a:rPr lang="en-US" sz="3200" b="1" dirty="0">
                 <a:solidFill>
                   <a:srgbClr val="000090"/>
                 </a:solidFill>
@@ -7635,11 +7601,11 @@
               <a:t>:</a:t>
             </a:r>
             <a:r>
-              <a:rPr lang="en-US" sz="3600" dirty="0"/>
+              <a:rPr lang="en-US" sz="3200" dirty="0"/>
               <a:t> </a:t>
             </a:r>
             <a:r>
-              <a:rPr lang="en-US" sz="3500" dirty="0">
+              <a:rPr lang="en-US" sz="3200" dirty="0">
                 <a:solidFill>
                   <a:srgbClr val="000090"/>
                 </a:solidFill>
@@ -7663,8 +7629,8 @@
         </p:nvSpPr>
         <p:spPr>
           <a:xfrm>
-            <a:off x="8839200" y="25871269"/>
-            <a:ext cx="6644850" cy="646331"/>
+            <a:off x="8899950" y="26060400"/>
+            <a:ext cx="6644850" cy="584775"/>
           </a:xfrm>
           <a:prstGeom prst="rect">
             <a:avLst/>
@@ -7678,7 +7644,7 @@
           <a:lstStyle/>
           <a:p>
             <a:r>
-              <a:rPr lang="en-US" sz="3600" b="1" u="sng" dirty="0">
+              <a:rPr lang="en-US" sz="3200" b="1" u="sng" dirty="0">
                 <a:solidFill>
                   <a:srgbClr val="000090"/>
                 </a:solidFill>
@@ -7686,7 +7652,7 @@
               <a:t>Numbers</a:t>
             </a:r>
             <a:r>
-              <a:rPr lang="en-US" sz="3600" b="1" dirty="0">
+              <a:rPr lang="en-US" sz="3200" b="1" dirty="0">
                 <a:solidFill>
                   <a:srgbClr val="000090"/>
                 </a:solidFill>
@@ -7694,11 +7660,11 @@
               <a:t>:</a:t>
             </a:r>
             <a:r>
-              <a:rPr lang="en-US" sz="3600" dirty="0"/>
+              <a:rPr lang="en-US" sz="3200" dirty="0"/>
               <a:t> </a:t>
             </a:r>
             <a:r>
-              <a:rPr lang="en-US" sz="3500" dirty="0">
+              <a:rPr lang="en-US" sz="3200" dirty="0">
                 <a:solidFill>
                   <a:srgbClr val="000090"/>
                 </a:solidFill>
@@ -8092,8 +8058,8 @@
         </p:blipFill>
         <p:spPr>
           <a:xfrm>
-            <a:off x="28346400" y="14325600"/>
-            <a:ext cx="13077011" cy="4307933"/>
+            <a:off x="28346400" y="14249400"/>
+            <a:ext cx="13034351" cy="4293880"/>
           </a:xfrm>
           <a:prstGeom prst="rect">
             <a:avLst/>
@@ -8174,7 +8140,7 @@
         </p:nvSpPr>
         <p:spPr bwMode="auto">
           <a:xfrm>
-            <a:off x="30403800" y="19812000"/>
+            <a:off x="30327600" y="19539228"/>
             <a:ext cx="9372600" cy="1415772"/>
           </a:xfrm>
           <a:prstGeom prst="rect">

</xml_diff>

<commit_message>
finishing up poster plots
</commit_message>
<xml_diff>
--- a/5 Presentations/Posters/Namias Maxwell Huff Cog Aging 2022.pptx
+++ b/5 Presentations/Posters/Namias Maxwell Huff Cog Aging 2022.pptx
@@ -159,6 +159,12 @@
 </p:presentation>
 </file>
 
+<file path=ppt/authors.xml><?xml version="1.0" encoding="utf-8"?>
+<p188:authorLst xmlns:a="http://schemas.openxmlformats.org/drawingml/2006/main" xmlns:r="http://schemas.openxmlformats.org/officeDocument/2006/relationships" xmlns:p188="http://schemas.microsoft.com/office/powerpoint/2018/8/main">
+  <p188:author id="{87FE9073-15DF-6984-6A99-74371DB31B9B}" name="Nick Maxwell" initials="NM" userId="Nick Maxwell" providerId="None"/>
+</p188:authorLst>
+</file>
+
 <file path=ppt/commentAuthors.xml><?xml version="1.0" encoding="utf-8"?>
 <p:cmAuthorLst xmlns:a="http://schemas.openxmlformats.org/drawingml/2006/main" xmlns:r="http://schemas.openxmlformats.org/officeDocument/2006/relationships" xmlns:p="http://schemas.openxmlformats.org/presentationml/2006/main">
   <p:cmAuthor id="1" name="Mary Pyc" initials="MP" lastIdx="1" clrIdx="0"/>
@@ -223,18 +229,30 @@
 </pc:chgInfo>
 </file>
 
-<file path=ppt/comments/comment1.xml><?xml version="1.0" encoding="utf-8"?>
-<p:cmLst xmlns:a="http://schemas.openxmlformats.org/drawingml/2006/main" xmlns:r="http://schemas.openxmlformats.org/officeDocument/2006/relationships" xmlns:p="http://schemas.openxmlformats.org/presentationml/2006/main">
-  <p:cm authorId="4" dt="2022-03-03T11:27:51.966" idx="6">
-    <p:pos x="26236" y="18376"/>
-    <p:text>Take a look at the abstract</p:text>
-    <p:extLst>
-      <p:ext uri="{C676402C-5697-4E1C-873F-D02D1690AC5C}">
-        <p15:threadingInfo xmlns:p15="http://schemas.microsoft.com/office/powerpoint/2012/main" timeZoneBias="360"/>
-      </p:ext>
-    </p:extLst>
-  </p:cm>
-</p:cmLst>
+<file path=ppt/comments/modernComment_100_0.xml><?xml version="1.0" encoding="utf-8"?>
+<p188:cmLst xmlns:a="http://schemas.openxmlformats.org/drawingml/2006/main" xmlns:r="http://schemas.openxmlformats.org/officeDocument/2006/relationships" xmlns:p188="http://schemas.microsoft.com/office/powerpoint/2018/8/main">
+  <p188:cm id="{A6F9BA71-7820-4190-B5DB-B34611DB37B6}" authorId="{87FE9073-15DF-6984-6A99-74371DB31B9B}" created="2022-03-14T21:12:12.913">
+    <ac:txMkLst xmlns:ac="http://schemas.microsoft.com/office/drawing/2013/main/command">
+      <pc:docMk xmlns:pc="http://schemas.microsoft.com/office/powerpoint/2013/main/command"/>
+      <pc:sldMk xmlns:pc="http://schemas.microsoft.com/office/powerpoint/2013/main/command" cId="0" sldId="256"/>
+      <ac:spMk id="54" creationId="{00000000-0000-0000-0000-000000000000}"/>
+      <ac:txMk cp="821" len="10">
+        <ac:context len="1640" hash="501255227"/>
+      </ac:txMk>
+    </ac:txMkLst>
+    <p188:pos x="1843674" y="5484130"/>
+    <p188:txBody>
+      <a:bodyPr/>
+      <a:lstStyle/>
+      <a:p>
+        <a:r>
+          <a:rPr lang="en-US"/>
+          <a:t>Run some analyses</a:t>
+        </a:r>
+      </a:p>
+    </p188:txBody>
+  </p188:cm>
+</p188:cmLst>
 </file>
 
 <file path=ppt/handoutMasters/handoutMaster1.xml><?xml version="1.0" encoding="utf-8"?>
@@ -349,7 +367,7 @@
               <a:pPr>
                 <a:defRPr/>
               </a:pPr>
-              <a:t>3/11/2022</a:t>
+              <a:t>3/14/2022</a:t>
             </a:fld>
             <a:endParaRPr lang="en-US"/>
           </a:p>
@@ -571,7 +589,7 @@
               <a:pPr>
                 <a:defRPr/>
               </a:pPr>
-              <a:t>3/11/2022</a:t>
+              <a:t>3/14/2022</a:t>
             </a:fld>
             <a:endParaRPr lang="en-US"/>
           </a:p>
@@ -3270,8 +3288,8 @@
         </p:nvSpPr>
         <p:spPr>
           <a:xfrm>
-            <a:off x="13106400" y="2667001"/>
-            <a:ext cx="14439440" cy="27495156"/>
+            <a:off x="13106400" y="2667000"/>
+            <a:ext cx="13746003" cy="28768856"/>
           </a:xfrm>
           <a:prstGeom prst="roundRect">
             <a:avLst/>
@@ -3326,7 +3344,7 @@
         <p:spPr>
           <a:xfrm>
             <a:off x="245828" y="17297400"/>
-            <a:ext cx="12649948" cy="8263283"/>
+            <a:ext cx="12649948" cy="8051995"/>
           </a:xfrm>
           <a:prstGeom prst="roundRect">
             <a:avLst/>
@@ -3507,8 +3525,8 @@
         </p:nvSpPr>
         <p:spPr>
           <a:xfrm>
-            <a:off x="27756465" y="19621285"/>
-            <a:ext cx="14107146" cy="11814571"/>
+            <a:off x="27203400" y="17935434"/>
+            <a:ext cx="14689754" cy="11960677"/>
           </a:xfrm>
           <a:prstGeom prst="roundRect">
             <a:avLst/>
@@ -3564,8 +3582,8 @@
         </p:nvSpPr>
         <p:spPr bwMode="auto">
           <a:xfrm>
-            <a:off x="681649" y="3505200"/>
-            <a:ext cx="12092598" cy="13682546"/>
+            <a:off x="393524" y="3623736"/>
+            <a:ext cx="12502249" cy="13597464"/>
           </a:xfrm>
           <a:prstGeom prst="rect">
             <a:avLst/>
@@ -3607,7 +3625,7 @@
                 <a:cs typeface="Calibri"/>
                 <a:sym typeface="Calibri"/>
               </a:rPr>
-              <a:t>In the Consonant-Vowel/Odd-Even switch task (CVOE, </a:t>
+              <a:t>In the Consonant-Vowel/Odd-Even task (CVOE, </a:t>
             </a:r>
             <a:r>
               <a:rPr lang="en-US" sz="3100" b="0" i="0" u="none" strike="noStrike" cap="none" dirty="0" err="1">
@@ -3655,7 +3673,7 @@
                 <a:cs typeface="Calibri"/>
                 <a:sym typeface="Calibri"/>
               </a:rPr>
-              <a:t>(e.g., A 08) and quickly classify the letter (Consonant/Vowel) or the number (Odd/Even). Because participants complete both </a:t>
+              <a:t>(e.g., A 08) and quickly classify the letter (Consonant/Vowel) or number (Odd/Even). Because participants complete </a:t>
             </a:r>
             <a:r>
               <a:rPr lang="en-US" sz="3100" dirty="0">
@@ -3667,7 +3685,7 @@
                 <a:cs typeface="Calibri"/>
                 <a:sym typeface="Calibri"/>
               </a:rPr>
-              <a:t>pure blocks (e.g., all trials are the CV task)</a:t>
+              <a:t>pure blocks (i.e.., all trials are the same task)</a:t>
             </a:r>
             <a:r>
               <a:rPr lang="en-US" sz="3100" b="0" i="0" u="none" strike="noStrike" cap="none" dirty="0">
@@ -3679,7 +3697,7 @@
                 <a:cs typeface="Calibri"/>
                 <a:sym typeface="Calibri"/>
               </a:rPr>
-              <a:t> and switch blocks (e.g., participants switch between both classification tasks), this task allows for comparisons between </a:t>
+              <a:t> and switch blocks (i.e.., switching between both classification tasks), the CVOE can be used to compare </a:t>
             </a:r>
             <a:r>
               <a:rPr lang="en-US" sz="3100" i="1" dirty="0">
@@ -3915,7 +3933,7 @@
           <a:p>
             <a:pPr algn="ctr" defTabSz="1347788" eaLnBrk="0" hangingPunct="0"/>
             <a:r>
-              <a:rPr lang="en-US" sz="4800" b="1" u="sng" dirty="0">
+              <a:rPr lang="en-US" sz="4600" b="1" u="sng" dirty="0">
                 <a:solidFill>
                   <a:srgbClr val="0080FF"/>
                 </a:solidFill>
@@ -3943,8 +3961,8 @@
         </p:nvSpPr>
         <p:spPr bwMode="auto">
           <a:xfrm>
-            <a:off x="28500249" y="20345400"/>
-            <a:ext cx="12952551" cy="10965656"/>
+            <a:off x="27594107" y="18880205"/>
+            <a:ext cx="14087294" cy="10380595"/>
           </a:xfrm>
           <a:prstGeom prst="rect">
             <a:avLst/>
@@ -3967,14 +3985,14 @@
               </a:spcBef>
             </a:pPr>
             <a:r>
-              <a:rPr lang="en-US" sz="3050" dirty="0">
+              <a:rPr lang="en-US" sz="3100" dirty="0">
                 <a:solidFill>
                   <a:srgbClr val="000090"/>
                 </a:solidFill>
                 <a:latin typeface="Calibri"/>
                 <a:cs typeface="Calibri"/>
               </a:rPr>
-              <a:t>Overall, MCI older adults produced more errors compared to younger and healthy older adults. Additionally, both older adult groups were consistently slower when responding. Mean errors and RTs did not differ between alternating runs and random switching. Regarding costs, global error costs did not differ between switch task as function of age group. However, for local error costs, MCI older adults showed greater costs for predictive vs. non-predictive switching. For mean RT switch costs, global costs did not differ as function of switch type. However younger and healthy older adults showed greater local RT costs when switching was random, suggesting that the random switch task was more taxing towards task-set reconfiguration processes.</a:t>
+              <a:t>Overall, MCI older adults produced more errors compared to younger and healthy older adults. Additionally, both older adult groups were consistently slower across all trial types compared to younger adults. However, within each group, mean errors and RTs did not differ between alternating runs and random switching. Regarding switch costs, global error costs did not differ between switch task as function of age group. For local error costs, however, MCI older adults’ local costs were greater for predictive vs. non-predictive switching. For mean RT switch costs, global costs did not differ as function of switch type. However, younger and healthy older adults showed greater local RT costs when switching was random, suggesting that the random switch task was more taxing towards task-set reconfiguration processes.</a:t>
             </a:r>
           </a:p>
           <a:p>
@@ -3984,17 +4002,7 @@
               </a:spcBef>
             </a:pPr>
             <a:r>
-              <a:rPr lang="en-US" sz="3050" dirty="0">
-                <a:solidFill>
-                  <a:srgbClr val="000090"/>
-                </a:solidFill>
-                <a:latin typeface="Calibri"/>
-                <a:cs typeface="Calibri"/>
-              </a:rPr>
-              <a:t>Next, </a:t>
-            </a:r>
-            <a:r>
-              <a:rPr lang="en-US" sz="3050" dirty="0" err="1">
+              <a:rPr lang="en-US" sz="3100" dirty="0" err="1">
                 <a:solidFill>
                   <a:srgbClr val="000090"/>
                 </a:solidFill>
@@ -4004,16 +4012,39 @@
               <a:t>Vincentile</a:t>
             </a:r>
             <a:r>
-              <a:rPr lang="en-US" sz="3050" dirty="0">
+              <a:rPr lang="en-US" sz="3100" dirty="0">
                 <a:solidFill>
                   <a:srgbClr val="000090"/>
                 </a:solidFill>
                 <a:latin typeface="Calibri"/>
                 <a:cs typeface="Calibri"/>
               </a:rPr>
-              <a:t> plots showed that local costs decreased for all groups, with these decreases being particularly pronounced for healthy older adults when switching was predictive. Analysis of these plots, however, indicated that local costs did not differ between random and predictive switching regardless of participant type. For global costs, all groups showed steady increases across bins, with no differences as a function of switch type. Finally, an ex-Gaussian analysis of RTs indicated that both older adult groups had greater mean Tau values relative to younger adults, which suggests that older individuals had more responses in the tail of the RT distribution relative to younger adults (i.e., slower task responses). However, no differences occurred as a function of switch type. Thus, it appears that random task-switching can increase local RT costs for healthy individuals, however these increases are not captured by RT distributions.</a:t>
-            </a:r>
-            <a:endParaRPr lang="en-US" sz="3050" dirty="0">
+              <a:t> plots showed that local costs decreased for all groups, with these decreases being particularly pronounced for healthy older adults when switching was predictive. Analysis of these plots, however, indicated that local costs did not differ between random and predictive switching regardless of participant type. For global costs, all groups showed steady increases across bins, with no differences occurring between switch types. Finally, an ex-Gaussian analysis of RT costs showed that </a:t>
+            </a:r>
+            <a:r>
+              <a:rPr lang="en-US" sz="3100" dirty="0">
+                <a:solidFill>
+                  <a:srgbClr val="000090"/>
+                </a:solidFill>
+                <a:highlight>
+                  <a:srgbClr val="FFFF00"/>
+                </a:highlight>
+                <a:latin typeface="Calibri"/>
+                <a:cs typeface="Calibri"/>
+              </a:rPr>
+              <a:t>[SUMMARIZE TAU PLOT]</a:t>
+            </a:r>
+            <a:r>
+              <a:rPr lang="en-US" sz="3100" dirty="0">
+                <a:solidFill>
+                  <a:srgbClr val="000090"/>
+                </a:solidFill>
+                <a:latin typeface="Calibri"/>
+                <a:cs typeface="Calibri"/>
+              </a:rPr>
+              <a:t> Overall, participants do not appear to commit more errors when switching is random (vs. predictive), regardless of age group or MCI status. Furthermore, while random task-switching can increase local RT costs for healthy individuals, these increases are not captured by RT distributions. Furthermore,</a:t>
+            </a:r>
+            <a:endParaRPr lang="en-US" sz="3100" dirty="0">
               <a:solidFill>
                 <a:srgbClr val="000090"/>
               </a:solidFill>
@@ -4034,8 +4065,8 @@
         </p:nvSpPr>
         <p:spPr>
           <a:xfrm>
-            <a:off x="27736801" y="2739506"/>
-            <a:ext cx="14163794" cy="16672289"/>
+            <a:off x="27049048" y="2713990"/>
+            <a:ext cx="14814563" cy="15079176"/>
           </a:xfrm>
           <a:prstGeom prst="roundRect">
             <a:avLst/>
@@ -4225,8 +4256,8 @@
         </p:nvSpPr>
         <p:spPr>
           <a:xfrm>
-            <a:off x="245828" y="25702959"/>
-            <a:ext cx="12649945" cy="5732897"/>
+            <a:off x="245828" y="25520991"/>
+            <a:ext cx="12649945" cy="5914865"/>
           </a:xfrm>
           <a:prstGeom prst="roundRect">
             <a:avLst>
@@ -4284,7 +4315,7 @@
         </p:nvSpPr>
         <p:spPr bwMode="auto">
           <a:xfrm>
-            <a:off x="1680654" y="25679400"/>
+            <a:off x="1752600" y="25527000"/>
             <a:ext cx="9948291" cy="1508105"/>
           </a:xfrm>
           <a:prstGeom prst="rect">
@@ -4332,8 +4363,8 @@
         </p:nvSpPr>
         <p:spPr>
           <a:xfrm>
-            <a:off x="13106400" y="30322782"/>
-            <a:ext cx="14439439" cy="1113074"/>
+            <a:off x="27210841" y="30038379"/>
+            <a:ext cx="14652770" cy="1397477"/>
           </a:xfrm>
           <a:prstGeom prst="roundRect">
             <a:avLst/>
@@ -4380,7 +4411,7 @@
                 <a:latin typeface="+mj-lt"/>
                 <a:cs typeface="Arial" pitchFamily="34" charset="0"/>
               </a:rPr>
-              <a:t>Correspondence can be addressed to jacob.namias@usm.edu.  </a:t>
+              <a:t>Correspondence regarding this project can be addressed to jacob.namias@usm.edu.  </a:t>
             </a:r>
           </a:p>
           <a:p>
@@ -4455,7 +4486,7 @@
         </p:nvSpPr>
         <p:spPr bwMode="auto">
           <a:xfrm>
-            <a:off x="15817825" y="2705471"/>
+            <a:off x="15817825" y="2759839"/>
             <a:ext cx="9372600" cy="1431161"/>
           </a:xfrm>
           <a:prstGeom prst="rect">
@@ -4477,7 +4508,7 @@
           <a:p>
             <a:pPr algn="ctr" defTabSz="1347788" eaLnBrk="0" hangingPunct="0"/>
             <a:r>
-              <a:rPr lang="en-US" sz="4800" b="1" u="sng" dirty="0">
+              <a:rPr lang="en-US" sz="4600" b="1" u="sng" dirty="0">
                 <a:solidFill>
                   <a:srgbClr val="0080FF"/>
                 </a:solidFill>
@@ -4701,7 +4732,7 @@
           <p:nvPr/>
         </p:nvPicPr>
         <p:blipFill>
-          <a:blip r:embed="rId3"/>
+          <a:blip r:embed="rId4"/>
           <a:srcRect/>
           <a:stretch>
             <a:fillRect/>
@@ -4733,7 +4764,7 @@
           <p:nvPr/>
         </p:nvPicPr>
         <p:blipFill>
-          <a:blip r:embed="rId4"/>
+          <a:blip r:embed="rId5"/>
           <a:srcRect/>
           <a:stretch>
             <a:fillRect/>
@@ -4765,7 +4796,7 @@
           <p:nvPr/>
         </p:nvPicPr>
         <p:blipFill>
-          <a:blip r:embed="rId5"/>
+          <a:blip r:embed="rId6"/>
           <a:stretch>
             <a:fillRect/>
           </a:stretch>
@@ -5687,7 +5718,7 @@
         </p:nvSpPr>
         <p:spPr bwMode="auto">
           <a:xfrm>
-            <a:off x="1346200" y="2667000"/>
+            <a:off x="1206379" y="2727407"/>
             <a:ext cx="10617200" cy="1508105"/>
           </a:xfrm>
           <a:prstGeom prst="rect">
@@ -5709,7 +5740,7 @@
           <a:p>
             <a:pPr algn="ctr" defTabSz="1347788" eaLnBrk="0" hangingPunct="0"/>
             <a:r>
-              <a:rPr lang="en-US" sz="4800" b="1" u="sng" dirty="0">
+              <a:rPr lang="en-US" sz="4600" b="1" u="sng" dirty="0">
                 <a:solidFill>
                   <a:srgbClr val="0080FF"/>
                 </a:solidFill>
@@ -5741,8 +5772,8 @@
         </p:nvSpPr>
         <p:spPr>
           <a:xfrm>
-            <a:off x="457200" y="30175200"/>
-            <a:ext cx="12375989" cy="1052766"/>
+            <a:off x="457200" y="30038379"/>
+            <a:ext cx="12375989" cy="1113387"/>
           </a:xfrm>
           <a:prstGeom prst="rect">
             <a:avLst/>
@@ -5776,7 +5807,7 @@
               <a:buNone/>
             </a:pPr>
             <a:r>
-              <a:rPr lang="en-US" sz="2800" b="1" i="0" u="sng" strike="noStrike" cap="none" dirty="0">
+              <a:rPr lang="en-US" sz="2700" b="1" i="0" u="sng" strike="noStrike" cap="none" dirty="0">
                 <a:solidFill>
                   <a:srgbClr val="000090"/>
                 </a:solidFill>
@@ -5788,7 +5819,7 @@
               <a:t>Note</a:t>
             </a:r>
             <a:r>
-              <a:rPr lang="en-US" sz="2800" b="1" i="0" u="none" strike="noStrike" cap="none" dirty="0">
+              <a:rPr lang="en-US" sz="2700" b="1" i="0" u="none" strike="noStrike" cap="none" dirty="0">
                 <a:solidFill>
                   <a:srgbClr val="000090"/>
                 </a:solidFill>
@@ -5800,7 +5831,7 @@
               <a:t>: </a:t>
             </a:r>
             <a:r>
-              <a:rPr lang="en-US" sz="2800" b="0" i="0" u="none" strike="noStrike" cap="none" dirty="0">
+              <a:rPr lang="en-US" sz="2700" b="0" i="0" u="none" strike="noStrike" cap="none" dirty="0">
                 <a:solidFill>
                   <a:srgbClr val="000090"/>
                 </a:solidFill>
@@ -5809,30 +5840,12 @@
                 <a:cs typeface="Calibri"/>
                 <a:sym typeface="Calibri"/>
               </a:rPr>
-              <a:t>The first two blocks always contained pure trials (CV or OE). The final two sets of trials were always switch blocks (Alt Runs or Random). </a:t>
-            </a:r>
-            <a:r>
-              <a:rPr lang="en-US" sz="2800" b="0" i="0" u="none" strike="noStrike" cap="none" dirty="0">
-                <a:solidFill>
-                  <a:srgbClr val="000090"/>
-                </a:solidFill>
-                <a:highlight>
-                  <a:srgbClr val="FFFF00"/>
-                </a:highlight>
-                <a:latin typeface="Calibri"/>
-                <a:ea typeface="Calibri"/>
-                <a:cs typeface="Calibri"/>
-                <a:sym typeface="Calibri"/>
-              </a:rPr>
-              <a:t>MOCA</a:t>
-            </a:r>
-            <a:endParaRPr sz="2800" b="0" i="0" u="none" strike="noStrike" cap="none" dirty="0">
+              <a:t>The first two blocks always contained pure trials (CV or OE). The final two sets of trials were always switch blocks (Alt Runs or Random). MOCA = Montreal Cognitive Assessment</a:t>
+            </a:r>
+            <a:endParaRPr sz="2700" b="0" i="0" u="none" strike="noStrike" cap="none" dirty="0">
               <a:solidFill>
                 <a:srgbClr val="000090"/>
               </a:solidFill>
-              <a:highlight>
-                <a:srgbClr val="FFFF00"/>
-              </a:highlight>
               <a:latin typeface="Calibri"/>
               <a:ea typeface="Calibri"/>
               <a:cs typeface="Calibri"/>
@@ -6990,7 +7003,7 @@
           <a:p>
             <a:pPr algn="ctr" defTabSz="1347788" eaLnBrk="0" hangingPunct="0"/>
             <a:r>
-              <a:rPr lang="en-US" sz="4800" b="1" u="sng" dirty="0">
+              <a:rPr lang="en-US" sz="4600" b="1" u="sng" dirty="0">
                 <a:solidFill>
                   <a:srgbClr val="0080FF"/>
                 </a:solidFill>
@@ -7142,7 +7155,7 @@
         </p:nvSpPr>
         <p:spPr bwMode="auto">
           <a:xfrm>
-            <a:off x="30569957" y="4332437"/>
+            <a:off x="30251400" y="3810000"/>
             <a:ext cx="9372600" cy="1246495"/>
           </a:xfrm>
           <a:prstGeom prst="rect">
@@ -7206,7 +7219,7 @@
         </p:nvSpPr>
         <p:spPr bwMode="auto">
           <a:xfrm>
-            <a:off x="15683948" y="12649200"/>
+            <a:off x="15925800" y="12681228"/>
             <a:ext cx="9372600" cy="1415772"/>
           </a:xfrm>
           <a:prstGeom prst="rect">
@@ -7228,14 +7241,14 @@
           <a:p>
             <a:pPr algn="ctr" defTabSz="1347788" eaLnBrk="0" hangingPunct="0"/>
             <a:r>
-              <a:rPr lang="en-US" sz="4800" b="1" u="sng" dirty="0">
+              <a:rPr lang="en-US" sz="4600" b="1" u="sng" dirty="0">
                 <a:solidFill>
                   <a:srgbClr val="0080FF"/>
                 </a:solidFill>
               </a:rPr>
               <a:t>Results: Mean RTs</a:t>
             </a:r>
-            <a:endParaRPr lang="en-US" sz="4800" b="1" dirty="0">
+            <a:endParaRPr lang="en-US" sz="4600" b="1" dirty="0">
               <a:solidFill>
                 <a:srgbClr val="0000FF"/>
               </a:solidFill>
@@ -7267,8 +7280,8 @@
         </p:nvSpPr>
         <p:spPr bwMode="auto">
           <a:xfrm>
-            <a:off x="15639819" y="23006239"/>
-            <a:ext cx="9372600" cy="1431161"/>
+            <a:off x="15842004" y="22465605"/>
+            <a:ext cx="9372600" cy="1384995"/>
           </a:xfrm>
           <a:prstGeom prst="rect">
             <a:avLst/>
@@ -7289,17 +7302,14 @@
           <a:p>
             <a:pPr algn="ctr" defTabSz="1347788" eaLnBrk="0" hangingPunct="0"/>
             <a:r>
-              <a:rPr lang="en-US" sz="4800" b="1" u="sng" dirty="0">
+              <a:rPr lang="en-US" sz="4600" b="1" u="sng" dirty="0">
                 <a:solidFill>
                   <a:srgbClr val="0080FF"/>
                 </a:solidFill>
               </a:rPr>
               <a:t>Ex-Gaussian Analysis</a:t>
             </a:r>
-          </a:p>
-          <a:p>
-            <a:pPr algn="ctr" defTabSz="1347788" eaLnBrk="0" hangingPunct="0"/>
-            <a:endParaRPr lang="en-US" sz="100" b="1" dirty="0">
+            <a:endParaRPr lang="en-US" sz="4600" b="1" dirty="0">
               <a:solidFill>
                 <a:srgbClr val="0000FF"/>
               </a:solidFill>
@@ -7331,7 +7341,7 @@
         </p:nvSpPr>
         <p:spPr bwMode="auto">
           <a:xfrm>
-            <a:off x="30004776" y="3171600"/>
+            <a:off x="29659366" y="2743200"/>
             <a:ext cx="10617200" cy="1508105"/>
           </a:xfrm>
           <a:prstGeom prst="rect">
@@ -7353,7 +7363,7 @@
           <a:p>
             <a:pPr algn="ctr" defTabSz="1347788" eaLnBrk="0" hangingPunct="0"/>
             <a:r>
-              <a:rPr lang="en-US" sz="4800" b="1" u="sng" dirty="0" err="1">
+              <a:rPr lang="en-US" sz="4600" b="1" u="sng" dirty="0" err="1">
                 <a:solidFill>
                   <a:srgbClr val="0080FF"/>
                 </a:solidFill>
@@ -7361,7 +7371,7 @@
               <a:t>Vincentile</a:t>
             </a:r>
             <a:r>
-              <a:rPr lang="en-US" sz="4800" b="1" u="sng" dirty="0">
+              <a:rPr lang="en-US" sz="4600" b="1" u="sng" dirty="0">
                 <a:solidFill>
                   <a:srgbClr val="0080FF"/>
                 </a:solidFill>
@@ -7376,46 +7386,6 @@
                 <a:srgbClr val="0000FF"/>
               </a:solidFill>
             </a:endParaRPr>
-          </a:p>
-        </p:txBody>
-      </p:sp>
-      <p:sp>
-        <p:nvSpPr>
-          <p:cNvPr id="67" name="TextBox 66">
-            <a:extLst>
-              <a:ext uri="{FF2B5EF4-FFF2-40B4-BE49-F238E27FC236}">
-                <a16:creationId xmlns:a16="http://schemas.microsoft.com/office/drawing/2014/main" id="{1A89A707-0DAB-4C77-B874-F151DE4F9438}"/>
-              </a:ext>
-            </a:extLst>
-          </p:cNvPr>
-          <p:cNvSpPr txBox="1"/>
-          <p:nvPr/>
-        </p:nvSpPr>
-        <p:spPr>
-          <a:xfrm>
-            <a:off x="24871032" y="28906562"/>
-            <a:ext cx="1885453" cy="400110"/>
-          </a:xfrm>
-          <a:prstGeom prst="rect">
-            <a:avLst/>
-          </a:prstGeom>
-          <a:noFill/>
-        </p:spPr>
-        <p:txBody>
-          <a:bodyPr wrap="none" rtlCol="0">
-            <a:spAutoFit/>
-          </a:bodyPr>
-          <a:lstStyle/>
-          <a:p>
-            <a:pPr algn="ctr"/>
-            <a:r>
-              <a:rPr lang="en-US" sz="2000" b="1" dirty="0">
-                <a:solidFill>
-                  <a:srgbClr val="000090"/>
-                </a:solidFill>
-              </a:rPr>
-              <a:t>Bars = 95% CI</a:t>
-            </a:r>
           </a:p>
         </p:txBody>
       </p:sp>
@@ -7434,11 +7404,11 @@
           <p:nvPr/>
         </p:nvPicPr>
         <p:blipFill rotWithShape="1">
-          <a:blip r:embed="rId6">
+          <a:blip r:embed="rId7">
             <a:extLst>
               <a:ext uri="{BEBA8EAE-BF5A-486C-A8C5-ECC9F3942E4B}">
                 <a14:imgProps xmlns:a14="http://schemas.microsoft.com/office/drawing/2010/main">
-                  <a14:imgLayer r:embed="rId7">
+                  <a14:imgLayer r:embed="rId8">
                     <a14:imgEffect>
                       <a14:brightnessContrast contrast="-40000"/>
                     </a14:imgEffect>
@@ -7452,8 +7422,8 @@
         </p:blipFill>
         <p:spPr>
           <a:xfrm>
-            <a:off x="13938665" y="3657600"/>
-            <a:ext cx="12774907" cy="9029841"/>
+            <a:off x="13792200" y="3713918"/>
+            <a:ext cx="12640835" cy="8935074"/>
           </a:xfrm>
           <a:prstGeom prst="rect">
             <a:avLst/>
@@ -7475,72 +7445,14 @@
           <p:nvPr/>
         </p:nvPicPr>
         <p:blipFill rotWithShape="1">
-          <a:blip r:embed="rId8"/>
+          <a:blip r:embed="rId9"/>
           <a:srcRect l="4898" t="7477" r="8898" b="4605"/>
           <a:stretch/>
         </p:blipFill>
         <p:spPr>
           <a:xfrm>
-            <a:off x="13475923" y="13876367"/>
-            <a:ext cx="13280562" cy="9029841"/>
-          </a:xfrm>
-          <a:prstGeom prst="rect">
-            <a:avLst/>
-          </a:prstGeom>
-        </p:spPr>
-      </p:pic>
-      <p:pic>
-        <p:nvPicPr>
-          <p:cNvPr id="30" name="Picture 29" descr="Graphical user interface, chart&#10;&#10;Description automatically generated">
-            <a:extLst>
-              <a:ext uri="{FF2B5EF4-FFF2-40B4-BE49-F238E27FC236}">
-                <a16:creationId xmlns:a16="http://schemas.microsoft.com/office/drawing/2014/main" id="{BF8F7D30-F763-4476-8F59-66FE912BEA91}"/>
-              </a:ext>
-            </a:extLst>
-          </p:cNvPr>
-          <p:cNvPicPr>
-            <a:picLocks noChangeAspect="1"/>
-          </p:cNvPicPr>
-          <p:nvPr/>
-        </p:nvPicPr>
-        <p:blipFill rotWithShape="1">
-          <a:blip r:embed="rId9"/>
-          <a:srcRect l="5995" t="8639" r="9510" b="49155"/>
-          <a:stretch/>
-        </p:blipFill>
-        <p:spPr>
-          <a:xfrm>
-            <a:off x="28000447" y="5351340"/>
-            <a:ext cx="13409801" cy="4018891"/>
-          </a:xfrm>
-          <a:prstGeom prst="rect">
-            <a:avLst/>
-          </a:prstGeom>
-        </p:spPr>
-      </p:pic>
-      <p:pic>
-        <p:nvPicPr>
-          <p:cNvPr id="77" name="Picture 76" descr="Graphical user interface, chart&#10;&#10;Description automatically generated">
-            <a:extLst>
-              <a:ext uri="{FF2B5EF4-FFF2-40B4-BE49-F238E27FC236}">
-                <a16:creationId xmlns:a16="http://schemas.microsoft.com/office/drawing/2014/main" id="{809239AF-C8F1-4E5A-AEFA-12046D9B25D9}"/>
-              </a:ext>
-            </a:extLst>
-          </p:cNvPr>
-          <p:cNvPicPr>
-            <a:picLocks noChangeAspect="1"/>
-          </p:cNvPicPr>
-          <p:nvPr/>
-        </p:nvPicPr>
-        <p:blipFill rotWithShape="1">
-          <a:blip r:embed="rId9"/>
-          <a:srcRect l="5995" t="49619" r="9510" b="5653"/>
-          <a:stretch/>
-        </p:blipFill>
-        <p:spPr>
-          <a:xfrm>
-            <a:off x="28045444" y="13810806"/>
-            <a:ext cx="13563600" cy="4307933"/>
+            <a:off x="13487400" y="13639302"/>
+            <a:ext cx="12888840" cy="8763498"/>
           </a:xfrm>
           <a:prstGeom prst="rect">
             <a:avLst/>
@@ -7563,7 +7475,7 @@
         </p:nvSpPr>
         <p:spPr bwMode="auto">
           <a:xfrm>
-            <a:off x="30327600" y="19539228"/>
+            <a:off x="30290729" y="18091428"/>
             <a:ext cx="9372600" cy="1415772"/>
           </a:xfrm>
           <a:prstGeom prst="rect">
@@ -7585,14 +7497,14 @@
           <a:p>
             <a:pPr algn="ctr" defTabSz="1347788" eaLnBrk="0" hangingPunct="0"/>
             <a:r>
-              <a:rPr lang="en-US" sz="4800" b="1" u="sng" dirty="0">
+              <a:rPr lang="en-US" sz="4600" b="1" u="sng" dirty="0">
                 <a:solidFill>
                   <a:srgbClr val="0080FF"/>
                 </a:solidFill>
               </a:rPr>
               <a:t>Conclusions</a:t>
             </a:r>
-            <a:endParaRPr lang="en-US" sz="4800" b="1" dirty="0">
+            <a:endParaRPr lang="en-US" sz="4600" b="1" dirty="0">
               <a:solidFill>
                 <a:srgbClr val="0000FF"/>
               </a:solidFill>
@@ -7622,7 +7534,7 @@
         </p:nvSpPr>
         <p:spPr>
           <a:xfrm>
-            <a:off x="25331504" y="12435133"/>
+            <a:off x="24093826" y="12249090"/>
             <a:ext cx="1885453" cy="400110"/>
           </a:xfrm>
           <a:prstGeom prst="rect">
@@ -7662,7 +7574,7 @@
         </p:nvSpPr>
         <p:spPr>
           <a:xfrm>
-            <a:off x="25415372" y="22776009"/>
+            <a:off x="24346155" y="22155090"/>
             <a:ext cx="1885453" cy="400110"/>
           </a:xfrm>
           <a:prstGeom prst="rect">
@@ -7704,7 +7616,7 @@
         </p:nvSpPr>
         <p:spPr bwMode="auto">
           <a:xfrm>
-            <a:off x="30627076" y="13212790"/>
+            <a:off x="30569957" y="9909483"/>
             <a:ext cx="9372600" cy="1215717"/>
           </a:xfrm>
           <a:prstGeom prst="rect">
@@ -7769,7 +7681,7 @@
         </p:nvSpPr>
         <p:spPr>
           <a:xfrm>
-            <a:off x="39167302" y="18497490"/>
+            <a:off x="39167302" y="16284465"/>
             <a:ext cx="1885453" cy="400110"/>
           </a:xfrm>
           <a:prstGeom prst="rect">
@@ -7809,7 +7721,7 @@
         </p:nvSpPr>
         <p:spPr>
           <a:xfrm>
-            <a:off x="5026636" y="26623579"/>
+            <a:off x="5026636" y="26547379"/>
             <a:ext cx="3279164" cy="3378511"/>
           </a:xfrm>
           <a:prstGeom prst="roundRect">
@@ -7929,7 +7841,7 @@
         </p:nvSpPr>
         <p:spPr>
           <a:xfrm>
-            <a:off x="9144000" y="26593800"/>
+            <a:off x="9144000" y="26517600"/>
             <a:ext cx="3279164" cy="3378511"/>
           </a:xfrm>
           <a:prstGeom prst="roundRect">
@@ -8018,7 +7930,7 @@
         </p:nvGrpSpPr>
         <p:grpSpPr>
           <a:xfrm>
-            <a:off x="683236" y="26623579"/>
+            <a:off x="683236" y="26547379"/>
             <a:ext cx="4574567" cy="3378511"/>
             <a:chOff x="12506446" y="15971046"/>
             <a:chExt cx="3124565" cy="1736584"/>
@@ -8249,7 +8161,7 @@
         </p:nvSpPr>
         <p:spPr>
           <a:xfrm>
-            <a:off x="7916578" y="27618440"/>
+            <a:off x="7916578" y="27542240"/>
             <a:ext cx="1608422" cy="1253675"/>
           </a:xfrm>
           <a:prstGeom prst="rightArrow">
@@ -8313,11 +8225,183 @@
           </a:p>
         </p:txBody>
       </p:sp>
+      <p:pic>
+        <p:nvPicPr>
+          <p:cNvPr id="14" name="Picture 13" descr="Graphical user interface, chart&#10;&#10;Description automatically generated">
+            <a:extLst>
+              <a:ext uri="{FF2B5EF4-FFF2-40B4-BE49-F238E27FC236}">
+                <a16:creationId xmlns:a16="http://schemas.microsoft.com/office/drawing/2014/main" id="{5A2262F5-2275-4626-B5F2-23DB4CB8FDA7}"/>
+              </a:ext>
+            </a:extLst>
+          </p:cNvPr>
+          <p:cNvPicPr>
+            <a:picLocks noChangeAspect="1"/>
+          </p:cNvPicPr>
+          <p:nvPr/>
+        </p:nvPicPr>
+        <p:blipFill rotWithShape="1">
+          <a:blip r:embed="rId10"/>
+          <a:srcRect l="6157" t="9578" r="9816" b="51135"/>
+          <a:stretch/>
+        </p:blipFill>
+        <p:spPr>
+          <a:xfrm>
+            <a:off x="27127200" y="4648200"/>
+            <a:ext cx="14560967" cy="4862946"/>
+          </a:xfrm>
+          <a:prstGeom prst="rect">
+            <a:avLst/>
+          </a:prstGeom>
+        </p:spPr>
+      </p:pic>
+      <p:pic>
+        <p:nvPicPr>
+          <p:cNvPr id="62" name="Picture 61" descr="Graphical user interface, chart&#10;&#10;Description automatically generated">
+            <a:extLst>
+              <a:ext uri="{FF2B5EF4-FFF2-40B4-BE49-F238E27FC236}">
+                <a16:creationId xmlns:a16="http://schemas.microsoft.com/office/drawing/2014/main" id="{1C0B0BE2-9B1C-4BED-B42C-D92C70A6B006}"/>
+              </a:ext>
+            </a:extLst>
+          </p:cNvPr>
+          <p:cNvPicPr>
+            <a:picLocks noChangeAspect="1"/>
+          </p:cNvPicPr>
+          <p:nvPr/>
+        </p:nvPicPr>
+        <p:blipFill rotWithShape="1">
+          <a:blip r:embed="rId10"/>
+          <a:srcRect l="6157" t="53218" r="9816" b="7078"/>
+          <a:stretch/>
+        </p:blipFill>
+        <p:spPr>
+          <a:xfrm>
+            <a:off x="27120433" y="10858875"/>
+            <a:ext cx="14560967" cy="4914525"/>
+          </a:xfrm>
+          <a:prstGeom prst="rect">
+            <a:avLst/>
+          </a:prstGeom>
+        </p:spPr>
+      </p:pic>
+      <p:sp>
+        <p:nvSpPr>
+          <p:cNvPr id="69" name="TextBox 68">
+            <a:extLst>
+              <a:ext uri="{FF2B5EF4-FFF2-40B4-BE49-F238E27FC236}">
+                <a16:creationId xmlns:a16="http://schemas.microsoft.com/office/drawing/2014/main" id="{B3A8D048-D491-4925-BE94-08FC8335514E}"/>
+              </a:ext>
+            </a:extLst>
+          </p:cNvPr>
+          <p:cNvSpPr txBox="1"/>
+          <p:nvPr/>
+        </p:nvSpPr>
+        <p:spPr>
+          <a:xfrm>
+            <a:off x="39485806" y="9601200"/>
+            <a:ext cx="1885453" cy="400110"/>
+          </a:xfrm>
+          <a:prstGeom prst="rect">
+            <a:avLst/>
+          </a:prstGeom>
+          <a:noFill/>
+        </p:spPr>
+        <p:txBody>
+          <a:bodyPr wrap="none" rtlCol="0">
+            <a:spAutoFit/>
+          </a:bodyPr>
+          <a:lstStyle/>
+          <a:p>
+            <a:pPr algn="ctr"/>
+            <a:r>
+              <a:rPr lang="en-US" sz="2000" b="1" dirty="0">
+                <a:solidFill>
+                  <a:srgbClr val="000090"/>
+                </a:solidFill>
+              </a:rPr>
+              <a:t>Bars = 95% CI</a:t>
+            </a:r>
+          </a:p>
+        </p:txBody>
+      </p:sp>
+      <p:pic>
+        <p:nvPicPr>
+          <p:cNvPr id="23" name="Picture 22" descr="Chart&#10;&#10;Description automatically generated">
+            <a:extLst>
+              <a:ext uri="{FF2B5EF4-FFF2-40B4-BE49-F238E27FC236}">
+                <a16:creationId xmlns:a16="http://schemas.microsoft.com/office/drawing/2014/main" id="{949E2A46-3D2A-4222-AB36-61C8F2F68B59}"/>
+              </a:ext>
+            </a:extLst>
+          </p:cNvPr>
+          <p:cNvPicPr>
+            <a:picLocks noChangeAspect="1"/>
+          </p:cNvPicPr>
+          <p:nvPr/>
+        </p:nvPicPr>
+        <p:blipFill rotWithShape="1">
+          <a:blip r:embed="rId11"/>
+          <a:srcRect l="2210" t="3109" r="6703"/>
+          <a:stretch/>
+        </p:blipFill>
+        <p:spPr>
+          <a:xfrm>
+            <a:off x="13688429" y="23393110"/>
+            <a:ext cx="12491881" cy="7086890"/>
+          </a:xfrm>
+          <a:prstGeom prst="rect">
+            <a:avLst/>
+          </a:prstGeom>
+        </p:spPr>
+      </p:pic>
+      <p:sp>
+        <p:nvSpPr>
+          <p:cNvPr id="67" name="TextBox 66">
+            <a:extLst>
+              <a:ext uri="{FF2B5EF4-FFF2-40B4-BE49-F238E27FC236}">
+                <a16:creationId xmlns:a16="http://schemas.microsoft.com/office/drawing/2014/main" id="{1A89A707-0DAB-4C77-B874-F151DE4F9438}"/>
+              </a:ext>
+            </a:extLst>
+          </p:cNvPr>
+          <p:cNvSpPr txBox="1"/>
+          <p:nvPr/>
+        </p:nvSpPr>
+        <p:spPr>
+          <a:xfrm>
+            <a:off x="23805478" y="30175200"/>
+            <a:ext cx="1885453" cy="400110"/>
+          </a:xfrm>
+          <a:prstGeom prst="rect">
+            <a:avLst/>
+          </a:prstGeom>
+          <a:noFill/>
+        </p:spPr>
+        <p:txBody>
+          <a:bodyPr wrap="none" rtlCol="0">
+            <a:spAutoFit/>
+          </a:bodyPr>
+          <a:lstStyle/>
+          <a:p>
+            <a:pPr algn="ctr"/>
+            <a:r>
+              <a:rPr lang="en-US" sz="2000" b="1" dirty="0">
+                <a:solidFill>
+                  <a:srgbClr val="000090"/>
+                </a:solidFill>
+              </a:rPr>
+              <a:t>Bars = 95% CI</a:t>
+            </a:r>
+          </a:p>
+        </p:txBody>
+      </p:sp>
     </p:spTree>
   </p:cSld>
   <p:clrMapOvr>
     <a:masterClrMapping/>
   </p:clrMapOvr>
+  <p:extLst>
+    <p:ext uri="{6950BFC3-D8DA-4A85-94F7-54DA5524770B}">
+      <p188:commentRel xmlns:p188="http://schemas.microsoft.com/office/powerpoint/2018/8/main" r:id="rId3"/>
+    </p:ext>
+  </p:extLst>
 </p:sld>
 </file>
 

</xml_diff>

<commit_message>
second draft of poster!
</commit_message>
<xml_diff>
--- a/5 Presentations/Posters/Namias Maxwell Huff Cog Aging 2022.pptx
+++ b/5 Presentations/Posters/Namias Maxwell Huff Cog Aging 2022.pptx
@@ -236,8 +236,8 @@
       <pc:docMk xmlns:pc="http://schemas.microsoft.com/office/powerpoint/2013/main/command"/>
       <pc:sldMk xmlns:pc="http://schemas.microsoft.com/office/powerpoint/2013/main/command" cId="0" sldId="256"/>
       <ac:spMk id="54" creationId="{00000000-0000-0000-0000-000000000000}"/>
-      <ac:txMk cp="821" len="10">
-        <ac:context len="1654" hash="2358595663"/>
+      <ac:txMk cp="845" len="10">
+        <ac:context len="1852" hash="3213644662"/>
       </ac:txMk>
     </ac:txMkLst>
     <p188:pos x="1843674" y="5484130"/>
@@ -3961,8 +3961,8 @@
         </p:nvSpPr>
         <p:spPr bwMode="auto">
           <a:xfrm>
-            <a:off x="27594107" y="18880205"/>
-            <a:ext cx="14087294" cy="10380595"/>
+            <a:off x="27508200" y="18742559"/>
+            <a:ext cx="14246969" cy="10518242"/>
           </a:xfrm>
           <a:prstGeom prst="rect">
             <a:avLst/>
@@ -3992,7 +3992,7 @@
                 <a:latin typeface="Calibri"/>
                 <a:cs typeface="Calibri"/>
               </a:rPr>
-              <a:t>Overall, MCI older adults produced more errors compared to younger and healthy older adults. Additionally, both older adult groups were consistently slower across all trial types compared to younger adults. However, within each group, mean errors and RTs did not differ between alternating runs and random switching. Regarding switch costs, global error costs did not differ between switch task as function of age group. For local error costs, however, MCI older adults’ local costs were greater for predictive vs. non-predictive switching. For mean RT switch costs, global costs did not differ as function of switch type. However, younger and healthy older adults showed greater local RT costs when switching was random, suggesting that the random switch task was more taxing towards task-set reconfiguration processes.</a:t>
+              <a:t>Overall, MCI older adults produced more errors compared to both younger and healthy older adults. Additionally, both older adult groups had consistently slower RTs across all trial types relative to younger adults. However, within each group, mean error rates and RTs did not differ between alternating runs and random switching. Regarding switch costs, global error costs did not differ between switch tasks as function of age group. For local error costs, however, MCI older adults’ switch costs were greater for predictive vs. non-predictive switching. Finally, for mean RT switch costs, global costs did not differ as function of switch type. However, younger and healthy older adults showed greater local RT costs when switching was random, suggesting that the random switch task was more taxing towards task-set reconfiguration processes.</a:t>
             </a:r>
           </a:p>
           <a:p>
@@ -4019,50 +4019,7 @@
                 <a:latin typeface="Calibri"/>
                 <a:cs typeface="Calibri"/>
               </a:rPr>
-              <a:t> plots showed that local costs decreased for all groups, with these decreases being particularly pronounced for healthy older adults when switching was predictive. Analysis of these plots, however, indicated that local costs did </a:t>
-            </a:r>
-            <a:r>
-              <a:rPr lang="en-US" sz="3100">
-                <a:solidFill>
-                  <a:srgbClr val="000090"/>
-                </a:solidFill>
-                <a:latin typeface="Calibri"/>
-                <a:cs typeface="Calibri"/>
-              </a:rPr>
-              <a:t>not significantly differ </a:t>
-            </a:r>
-            <a:r>
-              <a:rPr lang="en-US" sz="3100" dirty="0">
-                <a:solidFill>
-                  <a:srgbClr val="000090"/>
-                </a:solidFill>
-                <a:latin typeface="Calibri"/>
-                <a:cs typeface="Calibri"/>
-              </a:rPr>
-              <a:t>between random and predictive switching regardless of participant type. For global costs, all groups showed steady increases across bins, with no differences occurring between switch types. Finally, an ex-Gaussian analysis of RT costs showed that </a:t>
-            </a:r>
-            <a:r>
-              <a:rPr lang="en-US" sz="3100" dirty="0">
-                <a:solidFill>
-                  <a:srgbClr val="000090"/>
-                </a:solidFill>
-                <a:highlight>
-                  <a:srgbClr val="FFFF00"/>
-                </a:highlight>
-                <a:latin typeface="Calibri"/>
-                <a:cs typeface="Calibri"/>
-              </a:rPr>
-              <a:t>[SUMMARIZE TAU PLOT]</a:t>
-            </a:r>
-            <a:r>
-              <a:rPr lang="en-US" sz="3100" dirty="0">
-                <a:solidFill>
-                  <a:srgbClr val="000090"/>
-                </a:solidFill>
-                <a:latin typeface="Calibri"/>
-                <a:cs typeface="Calibri"/>
-              </a:rPr>
-              <a:t> Overall, participants do not appear to commit more errors when switching is random (vs. predictive), regardless of age group or MCI status. Furthermore, while random task-switching can increase local RT costs for healthy individuals, these increases are not captured by RT distributions. Furthermore,</a:t>
+              <a:t> plots showed that local costs decreased for all groups. However, analysis of these plots failed to detect a three-way interaction between cost type, bin, and group, indicating that decreases across bins did not differ between predictive and random switching. For global costs, all groups showed steady increases across bins, with no differences occurring between switch types, with the three-way interaction again non-significant. Finally, fitting response times to an ex-gaussian distribution revealed that tau (e.g., xxx) was greater for global costs vs. local costs and higher for healthy older adults relative to younger adults. However, for both local and global costs, tau did not differ as function of switch type. Thus, it appears that while local RT costs may be slower for predictive switching when individuals are not impaired, these differences are not reflected in distributional analyses, and switch task performance largely does not differ between predictive and random switching.</a:t>
             </a:r>
             <a:endParaRPr lang="en-US" sz="3100" dirty="0">
               <a:solidFill>
@@ -7495,7 +7452,7 @@
         </p:nvSpPr>
         <p:spPr bwMode="auto">
           <a:xfrm>
-            <a:off x="30290729" y="18091428"/>
+            <a:off x="30290729" y="17983200"/>
             <a:ext cx="9372600" cy="1415772"/>
           </a:xfrm>
           <a:prstGeom prst="rect">

</xml_diff>